<commit_message>
Module 5 R1 release (labs wip)
</commit_message>
<xml_diff>
--- a/Instructor-Led/Module5/Lessons/Module5_Lesson3 Spark ML Overview and Spark on Azure.pptx
+++ b/Instructor-Led/Module5/Lessons/Module5_Lesson3 Spark ML Overview and Spark on Azure.pptx
@@ -1,11 +1,11 @@
 
 <file path=ppt/presentation.xml><?xml version="1.0" encoding="utf-8"?>
-<p:presentation xmlns:a="http://schemas.openxmlformats.org/drawingml/2006/main" xmlns:r="http://schemas.openxmlformats.org/officeDocument/2006/relationships" xmlns:p="http://schemas.openxmlformats.org/presentationml/2006/main" saveSubsetFonts="1">
+<p:presentation xmlns:a="http://schemas.openxmlformats.org/drawingml/2006/main" xmlns:r="http://schemas.openxmlformats.org/officeDocument/2006/relationships" xmlns:p="http://schemas.openxmlformats.org/presentationml/2006/main" removePersonalInfoOnSave="1" saveSubsetFonts="1">
   <p:sldMasterIdLst>
     <p:sldMasterId id="2147483648" r:id="rId1"/>
   </p:sldMasterIdLst>
   <p:notesMasterIdLst>
-    <p:notesMasterId r:id="rId25"/>
+    <p:notesMasterId r:id="rId21"/>
   </p:notesMasterIdLst>
   <p:sldIdLst>
     <p:sldId id="256" r:id="rId2"/>
@@ -19,18 +19,14 @@
     <p:sldId id="393" r:id="rId10"/>
     <p:sldId id="394" r:id="rId11"/>
     <p:sldId id="395" r:id="rId12"/>
-    <p:sldId id="406" r:id="rId13"/>
-    <p:sldId id="397" r:id="rId14"/>
-    <p:sldId id="398" r:id="rId15"/>
-    <p:sldId id="400" r:id="rId16"/>
-    <p:sldId id="401" r:id="rId17"/>
-    <p:sldId id="407" r:id="rId18"/>
-    <p:sldId id="402" r:id="rId19"/>
-    <p:sldId id="403" r:id="rId20"/>
-    <p:sldId id="404" r:id="rId21"/>
-    <p:sldId id="408" r:id="rId22"/>
-    <p:sldId id="324" r:id="rId23"/>
-    <p:sldId id="405" r:id="rId24"/>
+    <p:sldId id="397" r:id="rId13"/>
+    <p:sldId id="398" r:id="rId14"/>
+    <p:sldId id="400" r:id="rId15"/>
+    <p:sldId id="401" r:id="rId16"/>
+    <p:sldId id="402" r:id="rId17"/>
+    <p:sldId id="403" r:id="rId18"/>
+    <p:sldId id="404" r:id="rId19"/>
+    <p:sldId id="324" r:id="rId20"/>
   </p:sldIdLst>
   <p:sldSz cx="12192000" cy="6858000"/>
   <p:notesSz cx="6858000" cy="9144000"/>
@@ -131,7 +127,18 @@
   </p:defaultTextStyle>
   <p:extLst>
     <p:ext uri="{EFAFB233-063F-42B5-8137-9DF3F51BA10A}">
-      <p15:sldGuideLst xmlns:p15="http://schemas.microsoft.com/office/powerpoint/2012/main" xmlns=""/>
+      <p15:sldGuideLst xmlns="" xmlns:p15="http://schemas.microsoft.com/office/powerpoint/2012/main">
+        <p15:guide id="1" orient="horz" pos="2160">
+          <p15:clr>
+            <a:srgbClr val="A4A3A4"/>
+          </p15:clr>
+        </p15:guide>
+        <p15:guide id="2" pos="3840">
+          <p15:clr>
+            <a:srgbClr val="A4A3A4"/>
+          </p15:clr>
+        </p15:guide>
+      </p15:sldGuideLst>
     </p:ext>
   </p:extLst>
 </p:presentation>
@@ -139,41 +146,8 @@
 
 <file path=ppt/commentAuthors.xml><?xml version="1.0" encoding="utf-8"?>
 <p:cmAuthorLst xmlns:a="http://schemas.openxmlformats.org/drawingml/2006/main" xmlns:r="http://schemas.openxmlformats.org/officeDocument/2006/relationships" xmlns:p="http://schemas.openxmlformats.org/presentationml/2006/main">
-  <p:cmAuthor id="1" name="Gavin Gear" initials="GG" lastIdx="7" clrIdx="0">
-    <p:extLst/>
-  </p:cmAuthor>
-  <p:cmAuthor id="2" name="Mary Kate Reid" initials="" lastIdx="3" clrIdx="1"/>
+  <p:cmAuthor id="3" name="Author" initials="A" lastIdx="0" clrIdx="2"/>
 </p:cmAuthorLst>
-</file>
-
-<file path=ppt/comments/comment1.xml><?xml version="1.0" encoding="utf-8"?>
-<p:cmLst xmlns:a="http://schemas.openxmlformats.org/drawingml/2006/main" xmlns:r="http://schemas.openxmlformats.org/officeDocument/2006/relationships" xmlns:p="http://schemas.openxmlformats.org/presentationml/2006/main">
-  <p:cm authorId="2" dt="2016-06-08T16:25:28.568" idx="1">
-    <p:pos x="-19" y="10"/>
-    <p:text>Add a practical example here that exhibits the concepts covered in the previous 4 slides.
-A practical app would be awesome!
-Make sure that you can revisit in the rest of this lesson.</p:text>
-  </p:cm>
-</p:cmLst>
-</file>
-
-<file path=ppt/comments/comment2.xml><?xml version="1.0" encoding="utf-8"?>
-<p:cmLst xmlns:a="http://schemas.openxmlformats.org/drawingml/2006/main" xmlns:r="http://schemas.openxmlformats.org/officeDocument/2006/relationships" xmlns:p="http://schemas.openxmlformats.org/presentationml/2006/main">
-  <p:cm authorId="2" dt="2016-06-08T16:22:58.951" idx="2">
-    <p:pos x="-5" y="10"/>
-    <p:text>Revisit example</p:text>
-  </p:cm>
-</p:cmLst>
-</file>
-
-<file path=ppt/comments/comment3.xml><?xml version="1.0" encoding="utf-8"?>
-<p:cmLst xmlns:a="http://schemas.openxmlformats.org/drawingml/2006/main" xmlns:r="http://schemas.openxmlformats.org/officeDocument/2006/relationships" xmlns:p="http://schemas.openxmlformats.org/presentationml/2006/main">
-  <p:cm authorId="2" dt="2016-06-08T16:24:55.882" idx="3">
-    <p:pos x="-5" y="10"/>
-    <p:text>Revisit example again tying in the concepts just visited. 
-Make sure you tie it all together showing the end result here!</p:text>
-  </p:cm>
-</p:cmLst>
 </file>
 
 <file path=ppt/notesMasters/notesMaster1.xml><?xml version="1.0" encoding="utf-8"?>
@@ -259,7 +233,7 @@
             <a:fld id="{49B60EF2-7028-489F-85D8-FE86CD7CF2A0}" type="datetimeFigureOut">
               <a:rPr lang="en-US" smtClean="0"/>
               <a:pPr/>
-              <a:t>6/8/16</a:t>
+              <a:t>6/29/16</a:t>
             </a:fld>
             <a:endParaRPr lang="en-US"/>
           </a:p>
@@ -674,11 +648,11 @@
               <a:defRPr/>
             </a:pPr>
             <a:r>
-              <a:rPr lang="en-US" altLang="ko-KR" b="1" dirty="0" smtClean="0"/>
+              <a:rPr lang="en-US" altLang="ko-KR" b="1" dirty="0"/>
               <a:t>References</a:t>
             </a:r>
             <a:r>
-              <a:rPr lang="en-US" altLang="ko-KR" dirty="0" smtClean="0"/>
+              <a:rPr lang="en-US" altLang="ko-KR" dirty="0"/>
               <a:t>:</a:t>
             </a:r>
           </a:p>
@@ -701,12 +675,8 @@
               <a:defRPr/>
             </a:pPr>
             <a:r>
-              <a:rPr lang="en-US" altLang="ko-KR" dirty="0" smtClean="0"/>
-              <a:t>https</a:t>
-            </a:r>
-            <a:r>
               <a:rPr lang="en-US" altLang="ko-KR" dirty="0"/>
-              <a:t>://spark.apache.org/docs/latest/ml-guide.html</a:t>
+              <a:t>https://spark.apache.org/docs/latest/ml-guide.html</a:t>
             </a:r>
           </a:p>
         </p:txBody>
@@ -793,18 +763,13 @@
           <a:lstStyle/>
           <a:p>
             <a:r>
-              <a:rPr lang="en-US" b="1" dirty="0" smtClean="0"/>
+              <a:rPr lang="en-US" b="1" dirty="0"/>
               <a:t>References</a:t>
             </a:r>
             <a:r>
-              <a:rPr lang="en-US" dirty="0" smtClean="0"/>
-              <a:t>:</a:t>
-            </a:r>
-            <a:r>
               <a:rPr lang="en-US" dirty="0"/>
-              <a:t>	</a:t>
-            </a:r>
-            <a:endParaRPr lang="en-US" dirty="0" smtClean="0"/>
+              <a:t>:	</a:t>
+            </a:r>
           </a:p>
           <a:p>
             <a:pPr marL="171450" indent="-171450">
@@ -812,16 +777,8 @@
               <a:buChar char="•"/>
             </a:pPr>
             <a:r>
-              <a:rPr lang="en-US" dirty="0" smtClean="0"/>
-              <a:t>https</a:t>
-            </a:r>
-            <a:r>
               <a:rPr lang="en-US" dirty="0"/>
-              <a:t>://azure.microsoft.com/en-us/documentation/articles/hdinsight-apache-spark-overview</a:t>
-            </a:r>
-            <a:r>
-              <a:rPr lang="en-US" dirty="0" smtClean="0"/>
-              <a:t>/</a:t>
+              <a:t>https://azure.microsoft.com/en-us/documentation/articles/hdinsight-apache-spark-overview/</a:t>
             </a:r>
           </a:p>
           <a:p>
@@ -830,67 +787,67 @@
               <a:buChar char="•"/>
             </a:pPr>
             <a:r>
-              <a:rPr lang="en-US" dirty="0" smtClean="0"/>
+              <a:rPr lang="en-US" dirty="0"/>
               <a:t>Image Source: https://</a:t>
             </a:r>
             <a:r>
-              <a:rPr lang="en-US" dirty="0" err="1" smtClean="0"/>
+              <a:rPr lang="en-US" dirty="0" err="1"/>
               <a:t>acom.azurecomcdn.net</a:t>
             </a:r>
             <a:r>
-              <a:rPr lang="en-US" dirty="0" smtClean="0"/>
+              <a:rPr lang="en-US" dirty="0"/>
               <a:t>/80C57D/</a:t>
             </a:r>
             <a:r>
-              <a:rPr lang="en-US" dirty="0" err="1" smtClean="0"/>
+              <a:rPr lang="en-US" dirty="0" err="1"/>
               <a:t>cdn</a:t>
             </a:r>
             <a:r>
-              <a:rPr lang="en-US" dirty="0" smtClean="0"/>
+              <a:rPr lang="en-US" dirty="0"/>
               <a:t>/</a:t>
             </a:r>
             <a:r>
-              <a:rPr lang="en-US" dirty="0" err="1" smtClean="0"/>
+              <a:rPr lang="en-US" dirty="0" err="1"/>
               <a:t>mediahandler</a:t>
             </a:r>
             <a:r>
-              <a:rPr lang="en-US" dirty="0" smtClean="0"/>
+              <a:rPr lang="en-US" dirty="0"/>
               <a:t>/</a:t>
             </a:r>
             <a:r>
-              <a:rPr lang="en-US" dirty="0" err="1" smtClean="0"/>
+              <a:rPr lang="en-US" dirty="0" err="1"/>
               <a:t>docarticles</a:t>
             </a:r>
             <a:r>
-              <a:rPr lang="en-US" dirty="0" smtClean="0"/>
+              <a:rPr lang="en-US" dirty="0"/>
               <a:t>/</a:t>
             </a:r>
             <a:r>
-              <a:rPr lang="en-US" dirty="0" err="1" smtClean="0"/>
+              <a:rPr lang="en-US" dirty="0" err="1"/>
               <a:t>dpsmedia</a:t>
             </a:r>
             <a:r>
-              <a:rPr lang="en-US" dirty="0" smtClean="0"/>
+              <a:rPr lang="en-US" dirty="0"/>
               <a:t>-prod/</a:t>
             </a:r>
             <a:r>
-              <a:rPr lang="en-US" dirty="0" err="1" smtClean="0"/>
+              <a:rPr lang="en-US" dirty="0" err="1"/>
               <a:t>azure.microsoft.com</a:t>
             </a:r>
             <a:r>
-              <a:rPr lang="en-US" dirty="0" smtClean="0"/>
+              <a:rPr lang="en-US" dirty="0"/>
               <a:t>/en-us/documentation/articles/</a:t>
             </a:r>
             <a:r>
-              <a:rPr lang="en-US" dirty="0" err="1" smtClean="0"/>
+              <a:rPr lang="en-US" dirty="0" err="1"/>
               <a:t>hdinsight</a:t>
             </a:r>
             <a:r>
-              <a:rPr lang="en-US" dirty="0" smtClean="0"/>
+              <a:rPr lang="en-US" dirty="0"/>
               <a:t>-apache-spark-overview/20160603100044/</a:t>
             </a:r>
             <a:r>
-              <a:rPr lang="en-US" dirty="0" err="1" smtClean="0"/>
+              <a:rPr lang="en-US" dirty="0" err="1"/>
               <a:t>hdispark.architecture.png</a:t>
             </a:r>
             <a:endParaRPr lang="en-US" dirty="0"/>
@@ -915,7 +872,7 @@
             <a:fld id="{01283FAC-A721-45A3-BBDE-EAF2B09B7CD9}" type="slidenum">
               <a:rPr lang="en-US" smtClean="0"/>
               <a:pPr/>
-              <a:t>14</a:t>
+              <a:t>13</a:t>
             </a:fld>
             <a:endParaRPr lang="en-US"/>
           </a:p>
@@ -996,7 +953,7 @@
               <a:defRPr/>
             </a:pPr>
             <a:r>
-              <a:rPr lang="en-US" altLang="ko-KR" b="1" dirty="0" smtClean="0"/>
+              <a:rPr lang="en-US" altLang="ko-KR" b="1" dirty="0"/>
               <a:t>Notes:</a:t>
             </a:r>
           </a:p>
@@ -1019,14 +976,14 @@
               <a:defRPr/>
             </a:pPr>
             <a:r>
-              <a:rPr lang="en-US" altLang="ko-KR" b="1" dirty="0" smtClean="0"/>
+              <a:rPr lang="en-US" altLang="ko-KR" b="1" dirty="0"/>
               <a:t> </a:t>
             </a:r>
             <a:r>
-              <a:rPr lang="en-US" altLang="ko-KR" b="0" dirty="0" smtClean="0"/>
+              <a:rPr lang="en-US" altLang="ko-KR" b="0" dirty="0"/>
               <a:t>Scenarios include:</a:t>
             </a:r>
-            <a:endParaRPr lang="en-US" altLang="ko-KR" b="1" dirty="0" smtClean="0"/>
+            <a:endParaRPr lang="en-US" altLang="ko-KR" b="1" dirty="0"/>
           </a:p>
           <a:p>
             <a:pPr marL="800100" lvl="1" indent="-342900">
@@ -1040,11 +997,11 @@
               <a:buChar char="§"/>
             </a:pPr>
             <a:r>
-              <a:rPr lang="en-US" altLang="ko-KR" b="0" dirty="0" smtClean="0"/>
+              <a:rPr lang="en-US" altLang="ko-KR" b="0" dirty="0"/>
               <a:t> </a:t>
             </a:r>
             <a:r>
-              <a:rPr lang="en-US" sz="2400" dirty="0" smtClean="0"/>
+              <a:rPr lang="en-US" sz="2400" dirty="0"/>
               <a:t>Behavior tracking in mobile apps</a:t>
             </a:r>
           </a:p>
@@ -1060,7 +1017,7 @@
               </a:tabLst>
             </a:pPr>
             <a:r>
-              <a:rPr lang="en-US" sz="2400" dirty="0" smtClean="0"/>
+              <a:rPr lang="en-US" sz="2400" dirty="0"/>
               <a:t>Game event capture in console games</a:t>
             </a:r>
           </a:p>
@@ -1076,14 +1033,14 @@
               </a:tabLst>
             </a:pPr>
             <a:r>
-              <a:rPr lang="en-US" sz="2400" dirty="0" smtClean="0"/>
+              <a:rPr lang="en-US" sz="2400" dirty="0"/>
               <a:t>Telemetry data collected from </a:t>
             </a:r>
             <a:r>
-              <a:rPr lang="en-US" sz="2400" dirty="0" err="1" smtClean="0"/>
+              <a:rPr lang="en-US" sz="2400" dirty="0" err="1"/>
               <a:t>IoT</a:t>
             </a:r>
-            <a:endParaRPr lang="en-US" sz="800" dirty="0" smtClean="0"/>
+            <a:endParaRPr lang="en-US" sz="800" dirty="0"/>
           </a:p>
           <a:p>
             <a:pPr marL="0" marR="0" lvl="0" indent="0" algn="l" defTabSz="914400" rtl="0" eaLnBrk="1" fontAlgn="auto" latinLnBrk="0" hangingPunct="1">
@@ -1103,7 +1060,7 @@
               <a:tabLst/>
               <a:defRPr/>
             </a:pPr>
-            <a:endParaRPr lang="en-US" altLang="ko-KR" b="1" dirty="0" smtClean="0"/>
+            <a:endParaRPr lang="en-US" altLang="ko-KR" b="1" dirty="0"/>
           </a:p>
           <a:p>
             <a:pPr marL="0" marR="0" lvl="0" indent="0" algn="l" defTabSz="914400" rtl="0" eaLnBrk="1" fontAlgn="auto" latinLnBrk="0" hangingPunct="1">
@@ -1124,18 +1081,13 @@
               <a:defRPr/>
             </a:pPr>
             <a:r>
-              <a:rPr lang="en-US" altLang="ko-KR" b="1" dirty="0" smtClean="0"/>
+              <a:rPr lang="en-US" altLang="ko-KR" b="1" dirty="0"/>
               <a:t>References</a:t>
             </a:r>
             <a:r>
-              <a:rPr lang="en-US" altLang="ko-KR" dirty="0" smtClean="0"/>
-              <a:t>:</a:t>
-            </a:r>
-            <a:r>
               <a:rPr lang="en-US" altLang="ko-KR" dirty="0"/>
-              <a:t>	</a:t>
-            </a:r>
-            <a:endParaRPr lang="en-US" altLang="ko-KR" dirty="0" smtClean="0"/>
+              <a:t>:	</a:t>
+            </a:r>
           </a:p>
           <a:p>
             <a:pPr marL="171450" marR="0" lvl="0" indent="-171450" algn="l" defTabSz="914400" rtl="0" eaLnBrk="1" fontAlgn="auto" latinLnBrk="0" hangingPunct="1">
@@ -1156,12 +1108,8 @@
               <a:defRPr/>
             </a:pPr>
             <a:r>
-              <a:rPr lang="en-US" altLang="ko-KR" dirty="0" smtClean="0"/>
-              <a:t>https</a:t>
-            </a:r>
-            <a:r>
               <a:rPr lang="en-US" altLang="ko-KR" dirty="0"/>
-              <a:t>://azure.microsoft.com/en-us/documentation/articles/hdinsight-apache-spark-overview/</a:t>
+              <a:t>https://azure.microsoft.com/en-us/documentation/articles/hdinsight-apache-spark-overview/</a:t>
             </a:r>
           </a:p>
           <a:p>
@@ -1183,12 +1131,8 @@
               <a:defRPr/>
             </a:pPr>
             <a:r>
-              <a:rPr lang="en-US" altLang="ko-KR" dirty="0" smtClean="0"/>
-              <a:t>https</a:t>
-            </a:r>
-            <a:r>
               <a:rPr lang="en-US" altLang="ko-KR" dirty="0"/>
-              <a:t>://azure.microsoft.com/en-us/documentation/articles/event-hubs-overview/</a:t>
+              <a:t>https://azure.microsoft.com/en-us/documentation/articles/event-hubs-overview/</a:t>
             </a:r>
           </a:p>
           <a:p>
@@ -1210,12 +1154,8 @@
               <a:defRPr/>
             </a:pPr>
             <a:r>
-              <a:rPr lang="en-US" altLang="ko-KR" dirty="0" smtClean="0"/>
-              <a:t>http</a:t>
-            </a:r>
-            <a:r>
               <a:rPr lang="en-US" altLang="ko-KR" dirty="0"/>
-              <a:t>://kafka.apache.org/</a:t>
+              <a:t>http://kafka.apache.org/</a:t>
             </a:r>
           </a:p>
         </p:txBody>
@@ -1238,7 +1178,7 @@
             <a:fld id="{01283FAC-A721-45A3-BBDE-EAF2B09B7CD9}" type="slidenum">
               <a:rPr lang="en-US" smtClean="0"/>
               <a:pPr/>
-              <a:t>15</a:t>
+              <a:t>14</a:t>
             </a:fld>
             <a:endParaRPr lang="en-US"/>
           </a:p>
@@ -1319,14 +1259,13 @@
               <a:defRPr/>
             </a:pPr>
             <a:r>
-              <a:rPr lang="en-US" altLang="ko-KR" b="1" dirty="0" smtClean="0"/>
+              <a:rPr lang="en-US" altLang="ko-KR" b="1" dirty="0"/>
               <a:t>References</a:t>
             </a:r>
             <a:r>
-              <a:rPr lang="en-US" altLang="ko-KR" dirty="0" smtClean="0"/>
+              <a:rPr lang="en-US" altLang="ko-KR" dirty="0"/>
               <a:t>:</a:t>
             </a:r>
-            <a:endParaRPr lang="en-US" altLang="ko-KR" dirty="0"/>
           </a:p>
           <a:p>
             <a:pPr marL="171450" marR="0" lvl="0" indent="-171450" algn="l" defTabSz="914400" rtl="0" eaLnBrk="1" fontAlgn="auto" latinLnBrk="0" hangingPunct="1">
@@ -1347,12 +1286,8 @@
               <a:defRPr/>
             </a:pPr>
             <a:r>
-              <a:rPr lang="en-US" altLang="ko-KR" dirty="0" smtClean="0"/>
-              <a:t>https</a:t>
-            </a:r>
-            <a:r>
               <a:rPr lang="en-US" altLang="ko-KR" dirty="0"/>
-              <a:t>://azure.microsoft.com/en-us/documentation/articles/hdinsight-apache-spark-overview/</a:t>
+              <a:t>https://azure.microsoft.com/en-us/documentation/articles/hdinsight-apache-spark-overview/</a:t>
             </a:r>
           </a:p>
         </p:txBody>
@@ -1375,7 +1310,7 @@
             <a:fld id="{01283FAC-A721-45A3-BBDE-EAF2B09B7CD9}" type="slidenum">
               <a:rPr lang="en-US" smtClean="0"/>
               <a:pPr/>
-              <a:t>16</a:t>
+              <a:t>15</a:t>
             </a:fld>
             <a:endParaRPr lang="en-US"/>
           </a:p>
@@ -1456,7 +1391,7 @@
               <a:defRPr/>
             </a:pPr>
             <a:r>
-              <a:rPr lang="en-US" altLang="ko-KR" b="1" dirty="0" smtClean="0"/>
+              <a:rPr lang="en-US" altLang="ko-KR" b="1" dirty="0"/>
               <a:t>References:</a:t>
             </a:r>
           </a:p>
@@ -1479,12 +1414,8 @@
               <a:defRPr/>
             </a:pPr>
             <a:r>
-              <a:rPr lang="en-US" altLang="ko-KR" dirty="0" smtClean="0"/>
-              <a:t>https</a:t>
-            </a:r>
-            <a:r>
               <a:rPr lang="en-US" altLang="ko-KR" dirty="0"/>
-              <a:t>://azure.microsoft.com/en-us/documentation/articles/hdinsight-apache-spark-overview/</a:t>
+              <a:t>https://azure.microsoft.com/en-us/documentation/articles/hdinsight-apache-spark-overview/</a:t>
             </a:r>
           </a:p>
           <a:p>
@@ -1506,12 +1437,8 @@
               <a:defRPr/>
             </a:pPr>
             <a:r>
-              <a:rPr lang="en-US" altLang="ko-KR" dirty="0" smtClean="0"/>
-              <a:t>https</a:t>
-            </a:r>
-            <a:r>
               <a:rPr lang="en-US" altLang="ko-KR" dirty="0"/>
-              <a:t>://docs.continuum.io/anaconda/index</a:t>
+              <a:t>https://docs.continuum.io/anaconda/index</a:t>
             </a:r>
           </a:p>
         </p:txBody>
@@ -1534,7 +1461,7 @@
             <a:fld id="{01283FAC-A721-45A3-BBDE-EAF2B09B7CD9}" type="slidenum">
               <a:rPr lang="en-US" smtClean="0"/>
               <a:pPr/>
-              <a:t>18</a:t>
+              <a:t>16</a:t>
             </a:fld>
             <a:endParaRPr lang="en-US"/>
           </a:p>
@@ -1615,7 +1542,7 @@
               <a:defRPr/>
             </a:pPr>
             <a:r>
-              <a:rPr lang="en-US" altLang="ko-KR" b="1" dirty="0" smtClean="0"/>
+              <a:rPr lang="en-US" altLang="ko-KR" b="1" dirty="0"/>
               <a:t>Notes:</a:t>
             </a:r>
           </a:p>
@@ -1638,7 +1565,7 @@
               <a:defRPr/>
             </a:pPr>
             <a:r>
-              <a:rPr kumimoji="0" lang="en-US" altLang="ko-KR" sz="1200" b="0" i="0" u="none" strike="noStrike" kern="1200" cap="none" spc="0" normalizeH="0" baseline="0" noProof="0" dirty="0" smtClean="0">
+              <a:rPr kumimoji="0" lang="en-US" altLang="ko-KR" sz="1200" b="0" i="0" u="none" strike="noStrike" kern="1200" cap="none" spc="0" normalizeH="0" baseline="0" noProof="0" dirty="0">
                 <a:ln>
                   <a:noFill/>
                 </a:ln>
@@ -1673,7 +1600,7 @@
               <a:tabLst/>
               <a:defRPr/>
             </a:pPr>
-            <a:endParaRPr lang="en-US" altLang="ko-KR" b="0" dirty="0" smtClean="0"/>
+            <a:endParaRPr lang="en-US" altLang="ko-KR" b="0" dirty="0"/>
           </a:p>
           <a:p>
             <a:pPr marL="0" marR="0" lvl="0" indent="0" algn="l" defTabSz="914400" rtl="0" eaLnBrk="1" fontAlgn="auto" latinLnBrk="0" hangingPunct="1">
@@ -1694,18 +1621,13 @@
               <a:defRPr/>
             </a:pPr>
             <a:r>
-              <a:rPr lang="en-US" altLang="ko-KR" b="1" dirty="0" smtClean="0"/>
+              <a:rPr lang="en-US" altLang="ko-KR" b="1" dirty="0"/>
               <a:t>References</a:t>
             </a:r>
             <a:r>
-              <a:rPr lang="en-US" altLang="ko-KR" dirty="0" smtClean="0"/>
-              <a:t>:</a:t>
-            </a:r>
-            <a:r>
               <a:rPr lang="en-US" altLang="ko-KR" dirty="0"/>
-              <a:t>	</a:t>
-            </a:r>
-            <a:endParaRPr lang="en-US" altLang="ko-KR" dirty="0" smtClean="0"/>
+              <a:t>:	</a:t>
+            </a:r>
           </a:p>
           <a:p>
             <a:pPr marL="171450" marR="0" lvl="0" indent="-171450" algn="l" defTabSz="914400" rtl="0" eaLnBrk="1" fontAlgn="auto" latinLnBrk="0" hangingPunct="1">
@@ -1726,12 +1648,8 @@
               <a:defRPr/>
             </a:pPr>
             <a:r>
-              <a:rPr lang="en-US" altLang="ko-KR" dirty="0" smtClean="0"/>
-              <a:t>https</a:t>
-            </a:r>
-            <a:r>
               <a:rPr lang="en-US" altLang="ko-KR" dirty="0"/>
-              <a:t>://azure.microsoft.com/en-us/documentation/articles/hdinsight-apache-spark-overview/</a:t>
+              <a:t>https://azure.microsoft.com/en-us/documentation/articles/hdinsight-apache-spark-overview/</a:t>
             </a:r>
           </a:p>
           <a:p>
@@ -1774,7 +1692,7 @@
             <a:fld id="{01283FAC-A721-45A3-BBDE-EAF2B09B7CD9}" type="slidenum">
               <a:rPr lang="en-US" smtClean="0"/>
               <a:pPr/>
-              <a:t>19</a:t>
+              <a:t>17</a:t>
             </a:fld>
             <a:endParaRPr lang="en-US"/>
           </a:p>
@@ -1855,7 +1773,7 @@
               <a:defRPr/>
             </a:pPr>
             <a:r>
-              <a:rPr lang="en-US" altLang="ko-KR" b="1" dirty="0" smtClean="0"/>
+              <a:rPr lang="en-US" altLang="ko-KR" b="1" dirty="0"/>
               <a:t>Notes:</a:t>
             </a:r>
           </a:p>
@@ -1878,23 +1796,23 @@
               <a:defRPr/>
             </a:pPr>
             <a:r>
-              <a:rPr lang="en-US" altLang="ko-KR" b="0" dirty="0" smtClean="0"/>
+              <a:rPr lang="en-US" altLang="ko-KR" b="0" dirty="0"/>
               <a:t>The URL to access </a:t>
             </a:r>
             <a:r>
-              <a:rPr lang="en-US" altLang="ko-KR" b="0" dirty="0" err="1" smtClean="0"/>
+              <a:rPr lang="en-US" altLang="ko-KR" b="0" dirty="0" err="1"/>
               <a:t>Jupyter</a:t>
             </a:r>
             <a:r>
-              <a:rPr lang="en-US" altLang="ko-KR" b="0" dirty="0" smtClean="0"/>
+              <a:rPr lang="en-US" altLang="ko-KR" b="0" dirty="0"/>
               <a:t> Notebook on Spark </a:t>
             </a:r>
             <a:r>
-              <a:rPr lang="en-US" altLang="ko-KR" b="0" dirty="0" err="1" smtClean="0"/>
+              <a:rPr lang="en-US" altLang="ko-KR" b="0" dirty="0" err="1"/>
               <a:t>HDInsight</a:t>
             </a:r>
             <a:r>
-              <a:rPr lang="en-US" altLang="ko-KR" b="0" dirty="0" smtClean="0"/>
+              <a:rPr lang="en-US" altLang="ko-KR" b="0" dirty="0"/>
               <a:t> clusters is https://CLUSTERNAME.azurehdinsight.net/jupyter.</a:t>
             </a:r>
           </a:p>
@@ -1917,18 +1835,18 @@
               <a:defRPr/>
             </a:pPr>
             <a:r>
-              <a:rPr lang="en-US" altLang="ko-KR" b="0" dirty="0" smtClean="0"/>
+              <a:rPr lang="en-US" altLang="ko-KR" b="0" dirty="0"/>
               <a:t>Replace CLUSTERNAME with the name of organization’s Spark </a:t>
             </a:r>
             <a:r>
-              <a:rPr lang="en-US" altLang="ko-KR" b="0" dirty="0" err="1" smtClean="0"/>
+              <a:rPr lang="en-US" altLang="ko-KR" b="0" dirty="0" err="1"/>
               <a:t>HDInsight</a:t>
             </a:r>
             <a:r>
-              <a:rPr lang="en-US" altLang="ko-KR" b="0" smtClean="0"/>
+              <a:rPr lang="en-US" altLang="ko-KR" b="0"/>
               <a:t> cluster.</a:t>
             </a:r>
-            <a:endParaRPr lang="en-US" altLang="ko-KR" b="0" dirty="0" smtClean="0"/>
+            <a:endParaRPr lang="en-US" altLang="ko-KR" b="0" dirty="0"/>
           </a:p>
           <a:p>
             <a:pPr marL="0" marR="0" lvl="0" indent="0" algn="l" defTabSz="914400" rtl="0" eaLnBrk="1" fontAlgn="auto" latinLnBrk="0" hangingPunct="1">
@@ -1948,7 +1866,7 @@
               <a:tabLst/>
               <a:defRPr/>
             </a:pPr>
-            <a:endParaRPr lang="en-US" altLang="ko-KR" b="1" dirty="0" smtClean="0"/>
+            <a:endParaRPr lang="en-US" altLang="ko-KR" b="1" dirty="0"/>
           </a:p>
           <a:p>
             <a:pPr marL="0" marR="0" lvl="0" indent="0" algn="l" defTabSz="914400" rtl="0" eaLnBrk="1" fontAlgn="auto" latinLnBrk="0" hangingPunct="1">
@@ -1969,7 +1887,7 @@
               <a:defRPr/>
             </a:pPr>
             <a:r>
-              <a:rPr lang="en-US" altLang="ko-KR" b="1" dirty="0" smtClean="0"/>
+              <a:rPr lang="en-US" altLang="ko-KR" b="1" dirty="0"/>
               <a:t>References:</a:t>
             </a:r>
           </a:p>
@@ -1992,12 +1910,8 @@
               <a:defRPr/>
             </a:pPr>
             <a:r>
-              <a:rPr lang="en-US" altLang="ko-KR" dirty="0" smtClean="0"/>
-              <a:t>https</a:t>
-            </a:r>
-            <a:r>
               <a:rPr lang="en-US" altLang="ko-KR" dirty="0"/>
-              <a:t>://azure.microsoft.com/en-us/documentation/articles/hdinsight-apache-spark-overview/</a:t>
+              <a:t>https://azure.microsoft.com/en-us/documentation/articles/hdinsight-apache-spark-overview/</a:t>
             </a:r>
           </a:p>
           <a:p>
@@ -2019,12 +1933,8 @@
               <a:defRPr/>
             </a:pPr>
             <a:r>
-              <a:rPr lang="en-US" altLang="ko-KR" dirty="0" smtClean="0"/>
-              <a:t>http</a:t>
-            </a:r>
-            <a:r>
               <a:rPr lang="en-US" altLang="ko-KR" dirty="0"/>
-              <a:t>://jupyter.org/</a:t>
+              <a:t>http://jupyter.org/</a:t>
             </a:r>
           </a:p>
         </p:txBody>
@@ -2047,7 +1957,7 @@
             <a:fld id="{01283FAC-A721-45A3-BBDE-EAF2B09B7CD9}" type="slidenum">
               <a:rPr lang="en-US" smtClean="0"/>
               <a:pPr/>
-              <a:t>20</a:t>
+              <a:t>18</a:t>
             </a:fld>
             <a:endParaRPr lang="en-US"/>
           </a:p>
@@ -2110,6 +2020,62 @@
           <a:bodyPr/>
           <a:lstStyle/>
           <a:p>
+            <a:pPr marL="0" indent="0">
+              <a:buFont typeface="Arial"/>
+              <a:buNone/>
+            </a:pPr>
+            <a:r>
+              <a:rPr lang="en-US" altLang="ko-KR" b="1" dirty="0" smtClean="0"/>
+              <a:t>Notes:</a:t>
+            </a:r>
+          </a:p>
+          <a:p>
+            <a:pPr marL="171450" indent="-171450">
+              <a:buFont typeface="Arial"/>
+              <a:buChar char="•"/>
+            </a:pPr>
+            <a:r>
+              <a:rPr lang="en-US" altLang="ko-KR" dirty="0" smtClean="0"/>
+              <a:t>The Module</a:t>
+            </a:r>
+            <a:r>
+              <a:rPr lang="en-US" altLang="ko-KR" baseline="0" dirty="0" smtClean="0"/>
+              <a:t> 5 Lesson 3 lab should be completed at this time:</a:t>
+            </a:r>
+          </a:p>
+          <a:p>
+            <a:pPr marL="628650" lvl="1" indent="-171450">
+              <a:buFont typeface="Arial"/>
+              <a:buChar char="•"/>
+            </a:pPr>
+            <a:r>
+              <a:rPr lang="en-US" altLang="ko-KR" dirty="0" smtClean="0"/>
+              <a:t>https://</a:t>
+            </a:r>
+            <a:r>
+              <a:rPr lang="en-US" altLang="ko-KR" dirty="0" err="1" smtClean="0"/>
+              <a:t>github.com</a:t>
+            </a:r>
+            <a:r>
+              <a:rPr lang="en-US" altLang="ko-KR" dirty="0" smtClean="0"/>
+              <a:t>/</a:t>
+            </a:r>
+            <a:r>
+              <a:rPr lang="en-US" altLang="ko-KR" dirty="0" err="1" smtClean="0"/>
+              <a:t>MSFTImagine</a:t>
+            </a:r>
+            <a:r>
+              <a:rPr lang="en-US" altLang="ko-KR" dirty="0" smtClean="0"/>
+              <a:t>/</a:t>
+            </a:r>
+            <a:r>
+              <a:rPr lang="en-US" altLang="ko-KR" dirty="0" err="1" smtClean="0"/>
+              <a:t>computerscience</a:t>
+            </a:r>
+            <a:r>
+              <a:rPr lang="en-US" altLang="ko-KR" dirty="0" smtClean="0"/>
+              <a:t>/tree/master/Instructor-Led/Module5/Labs</a:t>
+            </a:r>
             <a:endParaRPr lang="ko-KR" altLang="en-US" dirty="0"/>
           </a:p>
         </p:txBody>
@@ -2132,7 +2098,7 @@
             <a:fld id="{01283FAC-A721-45A3-BBDE-EAF2B09B7CD9}" type="slidenum">
               <a:rPr lang="en-US" smtClean="0"/>
               <a:pPr/>
-              <a:t>22</a:t>
+              <a:t>19</a:t>
             </a:fld>
             <a:endParaRPr lang="en-US"/>
           </a:p>
@@ -2383,11 +2349,11 @@
               <a:defRPr/>
             </a:pPr>
             <a:r>
-              <a:rPr lang="en-US" altLang="ko-KR" b="1" dirty="0" smtClean="0"/>
+              <a:rPr lang="en-US" altLang="ko-KR" b="1" dirty="0"/>
               <a:t>References</a:t>
             </a:r>
             <a:r>
-              <a:rPr lang="en-US" altLang="ko-KR" dirty="0" smtClean="0"/>
+              <a:rPr lang="en-US" altLang="ko-KR" dirty="0"/>
               <a:t>:</a:t>
             </a:r>
           </a:p>
@@ -2410,12 +2376,8 @@
               <a:defRPr/>
             </a:pPr>
             <a:r>
-              <a:rPr lang="en-US" altLang="ko-KR" dirty="0" smtClean="0"/>
-              <a:t>https</a:t>
-            </a:r>
-            <a:r>
               <a:rPr lang="en-US" altLang="ko-KR" dirty="0"/>
-              <a:t>://spark.apache.org/docs/latest/ml-guide.html</a:t>
+              <a:t>https://spark.apache.org/docs/latest/ml-guide.html</a:t>
             </a:r>
           </a:p>
           <a:p>
@@ -2539,11 +2501,11 @@
               <a:defRPr/>
             </a:pPr>
             <a:r>
-              <a:rPr lang="en-US" altLang="ko-KR" b="1" dirty="0" smtClean="0"/>
+              <a:rPr lang="en-US" altLang="ko-KR" b="1" dirty="0"/>
               <a:t>References</a:t>
             </a:r>
             <a:r>
-              <a:rPr lang="en-US" altLang="ko-KR" dirty="0" smtClean="0"/>
+              <a:rPr lang="en-US" altLang="ko-KR" dirty="0"/>
               <a:t>: </a:t>
             </a:r>
           </a:p>
@@ -2566,12 +2528,8 @@
               <a:defRPr/>
             </a:pPr>
             <a:r>
-              <a:rPr lang="en-US" altLang="ko-KR" dirty="0" smtClean="0"/>
-              <a:t>https</a:t>
-            </a:r>
-            <a:r>
               <a:rPr lang="en-US" altLang="ko-KR" dirty="0"/>
-              <a:t>://spark.apache.org/docs/latest/ml-guide.html</a:t>
+              <a:t>https://spark.apache.org/docs/latest/ml-guide.html</a:t>
             </a:r>
           </a:p>
         </p:txBody>
@@ -2675,10 +2633,10 @@
               <a:defRPr/>
             </a:pPr>
             <a:r>
-              <a:rPr lang="en-US" altLang="ko-KR" b="1" dirty="0" smtClean="0"/>
+              <a:rPr lang="en-US" altLang="ko-KR" b="1" dirty="0"/>
               <a:t>Notes:</a:t>
             </a:r>
-            <a:endParaRPr lang="en-US" altLang="ko-KR" b="0" dirty="0" smtClean="0"/>
+            <a:endParaRPr lang="en-US" altLang="ko-KR" b="0" dirty="0"/>
           </a:p>
           <a:p>
             <a:pPr marL="0" marR="0" lvl="0" indent="0" algn="l" defTabSz="914400" rtl="0" eaLnBrk="1" fontAlgn="auto" latinLnBrk="0" hangingPunct="1">
@@ -2699,15 +2657,15 @@
               <a:defRPr/>
             </a:pPr>
             <a:r>
-              <a:rPr lang="en-US" sz="1200" dirty="0" smtClean="0"/>
+              <a:rPr lang="en-US" sz="1200" dirty="0"/>
               <a:t> Columns in a </a:t>
             </a:r>
             <a:r>
-              <a:rPr lang="en-US" sz="1200" dirty="0" err="1" smtClean="0"/>
+              <a:rPr lang="en-US" sz="1200" dirty="0" err="1"/>
               <a:t>DataFrame</a:t>
             </a:r>
             <a:r>
-              <a:rPr lang="en-US" sz="1200" dirty="0" smtClean="0"/>
+              <a:rPr lang="en-US" sz="1200" dirty="0"/>
               <a:t> are named.  For example, they can be “text”, “features”, and “truth label” .</a:t>
             </a:r>
           </a:p>
@@ -2729,7 +2687,7 @@
               <a:tabLst/>
               <a:defRPr/>
             </a:pPr>
-            <a:endParaRPr lang="en-US" altLang="ko-KR" b="1" dirty="0" smtClean="0"/>
+            <a:endParaRPr lang="en-US" altLang="ko-KR" b="1" dirty="0"/>
           </a:p>
           <a:p>
             <a:pPr marL="0" marR="0" lvl="0" indent="0" algn="l" defTabSz="914400" rtl="0" eaLnBrk="1" fontAlgn="auto" latinLnBrk="0" hangingPunct="1">
@@ -2750,11 +2708,11 @@
               <a:defRPr/>
             </a:pPr>
             <a:r>
-              <a:rPr lang="en-US" altLang="ko-KR" b="1" dirty="0" smtClean="0"/>
+              <a:rPr lang="en-US" altLang="ko-KR" b="1" dirty="0"/>
               <a:t>Reference</a:t>
             </a:r>
             <a:r>
-              <a:rPr lang="en-US" altLang="ko-KR" dirty="0" smtClean="0"/>
+              <a:rPr lang="en-US" altLang="ko-KR" dirty="0"/>
               <a:t>: </a:t>
             </a:r>
           </a:p>
@@ -2777,12 +2735,8 @@
               <a:defRPr/>
             </a:pPr>
             <a:r>
-              <a:rPr lang="en-US" altLang="ko-KR" dirty="0" smtClean="0"/>
-              <a:t>https</a:t>
-            </a:r>
-            <a:r>
               <a:rPr lang="en-US" altLang="ko-KR" dirty="0"/>
-              <a:t>://spark.apache.org/docs/latest/ml-guide.html</a:t>
+              <a:t>https://spark.apache.org/docs/latest/ml-guide.html</a:t>
             </a:r>
           </a:p>
         </p:txBody>
@@ -2886,7 +2840,7 @@
               <a:defRPr/>
             </a:pPr>
             <a:r>
-              <a:rPr lang="en-US" altLang="ko-KR" b="1" dirty="0" smtClean="0"/>
+              <a:rPr lang="en-US" altLang="ko-KR" b="1" dirty="0"/>
               <a:t>Notes:</a:t>
             </a:r>
           </a:p>
@@ -2909,19 +2863,19 @@
               <a:defRPr/>
             </a:pPr>
             <a:r>
-              <a:rPr lang="en-US" altLang="ko-KR" b="0" baseline="0" dirty="0" smtClean="0"/>
+              <a:rPr lang="en-US" altLang="ko-KR" b="0" baseline="0" dirty="0"/>
               <a:t> The transform() method </a:t>
             </a:r>
             <a:r>
-              <a:rPr lang="en-US" sz="1200" dirty="0" smtClean="0"/>
+              <a:rPr lang="en-US" sz="1200" dirty="0"/>
               <a:t>converts one </a:t>
             </a:r>
             <a:r>
-              <a:rPr lang="en-US" sz="1200" dirty="0" err="1" smtClean="0"/>
+              <a:rPr lang="en-US" sz="1200" dirty="0" err="1"/>
               <a:t>DataFrame</a:t>
             </a:r>
             <a:r>
-              <a:rPr lang="en-US" sz="1200" dirty="0" smtClean="0"/>
+              <a:rPr lang="en-US" sz="1200" dirty="0"/>
               <a:t> into another, generally by appending columns.</a:t>
             </a:r>
           </a:p>
@@ -2944,27 +2898,27 @@
               <a:defRPr/>
             </a:pPr>
             <a:r>
-              <a:rPr lang="en-US" altLang="ko-KR" sz="1200" b="0" dirty="0" smtClean="0"/>
+              <a:rPr lang="en-US" altLang="ko-KR" sz="1200" b="0" dirty="0"/>
               <a:t>  The feature transformer t</a:t>
             </a:r>
             <a:r>
-              <a:rPr lang="en-US" sz="1200" dirty="0" smtClean="0"/>
+              <a:rPr lang="en-US" sz="1200" dirty="0"/>
               <a:t>akes a </a:t>
             </a:r>
             <a:r>
-              <a:rPr lang="en-US" sz="1200" dirty="0" err="1" smtClean="0"/>
+              <a:rPr lang="en-US" sz="1200" dirty="0" err="1"/>
               <a:t>DataFrame</a:t>
             </a:r>
             <a:r>
-              <a:rPr lang="en-US" sz="1200" dirty="0" smtClean="0"/>
+              <a:rPr lang="en-US" sz="1200" dirty="0"/>
               <a:t>, reads a column (text), maps it into a new column (feature vector), and outputs a new </a:t>
             </a:r>
             <a:r>
-              <a:rPr lang="en-US" sz="1200" dirty="0" err="1" smtClean="0"/>
+              <a:rPr lang="en-US" sz="1200" dirty="0" err="1"/>
               <a:t>DataFrame</a:t>
             </a:r>
             <a:r>
-              <a:rPr lang="en-US" sz="1200" dirty="0" smtClean="0"/>
+              <a:rPr lang="en-US" sz="1200" dirty="0"/>
               <a:t> with the mapped column appended.</a:t>
             </a:r>
           </a:p>
@@ -2987,27 +2941,27 @@
               <a:defRPr/>
             </a:pPr>
             <a:r>
-              <a:rPr lang="en-US" altLang="ko-KR" sz="1200" b="0" dirty="0" smtClean="0"/>
+              <a:rPr lang="en-US" altLang="ko-KR" sz="1200" b="0" dirty="0"/>
               <a:t> The learning model takes a </a:t>
             </a:r>
             <a:r>
-              <a:rPr lang="en-US" altLang="ko-KR" sz="1200" b="0" dirty="0" err="1" smtClean="0"/>
+              <a:rPr lang="en-US" altLang="ko-KR" sz="1200" b="0" dirty="0" err="1"/>
               <a:t>DataFrame</a:t>
             </a:r>
             <a:r>
-              <a:rPr lang="en-US" altLang="ko-KR" sz="1200" b="0" dirty="0" smtClean="0"/>
+              <a:rPr lang="en-US" altLang="ko-KR" sz="1200" b="0" dirty="0"/>
               <a:t>,</a:t>
             </a:r>
             <a:r>
-              <a:rPr lang="en-US" altLang="ko-KR" sz="1200" b="0" baseline="0" dirty="0" smtClean="0"/>
+              <a:rPr lang="en-US" altLang="ko-KR" sz="1200" b="0" baseline="0" dirty="0"/>
               <a:t> reads the column containing the feature vectors, predicts a label for each feature vector, and outputs a new </a:t>
             </a:r>
             <a:r>
-              <a:rPr lang="en-US" altLang="ko-KR" sz="1200" b="0" baseline="0" dirty="0" err="1" smtClean="0"/>
+              <a:rPr lang="en-US" altLang="ko-KR" sz="1200" b="0" baseline="0" dirty="0" err="1"/>
               <a:t>DataFrame</a:t>
             </a:r>
             <a:r>
-              <a:rPr lang="en-US" altLang="ko-KR" sz="1200" b="0" baseline="0" dirty="0" smtClean="0"/>
+              <a:rPr lang="en-US" altLang="ko-KR" sz="1200" b="0" baseline="0" dirty="0"/>
               <a:t> with predicted labels appended.</a:t>
             </a:r>
           </a:p>
@@ -3029,7 +2983,7 @@
               <a:tabLst/>
               <a:defRPr/>
             </a:pPr>
-            <a:endParaRPr lang="en-US" altLang="ko-KR" b="0" dirty="0" smtClean="0"/>
+            <a:endParaRPr lang="en-US" altLang="ko-KR" b="0" dirty="0"/>
           </a:p>
           <a:p>
             <a:pPr marL="0" marR="0" lvl="0" indent="0" algn="l" defTabSz="914400" rtl="0" eaLnBrk="1" fontAlgn="auto" latinLnBrk="0" hangingPunct="1">
@@ -3050,11 +3004,11 @@
               <a:defRPr/>
             </a:pPr>
             <a:r>
-              <a:rPr lang="en-US" altLang="ko-KR" b="1" dirty="0" smtClean="0"/>
+              <a:rPr lang="en-US" altLang="ko-KR" b="1" dirty="0"/>
               <a:t>Reference</a:t>
             </a:r>
             <a:r>
-              <a:rPr lang="en-US" altLang="ko-KR" dirty="0" smtClean="0"/>
+              <a:rPr lang="en-US" altLang="ko-KR" dirty="0"/>
               <a:t>: </a:t>
             </a:r>
           </a:p>
@@ -3077,12 +3031,8 @@
               <a:defRPr/>
             </a:pPr>
             <a:r>
-              <a:rPr lang="en-US" altLang="ko-KR" dirty="0" smtClean="0"/>
-              <a:t>https</a:t>
-            </a:r>
-            <a:r>
               <a:rPr lang="en-US" altLang="ko-KR" dirty="0"/>
-              <a:t>://spark.apache.org/docs/latest/ml-guide.html</a:t>
+              <a:t>https://spark.apache.org/docs/latest/ml-guide.html</a:t>
             </a:r>
           </a:p>
         </p:txBody>
@@ -3186,10 +3136,10 @@
               <a:defRPr/>
             </a:pPr>
             <a:r>
-              <a:rPr lang="en-US" altLang="ko-KR" b="1" dirty="0" smtClean="0"/>
+              <a:rPr lang="en-US" altLang="ko-KR" b="1" dirty="0"/>
               <a:t>Notes:</a:t>
             </a:r>
-            <a:endParaRPr lang="en-US" altLang="ko-KR" b="0" dirty="0" smtClean="0"/>
+            <a:endParaRPr lang="en-US" altLang="ko-KR" b="0" dirty="0"/>
           </a:p>
           <a:p>
             <a:pPr marL="0" marR="0" lvl="0" indent="0" algn="l" defTabSz="914400" rtl="0" eaLnBrk="1" fontAlgn="auto" latinLnBrk="0" hangingPunct="1">
@@ -3210,22 +3160,22 @@
               <a:defRPr/>
             </a:pPr>
             <a:r>
-              <a:rPr lang="en-US" altLang="ko-KR" b="0" dirty="0" smtClean="0"/>
+              <a:rPr lang="en-US" altLang="ko-KR" b="0" dirty="0"/>
               <a:t> The fit() method </a:t>
             </a:r>
             <a:r>
-              <a:rPr lang="en-US" sz="1200" dirty="0" smtClean="0"/>
+              <a:rPr lang="en-US" sz="1200" dirty="0"/>
               <a:t>accepts a </a:t>
             </a:r>
             <a:r>
-              <a:rPr lang="en-US" sz="1200" dirty="0" err="1" smtClean="0"/>
+              <a:rPr lang="en-US" sz="1200" dirty="0" err="1"/>
               <a:t>DataFrame</a:t>
             </a:r>
             <a:r>
-              <a:rPr lang="en-US" sz="1200" dirty="0" smtClean="0"/>
+              <a:rPr lang="en-US" sz="1200" dirty="0"/>
               <a:t> and produces a model, which is a Transformer.</a:t>
             </a:r>
-            <a:endParaRPr lang="en-US" altLang="ko-KR" b="1" dirty="0" smtClean="0"/>
+            <a:endParaRPr lang="en-US" altLang="ko-KR" b="1" dirty="0"/>
           </a:p>
           <a:p>
             <a:pPr marL="0" marR="0" lvl="0" indent="0" algn="l" defTabSz="914400" rtl="0" eaLnBrk="1" fontAlgn="auto" latinLnBrk="0" hangingPunct="1">
@@ -3245,7 +3195,7 @@
               <a:tabLst/>
               <a:defRPr/>
             </a:pPr>
-            <a:endParaRPr lang="en-US" altLang="ko-KR" b="1" dirty="0" smtClean="0"/>
+            <a:endParaRPr lang="en-US" altLang="ko-KR" b="1" dirty="0"/>
           </a:p>
           <a:p>
             <a:pPr marL="0" marR="0" lvl="0" indent="0" algn="l" defTabSz="914400" rtl="0" eaLnBrk="1" fontAlgn="auto" latinLnBrk="0" hangingPunct="1">
@@ -3266,11 +3216,11 @@
               <a:defRPr/>
             </a:pPr>
             <a:r>
-              <a:rPr lang="en-US" altLang="ko-KR" b="1" dirty="0" smtClean="0"/>
+              <a:rPr lang="en-US" altLang="ko-KR" b="1" dirty="0"/>
               <a:t>Reference</a:t>
             </a:r>
             <a:r>
-              <a:rPr lang="en-US" altLang="ko-KR" dirty="0" smtClean="0"/>
+              <a:rPr lang="en-US" altLang="ko-KR" dirty="0"/>
               <a:t>: </a:t>
             </a:r>
           </a:p>
@@ -3293,12 +3243,8 @@
               <a:defRPr/>
             </a:pPr>
             <a:r>
-              <a:rPr lang="en-US" altLang="ko-KR" dirty="0" smtClean="0"/>
-              <a:t>https</a:t>
-            </a:r>
-            <a:r>
               <a:rPr lang="en-US" altLang="ko-KR" dirty="0"/>
-              <a:t>://spark.apache.org/docs/latest/ml-guide.html</a:t>
+              <a:t>https://spark.apache.org/docs/latest/ml-guide.html</a:t>
             </a:r>
           </a:p>
         </p:txBody>
@@ -3402,10 +3348,9 @@
               <a:defRPr/>
             </a:pPr>
             <a:r>
-              <a:rPr lang="en-US" altLang="ko-KR" b="1" dirty="0" smtClean="0"/>
+              <a:rPr lang="en-US" altLang="ko-KR" b="1" dirty="0"/>
               <a:t>Notes:</a:t>
             </a:r>
-            <a:endParaRPr lang="en-US" altLang="ko-KR" b="1" dirty="0"/>
           </a:p>
           <a:p>
             <a:pPr marL="171450" marR="0" lvl="0" indent="-171450" algn="l" defTabSz="914400" rtl="0" eaLnBrk="1" fontAlgn="auto" latinLnBrk="0" hangingPunct="1">
@@ -3516,11 +3461,7 @@
             </a:pPr>
             <a:r>
               <a:rPr lang="en-US" altLang="ko-KR" baseline="0" dirty="0"/>
-              <a:t>The Feature Vectors are fitted to a logistic regression estimator that finally produces a logistic regression model </a:t>
-            </a:r>
-            <a:r>
-              <a:rPr lang="en-US" altLang="ko-KR" baseline="0" dirty="0" smtClean="0"/>
-              <a:t>transformer</a:t>
+              <a:t>The Feature Vectors are fitted to a logistic regression estimator that finally produces a logistic regression model transformer</a:t>
             </a:r>
           </a:p>
           <a:p>
@@ -3541,7 +3482,7 @@
               <a:tabLst/>
               <a:defRPr/>
             </a:pPr>
-            <a:endParaRPr lang="en-US" altLang="ko-KR" baseline="0" dirty="0" smtClean="0"/>
+            <a:endParaRPr lang="en-US" altLang="ko-KR" baseline="0" dirty="0"/>
           </a:p>
           <a:p>
             <a:pPr marL="0" marR="0" lvl="0" indent="0" algn="l" defTabSz="914400" rtl="0" eaLnBrk="1" fontAlgn="auto" latinLnBrk="0" hangingPunct="1">
@@ -3562,11 +3503,11 @@
               <a:defRPr/>
             </a:pPr>
             <a:r>
-              <a:rPr lang="en-US" altLang="ko-KR" b="1" dirty="0" smtClean="0"/>
+              <a:rPr lang="en-US" altLang="ko-KR" b="1" dirty="0"/>
               <a:t>References</a:t>
             </a:r>
             <a:r>
-              <a:rPr lang="en-US" altLang="ko-KR" dirty="0" smtClean="0"/>
+              <a:rPr lang="en-US" altLang="ko-KR" dirty="0"/>
               <a:t>: 	</a:t>
             </a:r>
           </a:p>
@@ -3589,22 +3530,22 @@
               <a:defRPr/>
             </a:pPr>
             <a:r>
-              <a:rPr lang="en-US" altLang="ko-KR" dirty="0" smtClean="0"/>
+              <a:rPr lang="en-US" altLang="ko-KR" dirty="0"/>
               <a:t>https://</a:t>
             </a:r>
             <a:r>
-              <a:rPr lang="en-US" altLang="ko-KR" dirty="0" err="1" smtClean="0"/>
+              <a:rPr lang="en-US" altLang="ko-KR" dirty="0" err="1"/>
               <a:t>spark.apache.org</a:t>
             </a:r>
             <a:r>
-              <a:rPr lang="en-US" altLang="ko-KR" dirty="0" smtClean="0"/>
+              <a:rPr lang="en-US" altLang="ko-KR" dirty="0"/>
               <a:t>/docs/latest/ml-</a:t>
             </a:r>
             <a:r>
-              <a:rPr lang="en-US" altLang="ko-KR" dirty="0" err="1" smtClean="0"/>
+              <a:rPr lang="en-US" altLang="ko-KR" dirty="0" err="1"/>
               <a:t>guide.html</a:t>
             </a:r>
-            <a:endParaRPr lang="en-US" altLang="ko-KR" dirty="0" smtClean="0"/>
+            <a:endParaRPr lang="en-US" altLang="ko-KR" dirty="0"/>
           </a:p>
         </p:txBody>
       </p:sp>
@@ -3793,7 +3734,7 @@
             <a:fld id="{0459C166-16D3-4A25-A2F8-C51E0E346B22}" type="datetimeFigureOut">
               <a:rPr lang="en-US" smtClean="0"/>
               <a:pPr/>
-              <a:t>6/8/16</a:t>
+              <a:t>6/29/16</a:t>
             </a:fld>
             <a:endParaRPr lang="en-US"/>
           </a:p>
@@ -4159,7 +4100,7 @@
             <a:fld id="{0459C166-16D3-4A25-A2F8-C51E0E346B22}" type="datetimeFigureOut">
               <a:rPr lang="en-US" smtClean="0"/>
               <a:pPr/>
-              <a:t>6/8/16</a:t>
+              <a:t>6/29/16</a:t>
             </a:fld>
             <a:endParaRPr lang="en-US"/>
           </a:p>
@@ -4278,7 +4219,7 @@
             <a:fld id="{0459C166-16D3-4A25-A2F8-C51E0E346B22}" type="datetimeFigureOut">
               <a:rPr lang="en-US" smtClean="0"/>
               <a:pPr/>
-              <a:t>6/8/16</a:t>
+              <a:t>6/29/16</a:t>
             </a:fld>
             <a:endParaRPr lang="en-US"/>
           </a:p>
@@ -4375,7 +4316,7 @@
             <a:fld id="{0459C166-16D3-4A25-A2F8-C51E0E346B22}" type="datetimeFigureOut">
               <a:rPr lang="en-US" smtClean="0"/>
               <a:pPr/>
-              <a:t>6/8/16</a:t>
+              <a:t>6/29/16</a:t>
             </a:fld>
             <a:endParaRPr lang="en-US"/>
           </a:p>
@@ -4652,7 +4593,7 @@
             <a:fld id="{0459C166-16D3-4A25-A2F8-C51E0E346B22}" type="datetimeFigureOut">
               <a:rPr lang="en-US" smtClean="0"/>
               <a:pPr/>
-              <a:t>6/8/16</a:t>
+              <a:t>6/29/16</a:t>
             </a:fld>
             <a:endParaRPr lang="en-US"/>
           </a:p>
@@ -4906,7 +4847,7 @@
             <a:fld id="{0459C166-16D3-4A25-A2F8-C51E0E346B22}" type="datetimeFigureOut">
               <a:rPr lang="en-US" smtClean="0"/>
               <a:pPr/>
-              <a:t>6/8/16</a:t>
+              <a:t>6/29/16</a:t>
             </a:fld>
             <a:endParaRPr lang="en-US"/>
           </a:p>
@@ -5076,7 +5017,7 @@
             <a:fld id="{0459C166-16D3-4A25-A2F8-C51E0E346B22}" type="datetimeFigureOut">
               <a:rPr lang="en-US" smtClean="0"/>
               <a:pPr/>
-              <a:t>6/8/16</a:t>
+              <a:t>6/29/16</a:t>
             </a:fld>
             <a:endParaRPr lang="en-US"/>
           </a:p>
@@ -5256,7 +5197,7 @@
             <a:fld id="{0459C166-16D3-4A25-A2F8-C51E0E346B22}" type="datetimeFigureOut">
               <a:rPr lang="en-US" smtClean="0"/>
               <a:pPr/>
-              <a:t>6/8/16</a:t>
+              <a:t>6/29/16</a:t>
             </a:fld>
             <a:endParaRPr lang="en-US"/>
           </a:p>
@@ -5315,1607 +5256,6 @@
   <p:clrMapOvr>
     <a:masterClrMapping/>
   </p:clrMapOvr>
-</p:sldLayout>
-</file>
-
-<file path=ppt/slideLayouts/slideLayout17.xml><?xml version="1.0" encoding="utf-8"?>
-<p:sldLayout xmlns:a="http://schemas.openxmlformats.org/drawingml/2006/main" xmlns:r="http://schemas.openxmlformats.org/officeDocument/2006/relationships" xmlns:p="http://schemas.openxmlformats.org/presentationml/2006/main" userDrawn="1">
-  <p:cSld name="3_Demo, Video etc. &quot;special&quot; slides">
-    <p:bg>
-      <p:bgPr>
-        <a:solidFill>
-          <a:schemeClr val="accent2">
-            <a:alpha val="99000"/>
-          </a:schemeClr>
-        </a:solidFill>
-        <a:effectLst/>
-      </p:bgPr>
-    </p:bg>
-    <p:spTree>
-      <p:nvGrpSpPr>
-        <p:cNvPr id="1" name=""/>
-        <p:cNvGrpSpPr/>
-        <p:nvPr/>
-      </p:nvGrpSpPr>
-      <p:grpSpPr>
-        <a:xfrm>
-          <a:off x="0" y="0"/>
-          <a:ext cx="0" cy="0"/>
-          <a:chOff x="0" y="0"/>
-          <a:chExt cx="0" cy="0"/>
-        </a:xfrm>
-      </p:grpSpPr>
-      <p:sp>
-        <p:nvSpPr>
-          <p:cNvPr id="2" name="Title 1"/>
-          <p:cNvSpPr>
-            <a:spLocks noGrp="1"/>
-          </p:cNvSpPr>
-          <p:nvPr>
-            <p:ph type="ctrTitle"/>
-          </p:nvPr>
-        </p:nvSpPr>
-        <p:spPr>
-          <a:xfrm>
-            <a:off x="1889617" y="1447800"/>
-            <a:ext cx="4206383" cy="1523494"/>
-          </a:xfrm>
-        </p:spPr>
-        <p:txBody>
-          <a:bodyPr anchor="ctr" anchorCtr="0">
-            <a:noAutofit/>
-          </a:bodyPr>
-          <a:lstStyle>
-            <a:lvl1pPr>
-              <a:lnSpc>
-                <a:spcPct val="90000"/>
-              </a:lnSpc>
-              <a:defRPr sz="4799" baseline="0">
-                <a:solidFill>
-                  <a:schemeClr val="bg1">
-                    <a:alpha val="98000"/>
-                  </a:schemeClr>
-                </a:solidFill>
-              </a:defRPr>
-            </a:lvl1pPr>
-          </a:lstStyle>
-          <a:p>
-            <a:r>
-              <a:rPr lang="en-US"/>
-              <a:t>Click to edit Master title style</a:t>
-            </a:r>
-            <a:endParaRPr lang="en-US" dirty="0"/>
-          </a:p>
-        </p:txBody>
-      </p:sp>
-      <p:sp>
-        <p:nvSpPr>
-          <p:cNvPr id="3" name="Subtitle 2"/>
-          <p:cNvSpPr>
-            <a:spLocks noGrp="1"/>
-          </p:cNvSpPr>
-          <p:nvPr>
-            <p:ph type="subTitle" idx="1"/>
-          </p:nvPr>
-        </p:nvSpPr>
-        <p:spPr>
-          <a:xfrm>
-            <a:off x="1889618" y="5630475"/>
-            <a:ext cx="4206384" cy="461665"/>
-          </a:xfrm>
-        </p:spPr>
-        <p:txBody>
-          <a:bodyPr>
-            <a:noAutofit/>
-          </a:bodyPr>
-          <a:lstStyle>
-            <a:lvl1pPr marL="0" indent="0" algn="l" defTabSz="914089" rtl="0" eaLnBrk="1" latinLnBrk="0" hangingPunct="1">
-              <a:lnSpc>
-                <a:spcPct val="90000"/>
-              </a:lnSpc>
-              <a:spcBef>
-                <a:spcPts val="0"/>
-              </a:spcBef>
-              <a:buSzPct val="80000"/>
-              <a:buFont typeface="Arial" pitchFamily="34" charset="0"/>
-              <a:buNone/>
-              <a:defRPr lang="en-US" sz="2399" kern="1200" dirty="0">
-                <a:solidFill>
-                  <a:schemeClr val="bg1">
-                    <a:alpha val="99000"/>
-                  </a:schemeClr>
-                </a:solidFill>
-                <a:latin typeface="+mn-lt"/>
-                <a:ea typeface="+mn-ea"/>
-                <a:cs typeface="+mn-cs"/>
-              </a:defRPr>
-            </a:lvl1pPr>
-            <a:lvl2pPr marL="457045" indent="0" algn="ctr">
-              <a:buNone/>
-              <a:defRPr>
-                <a:solidFill>
-                  <a:schemeClr val="tx1">
-                    <a:tint val="75000"/>
-                  </a:schemeClr>
-                </a:solidFill>
-              </a:defRPr>
-            </a:lvl2pPr>
-            <a:lvl3pPr marL="914089" indent="0" algn="ctr">
-              <a:buNone/>
-              <a:defRPr>
-                <a:solidFill>
-                  <a:schemeClr val="tx1">
-                    <a:tint val="75000"/>
-                  </a:schemeClr>
-                </a:solidFill>
-              </a:defRPr>
-            </a:lvl3pPr>
-            <a:lvl4pPr marL="1371134" indent="0" algn="ctr">
-              <a:buNone/>
-              <a:defRPr>
-                <a:solidFill>
-                  <a:schemeClr val="tx1">
-                    <a:tint val="75000"/>
-                  </a:schemeClr>
-                </a:solidFill>
-              </a:defRPr>
-            </a:lvl4pPr>
-            <a:lvl5pPr marL="1828178" indent="0" algn="ctr">
-              <a:buNone/>
-              <a:defRPr>
-                <a:solidFill>
-                  <a:schemeClr val="tx1">
-                    <a:tint val="75000"/>
-                  </a:schemeClr>
-                </a:solidFill>
-              </a:defRPr>
-            </a:lvl5pPr>
-            <a:lvl6pPr marL="2285223" indent="0" algn="ctr">
-              <a:buNone/>
-              <a:defRPr>
-                <a:solidFill>
-                  <a:schemeClr val="tx1">
-                    <a:tint val="75000"/>
-                  </a:schemeClr>
-                </a:solidFill>
-              </a:defRPr>
-            </a:lvl6pPr>
-            <a:lvl7pPr marL="2742267" indent="0" algn="ctr">
-              <a:buNone/>
-              <a:defRPr>
-                <a:solidFill>
-                  <a:schemeClr val="tx1">
-                    <a:tint val="75000"/>
-                  </a:schemeClr>
-                </a:solidFill>
-              </a:defRPr>
-            </a:lvl7pPr>
-            <a:lvl8pPr marL="3199312" indent="0" algn="ctr">
-              <a:buNone/>
-              <a:defRPr>
-                <a:solidFill>
-                  <a:schemeClr val="tx1">
-                    <a:tint val="75000"/>
-                  </a:schemeClr>
-                </a:solidFill>
-              </a:defRPr>
-            </a:lvl8pPr>
-            <a:lvl9pPr marL="3656357" indent="0" algn="ctr">
-              <a:buNone/>
-              <a:defRPr>
-                <a:solidFill>
-                  <a:schemeClr val="tx1">
-                    <a:tint val="75000"/>
-                  </a:schemeClr>
-                </a:solidFill>
-              </a:defRPr>
-            </a:lvl9pPr>
-          </a:lstStyle>
-          <a:p>
-            <a:r>
-              <a:rPr lang="en-US"/>
-              <a:t>Click to edit Master subtitle style</a:t>
-            </a:r>
-            <a:endParaRPr lang="en-US" dirty="0"/>
-          </a:p>
-        </p:txBody>
-      </p:sp>
-      <p:sp>
-        <p:nvSpPr>
-          <p:cNvPr id="7" name="Text Placeholder 6"/>
-          <p:cNvSpPr>
-            <a:spLocks noGrp="1"/>
-          </p:cNvSpPr>
-          <p:nvPr>
-            <p:ph type="body" sz="quarter" idx="10" hasCustomPrompt="1"/>
-          </p:nvPr>
-        </p:nvSpPr>
-        <p:spPr>
-          <a:xfrm>
-            <a:off x="1889617" y="4160520"/>
-            <a:ext cx="8874849" cy="1274538"/>
-          </a:xfrm>
-        </p:spPr>
-        <p:txBody>
-          <a:bodyPr anchor="t" anchorCtr="0">
-            <a:noAutofit/>
-            <a:scene3d>
-              <a:camera prst="orthographicFront"/>
-              <a:lightRig rig="flat" dir="t"/>
-            </a:scene3d>
-            <a:sp3d>
-              <a:contourClr>
-                <a:schemeClr val="bg2"/>
-              </a:contourClr>
-            </a:sp3d>
-          </a:bodyPr>
-          <a:lstStyle>
-            <a:lvl1pPr marL="0" indent="0" algn="l">
-              <a:buFont typeface="Arial" pitchFamily="34" charset="0"/>
-              <a:buNone/>
-              <a:defRPr kumimoji="0" lang="en-US" sz="6598" b="0" i="0" u="none" strike="noStrike" kern="1200" cap="none" spc="-642" normalizeH="0" baseline="0" noProof="0" dirty="0" smtClean="0">
-                <a:ln w="11430"/>
-                <a:solidFill>
-                  <a:schemeClr val="accent2">
-                    <a:lumMod val="40000"/>
-                    <a:lumOff val="60000"/>
-                    <a:alpha val="99000"/>
-                  </a:schemeClr>
-                </a:solidFill>
-                <a:effectLst/>
-                <a:uLnTx/>
-                <a:uFillTx/>
-                <a:latin typeface="Segoe UI Light" pitchFamily="34" charset="0"/>
-                <a:ea typeface="+mn-ea"/>
-                <a:cs typeface="+mn-cs"/>
-              </a:defRPr>
-            </a:lvl1pPr>
-          </a:lstStyle>
-          <a:p>
-            <a:pPr lvl="0"/>
-            <a:r>
-              <a:rPr lang="en-US" dirty="0"/>
-              <a:t>click to…</a:t>
-            </a:r>
-          </a:p>
-        </p:txBody>
-      </p:sp>
-      <p:grpSp>
-        <p:nvGrpSpPr>
-          <p:cNvPr id="8" name="Group 7"/>
-          <p:cNvGrpSpPr/>
-          <p:nvPr userDrawn="1"/>
-        </p:nvGrpSpPr>
-        <p:grpSpPr bwMode="black">
-          <a:xfrm>
-            <a:off x="7906631" y="2242931"/>
-            <a:ext cx="3177742" cy="1934622"/>
-            <a:chOff x="10387012" y="4179358"/>
-            <a:chExt cx="974726" cy="593725"/>
-          </a:xfrm>
-          <a:solidFill>
-            <a:srgbClr val="FFFFFF"/>
-          </a:solidFill>
-        </p:grpSpPr>
-        <p:sp>
-          <p:nvSpPr>
-            <p:cNvPr id="9" name="Freeform 26"/>
-            <p:cNvSpPr>
-              <a:spLocks/>
-            </p:cNvSpPr>
-            <p:nvPr/>
-          </p:nvSpPr>
-          <p:spPr bwMode="black">
-            <a:xfrm>
-              <a:off x="10506075" y="4258733"/>
-              <a:ext cx="706438" cy="514350"/>
-            </a:xfrm>
-            <a:custGeom>
-              <a:avLst/>
-              <a:gdLst>
-                <a:gd name="T0" fmla="*/ 183 w 188"/>
-                <a:gd name="T1" fmla="*/ 84 h 137"/>
-                <a:gd name="T2" fmla="*/ 104 w 188"/>
-                <a:gd name="T3" fmla="*/ 27 h 137"/>
-                <a:gd name="T4" fmla="*/ 86 w 188"/>
-                <a:gd name="T5" fmla="*/ 19 h 137"/>
-                <a:gd name="T6" fmla="*/ 59 w 188"/>
-                <a:gd name="T7" fmla="*/ 34 h 137"/>
-                <a:gd name="T8" fmla="*/ 56 w 188"/>
-                <a:gd name="T9" fmla="*/ 36 h 137"/>
-                <a:gd name="T10" fmla="*/ 43 w 188"/>
-                <a:gd name="T11" fmla="*/ 38 h 137"/>
-                <a:gd name="T12" fmla="*/ 43 w 188"/>
-                <a:gd name="T13" fmla="*/ 38 h 137"/>
-                <a:gd name="T14" fmla="*/ 26 w 188"/>
-                <a:gd name="T15" fmla="*/ 27 h 137"/>
-                <a:gd name="T16" fmla="*/ 24 w 188"/>
-                <a:gd name="T17" fmla="*/ 14 h 137"/>
-                <a:gd name="T18" fmla="*/ 31 w 188"/>
-                <a:gd name="T19" fmla="*/ 0 h 137"/>
-                <a:gd name="T20" fmla="*/ 21 w 188"/>
-                <a:gd name="T21" fmla="*/ 0 h 137"/>
-                <a:gd name="T22" fmla="*/ 1 w 188"/>
-                <a:gd name="T23" fmla="*/ 79 h 137"/>
-                <a:gd name="T24" fmla="*/ 4 w 188"/>
-                <a:gd name="T25" fmla="*/ 80 h 137"/>
-                <a:gd name="T26" fmla="*/ 16 w 188"/>
-                <a:gd name="T27" fmla="*/ 70 h 137"/>
-                <a:gd name="T28" fmla="*/ 22 w 188"/>
-                <a:gd name="T29" fmla="*/ 70 h 137"/>
-                <a:gd name="T30" fmla="*/ 32 w 188"/>
-                <a:gd name="T31" fmla="*/ 74 h 137"/>
-                <a:gd name="T32" fmla="*/ 43 w 188"/>
-                <a:gd name="T33" fmla="*/ 72 h 137"/>
-                <a:gd name="T34" fmla="*/ 44 w 188"/>
-                <a:gd name="T35" fmla="*/ 72 h 137"/>
-                <a:gd name="T36" fmla="*/ 53 w 188"/>
-                <a:gd name="T37" fmla="*/ 76 h 137"/>
-                <a:gd name="T38" fmla="*/ 65 w 188"/>
-                <a:gd name="T39" fmla="*/ 74 h 137"/>
-                <a:gd name="T40" fmla="*/ 67 w 188"/>
-                <a:gd name="T41" fmla="*/ 74 h 137"/>
-                <a:gd name="T42" fmla="*/ 80 w 188"/>
-                <a:gd name="T43" fmla="*/ 88 h 137"/>
-                <a:gd name="T44" fmla="*/ 83 w 188"/>
-                <a:gd name="T45" fmla="*/ 88 h 137"/>
-                <a:gd name="T46" fmla="*/ 85 w 188"/>
-                <a:gd name="T47" fmla="*/ 89 h 137"/>
-                <a:gd name="T48" fmla="*/ 99 w 188"/>
-                <a:gd name="T49" fmla="*/ 108 h 137"/>
-                <a:gd name="T50" fmla="*/ 99 w 188"/>
-                <a:gd name="T51" fmla="*/ 110 h 137"/>
-                <a:gd name="T52" fmla="*/ 96 w 188"/>
-                <a:gd name="T53" fmla="*/ 124 h 137"/>
-                <a:gd name="T54" fmla="*/ 114 w 188"/>
-                <a:gd name="T55" fmla="*/ 137 h 137"/>
-                <a:gd name="T56" fmla="*/ 123 w 188"/>
-                <a:gd name="T57" fmla="*/ 132 h 137"/>
-                <a:gd name="T58" fmla="*/ 124 w 188"/>
-                <a:gd name="T59" fmla="*/ 124 h 137"/>
-                <a:gd name="T60" fmla="*/ 108 w 188"/>
-                <a:gd name="T61" fmla="*/ 112 h 137"/>
-                <a:gd name="T62" fmla="*/ 107 w 188"/>
-                <a:gd name="T63" fmla="*/ 109 h 137"/>
-                <a:gd name="T64" fmla="*/ 110 w 188"/>
-                <a:gd name="T65" fmla="*/ 109 h 137"/>
-                <a:gd name="T66" fmla="*/ 136 w 188"/>
-                <a:gd name="T67" fmla="*/ 127 h 137"/>
-                <a:gd name="T68" fmla="*/ 145 w 188"/>
-                <a:gd name="T69" fmla="*/ 123 h 137"/>
-                <a:gd name="T70" fmla="*/ 147 w 188"/>
-                <a:gd name="T71" fmla="*/ 114 h 137"/>
-                <a:gd name="T72" fmla="*/ 117 w 188"/>
-                <a:gd name="T73" fmla="*/ 93 h 137"/>
-                <a:gd name="T74" fmla="*/ 117 w 188"/>
-                <a:gd name="T75" fmla="*/ 90 h 137"/>
-                <a:gd name="T76" fmla="*/ 120 w 188"/>
-                <a:gd name="T77" fmla="*/ 89 h 137"/>
-                <a:gd name="T78" fmla="*/ 156 w 188"/>
-                <a:gd name="T79" fmla="*/ 116 h 137"/>
-                <a:gd name="T80" fmla="*/ 165 w 188"/>
-                <a:gd name="T81" fmla="*/ 111 h 137"/>
-                <a:gd name="T82" fmla="*/ 167 w 188"/>
-                <a:gd name="T83" fmla="*/ 102 h 137"/>
-                <a:gd name="T84" fmla="*/ 137 w 188"/>
-                <a:gd name="T85" fmla="*/ 81 h 137"/>
-                <a:gd name="T86" fmla="*/ 136 w 188"/>
-                <a:gd name="T87" fmla="*/ 78 h 137"/>
-                <a:gd name="T88" fmla="*/ 139 w 188"/>
-                <a:gd name="T89" fmla="*/ 77 h 137"/>
-                <a:gd name="T90" fmla="*/ 176 w 188"/>
-                <a:gd name="T91" fmla="*/ 104 h 137"/>
-                <a:gd name="T92" fmla="*/ 185 w 188"/>
-                <a:gd name="T93" fmla="*/ 99 h 137"/>
-                <a:gd name="T94" fmla="*/ 183 w 188"/>
-                <a:gd name="T95" fmla="*/ 84 h 137"/>
-              </a:gdLst>
-              <a:ahLst/>
-              <a:cxnLst>
-                <a:cxn ang="0">
-                  <a:pos x="T0" y="T1"/>
-                </a:cxn>
-                <a:cxn ang="0">
-                  <a:pos x="T2" y="T3"/>
-                </a:cxn>
-                <a:cxn ang="0">
-                  <a:pos x="T4" y="T5"/>
-                </a:cxn>
-                <a:cxn ang="0">
-                  <a:pos x="T6" y="T7"/>
-                </a:cxn>
-                <a:cxn ang="0">
-                  <a:pos x="T8" y="T9"/>
-                </a:cxn>
-                <a:cxn ang="0">
-                  <a:pos x="T10" y="T11"/>
-                </a:cxn>
-                <a:cxn ang="0">
-                  <a:pos x="T12" y="T13"/>
-                </a:cxn>
-                <a:cxn ang="0">
-                  <a:pos x="T14" y="T15"/>
-                </a:cxn>
-                <a:cxn ang="0">
-                  <a:pos x="T16" y="T17"/>
-                </a:cxn>
-                <a:cxn ang="0">
-                  <a:pos x="T18" y="T19"/>
-                </a:cxn>
-                <a:cxn ang="0">
-                  <a:pos x="T20" y="T21"/>
-                </a:cxn>
-                <a:cxn ang="0">
-                  <a:pos x="T22" y="T23"/>
-                </a:cxn>
-                <a:cxn ang="0">
-                  <a:pos x="T24" y="T25"/>
-                </a:cxn>
-                <a:cxn ang="0">
-                  <a:pos x="T26" y="T27"/>
-                </a:cxn>
-                <a:cxn ang="0">
-                  <a:pos x="T28" y="T29"/>
-                </a:cxn>
-                <a:cxn ang="0">
-                  <a:pos x="T30" y="T31"/>
-                </a:cxn>
-                <a:cxn ang="0">
-                  <a:pos x="T32" y="T33"/>
-                </a:cxn>
-                <a:cxn ang="0">
-                  <a:pos x="T34" y="T35"/>
-                </a:cxn>
-                <a:cxn ang="0">
-                  <a:pos x="T36" y="T37"/>
-                </a:cxn>
-                <a:cxn ang="0">
-                  <a:pos x="T38" y="T39"/>
-                </a:cxn>
-                <a:cxn ang="0">
-                  <a:pos x="T40" y="T41"/>
-                </a:cxn>
-                <a:cxn ang="0">
-                  <a:pos x="T42" y="T43"/>
-                </a:cxn>
-                <a:cxn ang="0">
-                  <a:pos x="T44" y="T45"/>
-                </a:cxn>
-                <a:cxn ang="0">
-                  <a:pos x="T46" y="T47"/>
-                </a:cxn>
-                <a:cxn ang="0">
-                  <a:pos x="T48" y="T49"/>
-                </a:cxn>
-                <a:cxn ang="0">
-                  <a:pos x="T50" y="T51"/>
-                </a:cxn>
-                <a:cxn ang="0">
-                  <a:pos x="T52" y="T53"/>
-                </a:cxn>
-                <a:cxn ang="0">
-                  <a:pos x="T54" y="T55"/>
-                </a:cxn>
-                <a:cxn ang="0">
-                  <a:pos x="T56" y="T57"/>
-                </a:cxn>
-                <a:cxn ang="0">
-                  <a:pos x="T58" y="T59"/>
-                </a:cxn>
-                <a:cxn ang="0">
-                  <a:pos x="T60" y="T61"/>
-                </a:cxn>
-                <a:cxn ang="0">
-                  <a:pos x="T62" y="T63"/>
-                </a:cxn>
-                <a:cxn ang="0">
-                  <a:pos x="T64" y="T65"/>
-                </a:cxn>
-                <a:cxn ang="0">
-                  <a:pos x="T66" y="T67"/>
-                </a:cxn>
-                <a:cxn ang="0">
-                  <a:pos x="T68" y="T69"/>
-                </a:cxn>
-                <a:cxn ang="0">
-                  <a:pos x="T70" y="T71"/>
-                </a:cxn>
-                <a:cxn ang="0">
-                  <a:pos x="T72" y="T73"/>
-                </a:cxn>
-                <a:cxn ang="0">
-                  <a:pos x="T74" y="T75"/>
-                </a:cxn>
-                <a:cxn ang="0">
-                  <a:pos x="T76" y="T77"/>
-                </a:cxn>
-                <a:cxn ang="0">
-                  <a:pos x="T78" y="T79"/>
-                </a:cxn>
-                <a:cxn ang="0">
-                  <a:pos x="T80" y="T81"/>
-                </a:cxn>
-                <a:cxn ang="0">
-                  <a:pos x="T82" y="T83"/>
-                </a:cxn>
-                <a:cxn ang="0">
-                  <a:pos x="T84" y="T85"/>
-                </a:cxn>
-                <a:cxn ang="0">
-                  <a:pos x="T86" y="T87"/>
-                </a:cxn>
-                <a:cxn ang="0">
-                  <a:pos x="T88" y="T89"/>
-                </a:cxn>
-                <a:cxn ang="0">
-                  <a:pos x="T90" y="T91"/>
-                </a:cxn>
-                <a:cxn ang="0">
-                  <a:pos x="T92" y="T93"/>
-                </a:cxn>
-                <a:cxn ang="0">
-                  <a:pos x="T94" y="T95"/>
-                </a:cxn>
-              </a:cxnLst>
-              <a:rect l="0" t="0" r="r" b="b"/>
-              <a:pathLst>
-                <a:path w="188" h="137">
-                  <a:moveTo>
-                    <a:pt x="183" y="84"/>
-                  </a:moveTo>
-                  <a:cubicBezTo>
-                    <a:pt x="104" y="27"/>
-                    <a:pt x="104" y="27"/>
-                    <a:pt x="104" y="27"/>
-                  </a:cubicBezTo>
-                  <a:cubicBezTo>
-                    <a:pt x="86" y="19"/>
-                    <a:pt x="86" y="19"/>
-                    <a:pt x="86" y="19"/>
-                  </a:cubicBezTo>
-                  <a:cubicBezTo>
-                    <a:pt x="59" y="34"/>
-                    <a:pt x="59" y="34"/>
-                    <a:pt x="59" y="34"/>
-                  </a:cubicBezTo>
-                  <a:cubicBezTo>
-                    <a:pt x="56" y="36"/>
-                    <a:pt x="56" y="36"/>
-                    <a:pt x="56" y="36"/>
-                  </a:cubicBezTo>
-                  <a:cubicBezTo>
-                    <a:pt x="52" y="38"/>
-                    <a:pt x="47" y="39"/>
-                    <a:pt x="43" y="38"/>
-                  </a:cubicBezTo>
-                  <a:cubicBezTo>
-                    <a:pt x="43" y="38"/>
-                    <a:pt x="43" y="38"/>
-                    <a:pt x="43" y="38"/>
-                  </a:cubicBezTo>
-                  <a:cubicBezTo>
-                    <a:pt x="36" y="38"/>
-                    <a:pt x="30" y="34"/>
-                    <a:pt x="26" y="27"/>
-                  </a:cubicBezTo>
-                  <a:cubicBezTo>
-                    <a:pt x="24" y="23"/>
-                    <a:pt x="23" y="19"/>
-                    <a:pt x="24" y="14"/>
-                  </a:cubicBezTo>
-                  <a:cubicBezTo>
-                    <a:pt x="24" y="9"/>
-                    <a:pt x="27" y="4"/>
-                    <a:pt x="31" y="0"/>
-                  </a:cubicBezTo>
-                  <a:cubicBezTo>
-                    <a:pt x="25" y="0"/>
-                    <a:pt x="21" y="0"/>
-                    <a:pt x="21" y="0"/>
-                  </a:cubicBezTo>
-                  <a:cubicBezTo>
-                    <a:pt x="21" y="0"/>
-                    <a:pt x="0" y="40"/>
-                    <a:pt x="1" y="79"/>
-                  </a:cubicBezTo>
-                  <a:cubicBezTo>
-                    <a:pt x="4" y="80"/>
-                    <a:pt x="4" y="80"/>
-                    <a:pt x="4" y="80"/>
-                  </a:cubicBezTo>
-                  <a:cubicBezTo>
-                    <a:pt x="6" y="75"/>
-                    <a:pt x="10" y="72"/>
-                    <a:pt x="16" y="70"/>
-                  </a:cubicBezTo>
-                  <a:cubicBezTo>
-                    <a:pt x="18" y="70"/>
-                    <a:pt x="20" y="70"/>
-                    <a:pt x="22" y="70"/>
-                  </a:cubicBezTo>
-                  <a:cubicBezTo>
-                    <a:pt x="25" y="70"/>
-                    <a:pt x="29" y="72"/>
-                    <a:pt x="32" y="74"/>
-                  </a:cubicBezTo>
-                  <a:cubicBezTo>
-                    <a:pt x="35" y="72"/>
-                    <a:pt x="39" y="71"/>
-                    <a:pt x="43" y="72"/>
-                  </a:cubicBezTo>
-                  <a:cubicBezTo>
-                    <a:pt x="43" y="72"/>
-                    <a:pt x="44" y="72"/>
-                    <a:pt x="44" y="72"/>
-                  </a:cubicBezTo>
-                  <a:cubicBezTo>
-                    <a:pt x="48" y="72"/>
-                    <a:pt x="51" y="74"/>
-                    <a:pt x="53" y="76"/>
-                  </a:cubicBezTo>
-                  <a:cubicBezTo>
-                    <a:pt x="56" y="74"/>
-                    <a:pt x="60" y="73"/>
-                    <a:pt x="65" y="74"/>
-                  </a:cubicBezTo>
-                  <a:cubicBezTo>
-                    <a:pt x="65" y="74"/>
-                    <a:pt x="66" y="74"/>
-                    <a:pt x="67" y="74"/>
-                  </a:cubicBezTo>
-                  <a:cubicBezTo>
-                    <a:pt x="74" y="76"/>
-                    <a:pt x="79" y="81"/>
-                    <a:pt x="80" y="88"/>
-                  </a:cubicBezTo>
-                  <a:cubicBezTo>
-                    <a:pt x="81" y="88"/>
-                    <a:pt x="82" y="88"/>
-                    <a:pt x="83" y="88"/>
-                  </a:cubicBezTo>
-                  <a:cubicBezTo>
-                    <a:pt x="84" y="88"/>
-                    <a:pt x="84" y="88"/>
-                    <a:pt x="85" y="89"/>
-                  </a:cubicBezTo>
-                  <a:cubicBezTo>
-                    <a:pt x="94" y="91"/>
-                    <a:pt x="100" y="99"/>
-                    <a:pt x="99" y="108"/>
-                  </a:cubicBezTo>
-                  <a:cubicBezTo>
-                    <a:pt x="99" y="109"/>
-                    <a:pt x="99" y="110"/>
-                    <a:pt x="99" y="110"/>
-                  </a:cubicBezTo>
-                  <a:cubicBezTo>
-                    <a:pt x="96" y="124"/>
-                    <a:pt x="96" y="124"/>
-                    <a:pt x="96" y="124"/>
-                  </a:cubicBezTo>
-                  <a:cubicBezTo>
-                    <a:pt x="114" y="137"/>
-                    <a:pt x="114" y="137"/>
-                    <a:pt x="114" y="137"/>
-                  </a:cubicBezTo>
-                  <a:cubicBezTo>
-                    <a:pt x="117" y="137"/>
-                    <a:pt x="120" y="135"/>
-                    <a:pt x="123" y="132"/>
-                  </a:cubicBezTo>
-                  <a:cubicBezTo>
-                    <a:pt x="124" y="130"/>
-                    <a:pt x="125" y="127"/>
-                    <a:pt x="124" y="124"/>
-                  </a:cubicBezTo>
-                  <a:cubicBezTo>
-                    <a:pt x="108" y="112"/>
-                    <a:pt x="108" y="112"/>
-                    <a:pt x="108" y="112"/>
-                  </a:cubicBezTo>
-                  <a:cubicBezTo>
-                    <a:pt x="107" y="111"/>
-                    <a:pt x="107" y="110"/>
-                    <a:pt x="107" y="109"/>
-                  </a:cubicBezTo>
-                  <a:cubicBezTo>
-                    <a:pt x="108" y="108"/>
-                    <a:pt x="109" y="108"/>
-                    <a:pt x="110" y="109"/>
-                  </a:cubicBezTo>
-                  <a:cubicBezTo>
-                    <a:pt x="136" y="127"/>
-                    <a:pt x="136" y="127"/>
-                    <a:pt x="136" y="127"/>
-                  </a:cubicBezTo>
-                  <a:cubicBezTo>
-                    <a:pt x="140" y="127"/>
-                    <a:pt x="143" y="126"/>
-                    <a:pt x="145" y="123"/>
-                  </a:cubicBezTo>
-                  <a:cubicBezTo>
-                    <a:pt x="147" y="120"/>
-                    <a:pt x="147" y="117"/>
-                    <a:pt x="147" y="114"/>
-                  </a:cubicBezTo>
-                  <a:cubicBezTo>
-                    <a:pt x="117" y="93"/>
-                    <a:pt x="117" y="93"/>
-                    <a:pt x="117" y="93"/>
-                  </a:cubicBezTo>
-                  <a:cubicBezTo>
-                    <a:pt x="116" y="92"/>
-                    <a:pt x="116" y="91"/>
-                    <a:pt x="117" y="90"/>
-                  </a:cubicBezTo>
-                  <a:cubicBezTo>
-                    <a:pt x="117" y="89"/>
-                    <a:pt x="119" y="89"/>
-                    <a:pt x="120" y="89"/>
-                  </a:cubicBezTo>
-                  <a:cubicBezTo>
-                    <a:pt x="156" y="116"/>
-                    <a:pt x="156" y="116"/>
-                    <a:pt x="156" y="116"/>
-                  </a:cubicBezTo>
-                  <a:cubicBezTo>
-                    <a:pt x="159" y="116"/>
-                    <a:pt x="163" y="114"/>
-                    <a:pt x="165" y="111"/>
-                  </a:cubicBezTo>
-                  <a:cubicBezTo>
-                    <a:pt x="167" y="108"/>
-                    <a:pt x="167" y="105"/>
-                    <a:pt x="167" y="102"/>
-                  </a:cubicBezTo>
-                  <a:cubicBezTo>
-                    <a:pt x="137" y="81"/>
-                    <a:pt x="137" y="81"/>
-                    <a:pt x="137" y="81"/>
-                  </a:cubicBezTo>
-                  <a:cubicBezTo>
-                    <a:pt x="136" y="80"/>
-                    <a:pt x="136" y="79"/>
-                    <a:pt x="136" y="78"/>
-                  </a:cubicBezTo>
-                  <a:cubicBezTo>
-                    <a:pt x="137" y="77"/>
-                    <a:pt x="138" y="76"/>
-                    <a:pt x="139" y="77"/>
-                  </a:cubicBezTo>
-                  <a:cubicBezTo>
-                    <a:pt x="176" y="104"/>
-                    <a:pt x="176" y="104"/>
-                    <a:pt x="176" y="104"/>
-                  </a:cubicBezTo>
-                  <a:cubicBezTo>
-                    <a:pt x="180" y="104"/>
-                    <a:pt x="183" y="102"/>
-                    <a:pt x="185" y="99"/>
-                  </a:cubicBezTo>
-                  <a:cubicBezTo>
-                    <a:pt x="188" y="94"/>
-                    <a:pt x="187" y="87"/>
-                    <a:pt x="183" y="84"/>
-                  </a:cubicBezTo>
-                  <a:close/>
-                </a:path>
-              </a:pathLst>
-            </a:custGeom>
-            <a:grpFill/>
-            <a:ln>
-              <a:noFill/>
-            </a:ln>
-          </p:spPr>
-          <p:txBody>
-            <a:bodyPr vert="horz" wrap="square" lIns="91440" tIns="45720" rIns="91440" bIns="45720" numCol="1" anchor="t" anchorCtr="0" compatLnSpc="1">
-              <a:prstTxWarp prst="textNoShape">
-                <a:avLst/>
-              </a:prstTxWarp>
-            </a:bodyPr>
-            <a:lstStyle/>
-            <a:p>
-              <a:pPr defTabSz="1218621"/>
-              <a:endParaRPr lang="en-US" sz="1600">
-                <a:solidFill>
-                  <a:srgbClr val="292929"/>
-                </a:solidFill>
-              </a:endParaRPr>
-            </a:p>
-          </p:txBody>
-        </p:sp>
-        <p:sp>
-          <p:nvSpPr>
-            <p:cNvPr id="12" name="Freeform 27"/>
-            <p:cNvSpPr>
-              <a:spLocks/>
-            </p:cNvSpPr>
-            <p:nvPr/>
-          </p:nvSpPr>
-          <p:spPr bwMode="black">
-            <a:xfrm>
-              <a:off x="10615612" y="4179358"/>
-              <a:ext cx="657225" cy="376238"/>
-            </a:xfrm>
-            <a:custGeom>
-              <a:avLst/>
-              <a:gdLst>
-                <a:gd name="T0" fmla="*/ 127 w 175"/>
-                <a:gd name="T1" fmla="*/ 31 h 100"/>
-                <a:gd name="T2" fmla="*/ 119 w 175"/>
-                <a:gd name="T3" fmla="*/ 28 h 100"/>
-                <a:gd name="T4" fmla="*/ 62 w 175"/>
-                <a:gd name="T5" fmla="*/ 2 h 100"/>
-                <a:gd name="T6" fmla="*/ 49 w 175"/>
-                <a:gd name="T7" fmla="*/ 3 h 100"/>
-                <a:gd name="T8" fmla="*/ 26 w 175"/>
-                <a:gd name="T9" fmla="*/ 16 h 100"/>
-                <a:gd name="T10" fmla="*/ 9 w 175"/>
-                <a:gd name="T11" fmla="*/ 25 h 100"/>
-                <a:gd name="T12" fmla="*/ 4 w 175"/>
-                <a:gd name="T13" fmla="*/ 45 h 100"/>
-                <a:gd name="T14" fmla="*/ 15 w 175"/>
-                <a:gd name="T15" fmla="*/ 52 h 100"/>
-                <a:gd name="T16" fmla="*/ 23 w 175"/>
-                <a:gd name="T17" fmla="*/ 50 h 100"/>
-                <a:gd name="T18" fmla="*/ 23 w 175"/>
-                <a:gd name="T19" fmla="*/ 50 h 100"/>
-                <a:gd name="T20" fmla="*/ 57 w 175"/>
-                <a:gd name="T21" fmla="*/ 32 h 100"/>
-                <a:gd name="T22" fmla="*/ 79 w 175"/>
-                <a:gd name="T23" fmla="*/ 42 h 100"/>
-                <a:gd name="T24" fmla="*/ 109 w 175"/>
-                <a:gd name="T25" fmla="*/ 64 h 100"/>
-                <a:gd name="T26" fmla="*/ 158 w 175"/>
-                <a:gd name="T27" fmla="*/ 99 h 100"/>
-                <a:gd name="T28" fmla="*/ 159 w 175"/>
-                <a:gd name="T29" fmla="*/ 100 h 100"/>
-                <a:gd name="T30" fmla="*/ 173 w 175"/>
-                <a:gd name="T31" fmla="*/ 97 h 100"/>
-                <a:gd name="T32" fmla="*/ 154 w 175"/>
-                <a:gd name="T33" fmla="*/ 29 h 100"/>
-                <a:gd name="T34" fmla="*/ 127 w 175"/>
-                <a:gd name="T35" fmla="*/ 31 h 100"/>
-              </a:gdLst>
-              <a:ahLst/>
-              <a:cxnLst>
-                <a:cxn ang="0">
-                  <a:pos x="T0" y="T1"/>
-                </a:cxn>
-                <a:cxn ang="0">
-                  <a:pos x="T2" y="T3"/>
-                </a:cxn>
-                <a:cxn ang="0">
-                  <a:pos x="T4" y="T5"/>
-                </a:cxn>
-                <a:cxn ang="0">
-                  <a:pos x="T6" y="T7"/>
-                </a:cxn>
-                <a:cxn ang="0">
-                  <a:pos x="T8" y="T9"/>
-                </a:cxn>
-                <a:cxn ang="0">
-                  <a:pos x="T10" y="T11"/>
-                </a:cxn>
-                <a:cxn ang="0">
-                  <a:pos x="T12" y="T13"/>
-                </a:cxn>
-                <a:cxn ang="0">
-                  <a:pos x="T14" y="T15"/>
-                </a:cxn>
-                <a:cxn ang="0">
-                  <a:pos x="T16" y="T17"/>
-                </a:cxn>
-                <a:cxn ang="0">
-                  <a:pos x="T18" y="T19"/>
-                </a:cxn>
-                <a:cxn ang="0">
-                  <a:pos x="T20" y="T21"/>
-                </a:cxn>
-                <a:cxn ang="0">
-                  <a:pos x="T22" y="T23"/>
-                </a:cxn>
-                <a:cxn ang="0">
-                  <a:pos x="T24" y="T25"/>
-                </a:cxn>
-                <a:cxn ang="0">
-                  <a:pos x="T26" y="T27"/>
-                </a:cxn>
-                <a:cxn ang="0">
-                  <a:pos x="T28" y="T29"/>
-                </a:cxn>
-                <a:cxn ang="0">
-                  <a:pos x="T30" y="T31"/>
-                </a:cxn>
-                <a:cxn ang="0">
-                  <a:pos x="T32" y="T33"/>
-                </a:cxn>
-                <a:cxn ang="0">
-                  <a:pos x="T34" y="T35"/>
-                </a:cxn>
-              </a:cxnLst>
-              <a:rect l="0" t="0" r="r" b="b"/>
-              <a:pathLst>
-                <a:path w="175" h="100">
-                  <a:moveTo>
-                    <a:pt x="127" y="31"/>
-                  </a:moveTo>
-                  <a:cubicBezTo>
-                    <a:pt x="125" y="31"/>
-                    <a:pt x="122" y="30"/>
-                    <a:pt x="119" y="28"/>
-                  </a:cubicBezTo>
-                  <a:cubicBezTo>
-                    <a:pt x="62" y="2"/>
-                    <a:pt x="62" y="2"/>
-                    <a:pt x="62" y="2"/>
-                  </a:cubicBezTo>
-                  <a:cubicBezTo>
-                    <a:pt x="58" y="0"/>
-                    <a:pt x="53" y="1"/>
-                    <a:pt x="49" y="3"/>
-                  </a:cubicBezTo>
-                  <a:cubicBezTo>
-                    <a:pt x="26" y="16"/>
-                    <a:pt x="26" y="16"/>
-                    <a:pt x="26" y="16"/>
-                  </a:cubicBezTo>
-                  <a:cubicBezTo>
-                    <a:pt x="9" y="25"/>
-                    <a:pt x="9" y="25"/>
-                    <a:pt x="9" y="25"/>
-                  </a:cubicBezTo>
-                  <a:cubicBezTo>
-                    <a:pt x="2" y="29"/>
-                    <a:pt x="0" y="38"/>
-                    <a:pt x="4" y="45"/>
-                  </a:cubicBezTo>
-                  <a:cubicBezTo>
-                    <a:pt x="6" y="49"/>
-                    <a:pt x="10" y="52"/>
-                    <a:pt x="15" y="52"/>
-                  </a:cubicBezTo>
-                  <a:cubicBezTo>
-                    <a:pt x="18" y="52"/>
-                    <a:pt x="21" y="52"/>
-                    <a:pt x="23" y="50"/>
-                  </a:cubicBezTo>
-                  <a:cubicBezTo>
-                    <a:pt x="23" y="50"/>
-                    <a:pt x="23" y="50"/>
-                    <a:pt x="23" y="50"/>
-                  </a:cubicBezTo>
-                  <a:cubicBezTo>
-                    <a:pt x="57" y="32"/>
-                    <a:pt x="57" y="32"/>
-                    <a:pt x="57" y="32"/>
-                  </a:cubicBezTo>
-                  <a:cubicBezTo>
-                    <a:pt x="79" y="42"/>
-                    <a:pt x="79" y="42"/>
-                    <a:pt x="79" y="42"/>
-                  </a:cubicBezTo>
-                  <a:cubicBezTo>
-                    <a:pt x="109" y="64"/>
-                    <a:pt x="109" y="64"/>
-                    <a:pt x="109" y="64"/>
-                  </a:cubicBezTo>
-                  <a:cubicBezTo>
-                    <a:pt x="158" y="99"/>
-                    <a:pt x="158" y="99"/>
-                    <a:pt x="158" y="99"/>
-                  </a:cubicBezTo>
-                  <a:cubicBezTo>
-                    <a:pt x="158" y="99"/>
-                    <a:pt x="159" y="100"/>
-                    <a:pt x="159" y="100"/>
-                  </a:cubicBezTo>
-                  <a:cubicBezTo>
-                    <a:pt x="173" y="97"/>
-                    <a:pt x="173" y="97"/>
-                    <a:pt x="173" y="97"/>
-                  </a:cubicBezTo>
-                  <a:cubicBezTo>
-                    <a:pt x="175" y="51"/>
-                    <a:pt x="154" y="29"/>
-                    <a:pt x="154" y="29"/>
-                  </a:cubicBezTo>
-                  <a:cubicBezTo>
-                    <a:pt x="154" y="29"/>
-                    <a:pt x="133" y="33"/>
-                    <a:pt x="127" y="31"/>
-                  </a:cubicBezTo>
-                  <a:close/>
-                </a:path>
-              </a:pathLst>
-            </a:custGeom>
-            <a:grpFill/>
-            <a:ln>
-              <a:noFill/>
-            </a:ln>
-          </p:spPr>
-          <p:txBody>
-            <a:bodyPr vert="horz" wrap="square" lIns="91440" tIns="45720" rIns="91440" bIns="45720" numCol="1" anchor="t" anchorCtr="0" compatLnSpc="1">
-              <a:prstTxWarp prst="textNoShape">
-                <a:avLst/>
-              </a:prstTxWarp>
-            </a:bodyPr>
-            <a:lstStyle/>
-            <a:p>
-              <a:pPr defTabSz="1218621"/>
-              <a:endParaRPr lang="en-US" sz="1600">
-                <a:solidFill>
-                  <a:srgbClr val="292929"/>
-                </a:solidFill>
-              </a:endParaRPr>
-            </a:p>
-          </p:txBody>
-        </p:sp>
-        <p:sp>
-          <p:nvSpPr>
-            <p:cNvPr id="14" name="Freeform 28"/>
-            <p:cNvSpPr>
-              <a:spLocks/>
-            </p:cNvSpPr>
-            <p:nvPr/>
-          </p:nvSpPr>
-          <p:spPr bwMode="black">
-            <a:xfrm>
-              <a:off x="10536237" y="4544483"/>
-              <a:ext cx="319088" cy="220663"/>
-            </a:xfrm>
-            <a:custGeom>
-              <a:avLst/>
-              <a:gdLst>
-                <a:gd name="T0" fmla="*/ 76 w 85"/>
-                <a:gd name="T1" fmla="*/ 20 h 59"/>
-                <a:gd name="T2" fmla="*/ 64 w 85"/>
-                <a:gd name="T3" fmla="*/ 25 h 59"/>
-                <a:gd name="T4" fmla="*/ 65 w 85"/>
-                <a:gd name="T5" fmla="*/ 18 h 59"/>
-                <a:gd name="T6" fmla="*/ 57 w 85"/>
-                <a:gd name="T7" fmla="*/ 5 h 59"/>
-                <a:gd name="T8" fmla="*/ 44 w 85"/>
-                <a:gd name="T9" fmla="*/ 13 h 59"/>
-                <a:gd name="T10" fmla="*/ 44 w 85"/>
-                <a:gd name="T11" fmla="*/ 14 h 59"/>
-                <a:gd name="T12" fmla="*/ 35 w 85"/>
-                <a:gd name="T13" fmla="*/ 3 h 59"/>
-                <a:gd name="T14" fmla="*/ 23 w 85"/>
-                <a:gd name="T15" fmla="*/ 10 h 59"/>
-                <a:gd name="T16" fmla="*/ 23 w 85"/>
-                <a:gd name="T17" fmla="*/ 10 h 59"/>
-                <a:gd name="T18" fmla="*/ 10 w 85"/>
-                <a:gd name="T19" fmla="*/ 1 h 59"/>
-                <a:gd name="T20" fmla="*/ 1 w 85"/>
-                <a:gd name="T21" fmla="*/ 14 h 59"/>
-                <a:gd name="T22" fmla="*/ 4 w 85"/>
-                <a:gd name="T23" fmla="*/ 28 h 59"/>
-                <a:gd name="T24" fmla="*/ 14 w 85"/>
-                <a:gd name="T25" fmla="*/ 36 h 59"/>
-                <a:gd name="T26" fmla="*/ 17 w 85"/>
-                <a:gd name="T27" fmla="*/ 36 h 59"/>
-                <a:gd name="T28" fmla="*/ 19 w 85"/>
-                <a:gd name="T29" fmla="*/ 35 h 59"/>
-                <a:gd name="T30" fmla="*/ 27 w 85"/>
-                <a:gd name="T31" fmla="*/ 43 h 59"/>
-                <a:gd name="T32" fmla="*/ 28 w 85"/>
-                <a:gd name="T33" fmla="*/ 43 h 59"/>
-                <a:gd name="T34" fmla="*/ 39 w 85"/>
-                <a:gd name="T35" fmla="*/ 38 h 59"/>
-                <a:gd name="T36" fmla="*/ 38 w 85"/>
-                <a:gd name="T37" fmla="*/ 39 h 59"/>
-                <a:gd name="T38" fmla="*/ 47 w 85"/>
-                <a:gd name="T39" fmla="*/ 52 h 59"/>
-                <a:gd name="T40" fmla="*/ 48 w 85"/>
-                <a:gd name="T41" fmla="*/ 52 h 59"/>
-                <a:gd name="T42" fmla="*/ 58 w 85"/>
-                <a:gd name="T43" fmla="*/ 47 h 59"/>
-                <a:gd name="T44" fmla="*/ 67 w 85"/>
-                <a:gd name="T45" fmla="*/ 59 h 59"/>
-                <a:gd name="T46" fmla="*/ 68 w 85"/>
-                <a:gd name="T47" fmla="*/ 59 h 59"/>
-                <a:gd name="T48" fmla="*/ 80 w 85"/>
-                <a:gd name="T49" fmla="*/ 50 h 59"/>
-                <a:gd name="T50" fmla="*/ 84 w 85"/>
-                <a:gd name="T51" fmla="*/ 33 h 59"/>
-                <a:gd name="T52" fmla="*/ 76 w 85"/>
-                <a:gd name="T53" fmla="*/ 20 h 59"/>
-              </a:gdLst>
-              <a:ahLst/>
-              <a:cxnLst>
-                <a:cxn ang="0">
-                  <a:pos x="T0" y="T1"/>
-                </a:cxn>
-                <a:cxn ang="0">
-                  <a:pos x="T2" y="T3"/>
-                </a:cxn>
-                <a:cxn ang="0">
-                  <a:pos x="T4" y="T5"/>
-                </a:cxn>
-                <a:cxn ang="0">
-                  <a:pos x="T6" y="T7"/>
-                </a:cxn>
-                <a:cxn ang="0">
-                  <a:pos x="T8" y="T9"/>
-                </a:cxn>
-                <a:cxn ang="0">
-                  <a:pos x="T10" y="T11"/>
-                </a:cxn>
-                <a:cxn ang="0">
-                  <a:pos x="T12" y="T13"/>
-                </a:cxn>
-                <a:cxn ang="0">
-                  <a:pos x="T14" y="T15"/>
-                </a:cxn>
-                <a:cxn ang="0">
-                  <a:pos x="T16" y="T17"/>
-                </a:cxn>
-                <a:cxn ang="0">
-                  <a:pos x="T18" y="T19"/>
-                </a:cxn>
-                <a:cxn ang="0">
-                  <a:pos x="T20" y="T21"/>
-                </a:cxn>
-                <a:cxn ang="0">
-                  <a:pos x="T22" y="T23"/>
-                </a:cxn>
-                <a:cxn ang="0">
-                  <a:pos x="T24" y="T25"/>
-                </a:cxn>
-                <a:cxn ang="0">
-                  <a:pos x="T26" y="T27"/>
-                </a:cxn>
-                <a:cxn ang="0">
-                  <a:pos x="T28" y="T29"/>
-                </a:cxn>
-                <a:cxn ang="0">
-                  <a:pos x="T30" y="T31"/>
-                </a:cxn>
-                <a:cxn ang="0">
-                  <a:pos x="T32" y="T33"/>
-                </a:cxn>
-                <a:cxn ang="0">
-                  <a:pos x="T34" y="T35"/>
-                </a:cxn>
-                <a:cxn ang="0">
-                  <a:pos x="T36" y="T37"/>
-                </a:cxn>
-                <a:cxn ang="0">
-                  <a:pos x="T38" y="T39"/>
-                </a:cxn>
-                <a:cxn ang="0">
-                  <a:pos x="T40" y="T41"/>
-                </a:cxn>
-                <a:cxn ang="0">
-                  <a:pos x="T42" y="T43"/>
-                </a:cxn>
-                <a:cxn ang="0">
-                  <a:pos x="T44" y="T45"/>
-                </a:cxn>
-                <a:cxn ang="0">
-                  <a:pos x="T46" y="T47"/>
-                </a:cxn>
-                <a:cxn ang="0">
-                  <a:pos x="T48" y="T49"/>
-                </a:cxn>
-                <a:cxn ang="0">
-                  <a:pos x="T50" y="T51"/>
-                </a:cxn>
-                <a:cxn ang="0">
-                  <a:pos x="T52" y="T53"/>
-                </a:cxn>
-              </a:cxnLst>
-              <a:rect l="0" t="0" r="r" b="b"/>
-              <a:pathLst>
-                <a:path w="85" h="59">
-                  <a:moveTo>
-                    <a:pt x="76" y="20"/>
-                  </a:moveTo>
-                  <a:cubicBezTo>
-                    <a:pt x="71" y="19"/>
-                    <a:pt x="66" y="21"/>
-                    <a:pt x="64" y="25"/>
-                  </a:cubicBezTo>
-                  <a:cubicBezTo>
-                    <a:pt x="65" y="18"/>
-                    <a:pt x="65" y="18"/>
-                    <a:pt x="65" y="18"/>
-                  </a:cubicBezTo>
-                  <a:cubicBezTo>
-                    <a:pt x="67" y="12"/>
-                    <a:pt x="63" y="6"/>
-                    <a:pt x="57" y="5"/>
-                  </a:cubicBezTo>
-                  <a:cubicBezTo>
-                    <a:pt x="51" y="4"/>
-                    <a:pt x="45" y="7"/>
-                    <a:pt x="44" y="13"/>
-                  </a:cubicBezTo>
-                  <a:cubicBezTo>
-                    <a:pt x="44" y="14"/>
-                    <a:pt x="44" y="14"/>
-                    <a:pt x="44" y="14"/>
-                  </a:cubicBezTo>
-                  <a:cubicBezTo>
-                    <a:pt x="44" y="9"/>
-                    <a:pt x="40" y="4"/>
-                    <a:pt x="35" y="3"/>
-                  </a:cubicBezTo>
-                  <a:cubicBezTo>
-                    <a:pt x="30" y="2"/>
-                    <a:pt x="24" y="5"/>
-                    <a:pt x="23" y="10"/>
-                  </a:cubicBezTo>
-                  <a:cubicBezTo>
-                    <a:pt x="23" y="10"/>
-                    <a:pt x="23" y="10"/>
-                    <a:pt x="23" y="10"/>
-                  </a:cubicBezTo>
-                  <a:cubicBezTo>
-                    <a:pt x="21" y="4"/>
-                    <a:pt x="15" y="0"/>
-                    <a:pt x="10" y="1"/>
-                  </a:cubicBezTo>
-                  <a:cubicBezTo>
-                    <a:pt x="4" y="3"/>
-                    <a:pt x="0" y="8"/>
-                    <a:pt x="1" y="14"/>
-                  </a:cubicBezTo>
-                  <a:cubicBezTo>
-                    <a:pt x="4" y="28"/>
-                    <a:pt x="4" y="28"/>
-                    <a:pt x="4" y="28"/>
-                  </a:cubicBezTo>
-                  <a:cubicBezTo>
-                    <a:pt x="5" y="32"/>
-                    <a:pt x="9" y="36"/>
-                    <a:pt x="14" y="36"/>
-                  </a:cubicBezTo>
-                  <a:cubicBezTo>
-                    <a:pt x="15" y="36"/>
-                    <a:pt x="16" y="36"/>
-                    <a:pt x="17" y="36"/>
-                  </a:cubicBezTo>
-                  <a:cubicBezTo>
-                    <a:pt x="18" y="36"/>
-                    <a:pt x="18" y="36"/>
-                    <a:pt x="19" y="35"/>
-                  </a:cubicBezTo>
-                  <a:cubicBezTo>
-                    <a:pt x="20" y="39"/>
-                    <a:pt x="23" y="42"/>
-                    <a:pt x="27" y="43"/>
-                  </a:cubicBezTo>
-                  <a:cubicBezTo>
-                    <a:pt x="28" y="43"/>
-                    <a:pt x="28" y="43"/>
-                    <a:pt x="28" y="43"/>
-                  </a:cubicBezTo>
-                  <a:cubicBezTo>
-                    <a:pt x="32" y="43"/>
-                    <a:pt x="36" y="41"/>
-                    <a:pt x="39" y="38"/>
-                  </a:cubicBezTo>
-                  <a:cubicBezTo>
-                    <a:pt x="38" y="39"/>
-                    <a:pt x="38" y="39"/>
-                    <a:pt x="38" y="39"/>
-                  </a:cubicBezTo>
-                  <a:cubicBezTo>
-                    <a:pt x="37" y="44"/>
-                    <a:pt x="41" y="50"/>
-                    <a:pt x="47" y="52"/>
-                  </a:cubicBezTo>
-                  <a:cubicBezTo>
-                    <a:pt x="47" y="52"/>
-                    <a:pt x="47" y="52"/>
-                    <a:pt x="48" y="52"/>
-                  </a:cubicBezTo>
-                  <a:cubicBezTo>
-                    <a:pt x="52" y="52"/>
-                    <a:pt x="56" y="50"/>
-                    <a:pt x="58" y="47"/>
-                  </a:cubicBezTo>
-                  <a:cubicBezTo>
-                    <a:pt x="58" y="52"/>
-                    <a:pt x="61" y="57"/>
-                    <a:pt x="67" y="59"/>
-                  </a:cubicBezTo>
-                  <a:cubicBezTo>
-                    <a:pt x="67" y="59"/>
-                    <a:pt x="67" y="59"/>
-                    <a:pt x="68" y="59"/>
-                  </a:cubicBezTo>
-                  <a:cubicBezTo>
-                    <a:pt x="73" y="59"/>
-                    <a:pt x="78" y="56"/>
-                    <a:pt x="80" y="50"/>
-                  </a:cubicBezTo>
-                  <a:cubicBezTo>
-                    <a:pt x="84" y="33"/>
-                    <a:pt x="84" y="33"/>
-                    <a:pt x="84" y="33"/>
-                  </a:cubicBezTo>
-                  <a:cubicBezTo>
-                    <a:pt x="85" y="27"/>
-                    <a:pt x="81" y="21"/>
-                    <a:pt x="76" y="20"/>
-                  </a:cubicBezTo>
-                  <a:close/>
-                </a:path>
-              </a:pathLst>
-            </a:custGeom>
-            <a:grpFill/>
-            <a:ln>
-              <a:noFill/>
-            </a:ln>
-          </p:spPr>
-          <p:txBody>
-            <a:bodyPr vert="horz" wrap="square" lIns="91440" tIns="45720" rIns="91440" bIns="45720" numCol="1" anchor="t" anchorCtr="0" compatLnSpc="1">
-              <a:prstTxWarp prst="textNoShape">
-                <a:avLst/>
-              </a:prstTxWarp>
-            </a:bodyPr>
-            <a:lstStyle/>
-            <a:p>
-              <a:pPr defTabSz="1218621"/>
-              <a:endParaRPr lang="en-US" sz="1600">
-                <a:solidFill>
-                  <a:srgbClr val="292929"/>
-                </a:solidFill>
-              </a:endParaRPr>
-            </a:p>
-          </p:txBody>
-        </p:sp>
-        <p:sp>
-          <p:nvSpPr>
-            <p:cNvPr id="15" name="Freeform 29"/>
-            <p:cNvSpPr>
-              <a:spLocks/>
-            </p:cNvSpPr>
-            <p:nvPr/>
-          </p:nvSpPr>
-          <p:spPr bwMode="black">
-            <a:xfrm>
-              <a:off x="11207750" y="4239683"/>
-              <a:ext cx="153988" cy="319088"/>
-            </a:xfrm>
-            <a:custGeom>
-              <a:avLst/>
-              <a:gdLst>
-                <a:gd name="T0" fmla="*/ 41 w 41"/>
-                <a:gd name="T1" fmla="*/ 77 h 85"/>
-                <a:gd name="T2" fmla="*/ 33 w 41"/>
-                <a:gd name="T3" fmla="*/ 7 h 85"/>
-                <a:gd name="T4" fmla="*/ 24 w 41"/>
-                <a:gd name="T5" fmla="*/ 1 h 85"/>
-                <a:gd name="T6" fmla="*/ 0 w 41"/>
-                <a:gd name="T7" fmla="*/ 7 h 85"/>
-                <a:gd name="T8" fmla="*/ 22 w 41"/>
-                <a:gd name="T9" fmla="*/ 85 h 85"/>
-                <a:gd name="T10" fmla="*/ 33 w 41"/>
-                <a:gd name="T11" fmla="*/ 85 h 85"/>
-                <a:gd name="T12" fmla="*/ 41 w 41"/>
-                <a:gd name="T13" fmla="*/ 77 h 85"/>
-              </a:gdLst>
-              <a:ahLst/>
-              <a:cxnLst>
-                <a:cxn ang="0">
-                  <a:pos x="T0" y="T1"/>
-                </a:cxn>
-                <a:cxn ang="0">
-                  <a:pos x="T2" y="T3"/>
-                </a:cxn>
-                <a:cxn ang="0">
-                  <a:pos x="T4" y="T5"/>
-                </a:cxn>
-                <a:cxn ang="0">
-                  <a:pos x="T6" y="T7"/>
-                </a:cxn>
-                <a:cxn ang="0">
-                  <a:pos x="T8" y="T9"/>
-                </a:cxn>
-                <a:cxn ang="0">
-                  <a:pos x="T10" y="T11"/>
-                </a:cxn>
-                <a:cxn ang="0">
-                  <a:pos x="T12" y="T13"/>
-                </a:cxn>
-              </a:cxnLst>
-              <a:rect l="0" t="0" r="r" b="b"/>
-              <a:pathLst>
-                <a:path w="41" h="85">
-                  <a:moveTo>
-                    <a:pt x="41" y="77"/>
-                  </a:moveTo>
-                  <a:cubicBezTo>
-                    <a:pt x="33" y="7"/>
-                    <a:pt x="33" y="7"/>
-                    <a:pt x="33" y="7"/>
-                  </a:cubicBezTo>
-                  <a:cubicBezTo>
-                    <a:pt x="32" y="2"/>
-                    <a:pt x="28" y="0"/>
-                    <a:pt x="24" y="1"/>
-                  </a:cubicBezTo>
-                  <a:cubicBezTo>
-                    <a:pt x="0" y="7"/>
-                    <a:pt x="0" y="7"/>
-                    <a:pt x="0" y="7"/>
-                  </a:cubicBezTo>
-                  <a:cubicBezTo>
-                    <a:pt x="0" y="7"/>
-                    <a:pt x="25" y="32"/>
-                    <a:pt x="22" y="85"/>
-                  </a:cubicBezTo>
-                  <a:cubicBezTo>
-                    <a:pt x="33" y="85"/>
-                    <a:pt x="33" y="85"/>
-                    <a:pt x="33" y="85"/>
-                  </a:cubicBezTo>
-                  <a:cubicBezTo>
-                    <a:pt x="38" y="85"/>
-                    <a:pt x="41" y="81"/>
-                    <a:pt x="41" y="77"/>
-                  </a:cubicBezTo>
-                  <a:close/>
-                </a:path>
-              </a:pathLst>
-            </a:custGeom>
-            <a:grpFill/>
-            <a:ln>
-              <a:noFill/>
-            </a:ln>
-          </p:spPr>
-          <p:txBody>
-            <a:bodyPr vert="horz" wrap="square" lIns="91440" tIns="45720" rIns="91440" bIns="45720" numCol="1" anchor="t" anchorCtr="0" compatLnSpc="1">
-              <a:prstTxWarp prst="textNoShape">
-                <a:avLst/>
-              </a:prstTxWarp>
-            </a:bodyPr>
-            <a:lstStyle/>
-            <a:p>
-              <a:pPr defTabSz="1218621"/>
-              <a:endParaRPr lang="en-US" sz="1600">
-                <a:solidFill>
-                  <a:srgbClr val="292929"/>
-                </a:solidFill>
-              </a:endParaRPr>
-            </a:p>
-          </p:txBody>
-        </p:sp>
-        <p:sp>
-          <p:nvSpPr>
-            <p:cNvPr id="16" name="Freeform 30"/>
-            <p:cNvSpPr>
-              <a:spLocks/>
-            </p:cNvSpPr>
-            <p:nvPr/>
-          </p:nvSpPr>
-          <p:spPr bwMode="black">
-            <a:xfrm>
-              <a:off x="10387012" y="4206346"/>
-              <a:ext cx="176213" cy="352425"/>
-            </a:xfrm>
-            <a:custGeom>
-              <a:avLst/>
-              <a:gdLst>
-                <a:gd name="T0" fmla="*/ 47 w 47"/>
-                <a:gd name="T1" fmla="*/ 9 h 94"/>
-                <a:gd name="T2" fmla="*/ 35 w 47"/>
-                <a:gd name="T3" fmla="*/ 2 h 94"/>
-                <a:gd name="T4" fmla="*/ 25 w 47"/>
-                <a:gd name="T5" fmla="*/ 6 h 94"/>
-                <a:gd name="T6" fmla="*/ 2 w 47"/>
-                <a:gd name="T7" fmla="*/ 81 h 94"/>
-                <a:gd name="T8" fmla="*/ 7 w 47"/>
-                <a:gd name="T9" fmla="*/ 90 h 94"/>
-                <a:gd name="T10" fmla="*/ 26 w 47"/>
-                <a:gd name="T11" fmla="*/ 94 h 94"/>
-                <a:gd name="T12" fmla="*/ 47 w 47"/>
-                <a:gd name="T13" fmla="*/ 9 h 94"/>
-              </a:gdLst>
-              <a:ahLst/>
-              <a:cxnLst>
-                <a:cxn ang="0">
-                  <a:pos x="T0" y="T1"/>
-                </a:cxn>
-                <a:cxn ang="0">
-                  <a:pos x="T2" y="T3"/>
-                </a:cxn>
-                <a:cxn ang="0">
-                  <a:pos x="T4" y="T5"/>
-                </a:cxn>
-                <a:cxn ang="0">
-                  <a:pos x="T6" y="T7"/>
-                </a:cxn>
-                <a:cxn ang="0">
-                  <a:pos x="T8" y="T9"/>
-                </a:cxn>
-                <a:cxn ang="0">
-                  <a:pos x="T10" y="T11"/>
-                </a:cxn>
-                <a:cxn ang="0">
-                  <a:pos x="T12" y="T13"/>
-                </a:cxn>
-              </a:cxnLst>
-              <a:rect l="0" t="0" r="r" b="b"/>
-              <a:pathLst>
-                <a:path w="47" h="94">
-                  <a:moveTo>
-                    <a:pt x="47" y="9"/>
-                  </a:moveTo>
-                  <a:cubicBezTo>
-                    <a:pt x="35" y="2"/>
-                    <a:pt x="35" y="2"/>
-                    <a:pt x="35" y="2"/>
-                  </a:cubicBezTo>
-                  <a:cubicBezTo>
-                    <a:pt x="31" y="0"/>
-                    <a:pt x="27" y="2"/>
-                    <a:pt x="25" y="6"/>
-                  </a:cubicBezTo>
-                  <a:cubicBezTo>
-                    <a:pt x="2" y="81"/>
-                    <a:pt x="2" y="81"/>
-                    <a:pt x="2" y="81"/>
-                  </a:cubicBezTo>
-                  <a:cubicBezTo>
-                    <a:pt x="0" y="86"/>
-                    <a:pt x="3" y="90"/>
-                    <a:pt x="7" y="90"/>
-                  </a:cubicBezTo>
-                  <a:cubicBezTo>
-                    <a:pt x="26" y="94"/>
-                    <a:pt x="26" y="94"/>
-                    <a:pt x="26" y="94"/>
-                  </a:cubicBezTo>
-                  <a:cubicBezTo>
-                    <a:pt x="24" y="52"/>
-                    <a:pt x="47" y="9"/>
-                    <a:pt x="47" y="9"/>
-                  </a:cubicBezTo>
-                  <a:close/>
-                </a:path>
-              </a:pathLst>
-            </a:custGeom>
-            <a:grpFill/>
-            <a:ln>
-              <a:noFill/>
-            </a:ln>
-          </p:spPr>
-          <p:txBody>
-            <a:bodyPr vert="horz" wrap="square" lIns="91440" tIns="45720" rIns="91440" bIns="45720" numCol="1" anchor="t" anchorCtr="0" compatLnSpc="1">
-              <a:prstTxWarp prst="textNoShape">
-                <a:avLst/>
-              </a:prstTxWarp>
-            </a:bodyPr>
-            <a:lstStyle/>
-            <a:p>
-              <a:pPr defTabSz="1218621"/>
-              <a:endParaRPr lang="en-US" sz="1600">
-                <a:solidFill>
-                  <a:srgbClr val="292929"/>
-                </a:solidFill>
-              </a:endParaRPr>
-            </a:p>
-          </p:txBody>
-        </p:sp>
-      </p:grpSp>
-    </p:spTree>
-    <p:extLst>
-      <p:ext uri="{BB962C8B-B14F-4D97-AF65-F5344CB8AC3E}">
-        <p14:creationId xmlns:p14="http://schemas.microsoft.com/office/powerpoint/2010/main" val="968038421"/>
-      </p:ext>
-    </p:extLst>
-  </p:cSld>
-  <p:clrMapOvr>
-    <a:masterClrMapping/>
-  </p:clrMapOvr>
-  <p:transition xmlns:p14="http://schemas.microsoft.com/office/powerpoint/2010/main">
-    <p:fade/>
-  </p:transition>
 </p:sldLayout>
 </file>
 
@@ -7027,7 +5367,7 @@
             <a:fld id="{0459C166-16D3-4A25-A2F8-C51E0E346B22}" type="datetimeFigureOut">
               <a:rPr lang="en-US" smtClean="0"/>
               <a:pPr/>
-              <a:t>6/8/16</a:t>
+              <a:t>6/29/16</a:t>
             </a:fld>
             <a:endParaRPr lang="en-US"/>
           </a:p>
@@ -7292,7 +5632,7 @@
             <a:fld id="{0459C166-16D3-4A25-A2F8-C51E0E346B22}" type="datetimeFigureOut">
               <a:rPr lang="en-US" smtClean="0"/>
               <a:pPr/>
-              <a:t>6/8/16</a:t>
+              <a:t>6/29/16</a:t>
             </a:fld>
             <a:endParaRPr lang="en-US"/>
           </a:p>
@@ -7609,7 +5949,7 @@
             <a:fld id="{0459C166-16D3-4A25-A2F8-C51E0E346B22}" type="datetimeFigureOut">
               <a:rPr lang="en-US" smtClean="0"/>
               <a:pPr/>
-              <a:t>6/8/16</a:t>
+              <a:t>6/29/16</a:t>
             </a:fld>
             <a:endParaRPr lang="en-US"/>
           </a:p>
@@ -7888,7 +6228,7 @@
             <a:fld id="{0459C166-16D3-4A25-A2F8-C51E0E346B22}" type="datetimeFigureOut">
               <a:rPr lang="en-US" smtClean="0"/>
               <a:pPr/>
-              <a:t>6/8/16</a:t>
+              <a:t>6/29/16</a:t>
             </a:fld>
             <a:endParaRPr lang="en-US"/>
           </a:p>
@@ -8877,7 +7217,7 @@
             <a:fld id="{0459C166-16D3-4A25-A2F8-C51E0E346B22}" type="datetimeFigureOut">
               <a:rPr lang="en-US" smtClean="0"/>
               <a:pPr/>
-              <a:t>6/8/16</a:t>
+              <a:t>6/29/16</a:t>
             </a:fld>
             <a:endParaRPr lang="en-US"/>
           </a:p>
@@ -9090,7 +7430,7 @@
             <a:fld id="{0459C166-16D3-4A25-A2F8-C51E0E346B22}" type="datetimeFigureOut">
               <a:rPr lang="en-US" smtClean="0"/>
               <a:pPr/>
-              <a:t>6/8/16</a:t>
+              <a:t>6/29/16</a:t>
             </a:fld>
             <a:endParaRPr lang="en-US"/>
           </a:p>
@@ -9200,7 +7540,6 @@
     <p:sldLayoutId id="2147483657" r:id="rId14"/>
     <p:sldLayoutId id="2147483658" r:id="rId15"/>
     <p:sldLayoutId id="2147483659" r:id="rId16"/>
-    <p:sldLayoutId id="2147483665" r:id="rId17"/>
   </p:sldLayoutIdLst>
   <p:txStyles>
     <p:titleStyle>
@@ -9520,12 +7859,8 @@
           <a:lstStyle/>
           <a:p>
             <a:r>
-              <a:rPr lang="en-US" sz="5400" dirty="0" smtClean="0"/>
-              <a:t>Data </a:t>
-            </a:r>
-            <a:r>
               <a:rPr lang="en-US" sz="5400" dirty="0"/>
-              <a:t>Science and Machine Learning</a:t>
+              <a:t>Data Science and Machine Learning</a:t>
             </a:r>
           </a:p>
         </p:txBody>
@@ -9550,13 +7885,8 @@
             <a:pPr fontAlgn="base"/>
             <a:r>
               <a:rPr lang="en-US" dirty="0"/>
-              <a:t>Module 5, Lesson </a:t>
-            </a:r>
-            <a:r>
-              <a:rPr lang="en-US" dirty="0" smtClean="0"/>
-              <a:t>3:</a:t>
-            </a:r>
-            <a:endParaRPr lang="en-US" dirty="0"/>
+              <a:t>Module 5, Lesson 3:</a:t>
+            </a:r>
           </a:p>
           <a:p>
             <a:pPr fontAlgn="base"/>
@@ -9577,13 +7907,6 @@
   <p:clrMapOvr>
     <a:masterClrMapping/>
   </p:clrMapOvr>
-  <p:timing>
-    <p:tnLst>
-      <p:par>
-        <p:cTn xmlns:p14="http://schemas.microsoft.com/office/powerpoint/2010/main" id="1" dur="indefinite" restart="never" nodeType="tmRoot"/>
-      </p:par>
-    </p:tnLst>
-  </p:timing>
 </p:sld>
 </file>
 
@@ -9932,12 +8255,8 @@
               <a:buChar char="§"/>
             </a:pPr>
             <a:r>
-              <a:rPr lang="en-US" sz="2800" dirty="0" smtClean="0"/>
-              <a:t>Stages </a:t>
-            </a:r>
-            <a:r>
               <a:rPr lang="en-US" sz="2800" dirty="0"/>
-              <a:t>are run in order and </a:t>
+              <a:t>Stages are run in order and </a:t>
             </a:r>
             <a:r>
               <a:rPr lang="en-US" sz="2800" dirty="0" err="1"/>
@@ -10965,13 +9284,6 @@
   <p:clrMapOvr>
     <a:masterClrMapping/>
   </p:clrMapOvr>
-  <p:timing>
-    <p:tnLst>
-      <p:par>
-        <p:cTn xmlns:p14="http://schemas.microsoft.com/office/powerpoint/2010/main" id="1" dur="indefinite" restart="never" nodeType="tmRoot"/>
-      </p:par>
-    </p:tnLst>
-  </p:timing>
 </p:sld>
 </file>
 
@@ -11281,13 +9593,8 @@
               <a:pPr algn="l"/>
               <a:r>
                 <a:rPr lang="en-US" altLang="ko-KR" i="0" dirty="0"/>
-                <a:t>Uniform API is used to specify </a:t>
+                <a:t>Uniform API is used to specify parameters for estimators and transformers</a:t>
               </a:r>
-              <a:r>
-                <a:rPr lang="en-US" altLang="ko-KR" i="0" dirty="0" smtClean="0"/>
-                <a:t>parameters for estimators and transformers</a:t>
-              </a:r>
-              <a:endParaRPr lang="en-US" altLang="ko-KR" i="0" dirty="0"/>
             </a:p>
           </p:txBody>
         </p:sp>
@@ -11325,16 +9632,12 @@
               <a:buChar char="§"/>
             </a:pPr>
             <a:r>
-              <a:rPr lang="en-US" sz="2400" dirty="0" err="1" smtClean="0"/>
+              <a:rPr lang="en-US" sz="2400" dirty="0" err="1"/>
               <a:t>Param</a:t>
             </a:r>
             <a:r>
               <a:rPr lang="en-US" sz="2400" dirty="0"/>
-              <a:t>: A named parameter with self-contained </a:t>
-            </a:r>
-            <a:r>
-              <a:rPr lang="en-US" sz="2400" dirty="0" smtClean="0"/>
-              <a:t>documentation</a:t>
+              <a:t>: A named parameter with self-contained documentation</a:t>
             </a:r>
           </a:p>
           <a:p>
@@ -11349,16 +9652,12 @@
               <a:buChar char="§"/>
             </a:pPr>
             <a:r>
-              <a:rPr lang="en-US" sz="2400" dirty="0" err="1" smtClean="0"/>
+              <a:rPr lang="en-US" sz="2400" dirty="0" err="1"/>
               <a:t>ParamMap</a:t>
             </a:r>
             <a:r>
               <a:rPr lang="en-US" sz="2400" dirty="0"/>
-              <a:t>: A set of parameter, value </a:t>
-            </a:r>
-            <a:r>
-              <a:rPr lang="en-US" sz="2400" dirty="0" smtClean="0"/>
-              <a:t>pairs</a:t>
+              <a:t>: A set of parameter, value pairs</a:t>
             </a:r>
           </a:p>
           <a:p>
@@ -11373,12 +9672,8 @@
               <a:buChar char="§"/>
             </a:pPr>
             <a:r>
-              <a:rPr lang="en-US" sz="2400" dirty="0" smtClean="0"/>
-              <a:t>Two </a:t>
-            </a:r>
-            <a:r>
               <a:rPr lang="en-US" sz="2400" dirty="0"/>
-              <a:t>main ways to pass parameters to an algorithm:</a:t>
+              <a:t>Two main ways to pass parameters to an algorithm:</a:t>
             </a:r>
           </a:p>
           <a:p>
@@ -11394,15 +9689,7 @@
             </a:pPr>
             <a:r>
               <a:rPr lang="en-US" sz="2400" dirty="0"/>
-              <a:t>Set parameters for an instance – e.g</a:t>
-            </a:r>
-            <a:r>
-              <a:rPr lang="en-US" sz="2400" dirty="0" smtClean="0"/>
-              <a:t>., </a:t>
-            </a:r>
-            <a:r>
-              <a:rPr lang="en-US" sz="2400" dirty="0"/>
-              <a:t>if </a:t>
+              <a:t>Set parameters for an instance – e.g., if </a:t>
             </a:r>
             <a:r>
               <a:rPr lang="en-US" sz="2400" dirty="0" err="1"/>
@@ -11468,13 +9755,6 @@
   <p:clrMapOvr>
     <a:masterClrMapping/>
   </p:clrMapOvr>
-  <p:timing>
-    <p:tnLst>
-      <p:par>
-        <p:cTn xmlns:p14="http://schemas.microsoft.com/office/powerpoint/2010/main" id="1" dur="indefinite" restart="never" nodeType="tmRoot"/>
-      </p:par>
-    </p:tnLst>
-  </p:timing>
 </p:sld>
 </file>
 
@@ -11510,18 +9790,21 @@
           <a:bodyPr/>
           <a:lstStyle/>
           <a:p>
-            <a:endParaRPr lang="en-US"/>
-          </a:p>
-        </p:txBody>
-      </p:sp>
-      <p:sp>
-        <p:nvSpPr>
-          <p:cNvPr id="3" name="Content Placeholder 2"/>
+            <a:r>
+              <a:rPr lang="en-US" dirty="0"/>
+              <a:t>Spark on Azure</a:t>
+            </a:r>
+          </a:p>
+        </p:txBody>
+      </p:sp>
+      <p:sp>
+        <p:nvSpPr>
+          <p:cNvPr id="3" name="Text Placeholder 2"/>
           <p:cNvSpPr>
             <a:spLocks noGrp="1"/>
           </p:cNvSpPr>
           <p:nvPr>
-            <p:ph idx="1"/>
+            <p:ph type="body" idx="1"/>
           </p:nvPr>
         </p:nvSpPr>
         <p:spPr/>
@@ -11529,14 +9812,14 @@
           <a:bodyPr/>
           <a:lstStyle/>
           <a:p>
-            <a:endParaRPr lang="en-US" dirty="0"/>
+            <a:endParaRPr lang="en-US"/>
           </a:p>
         </p:txBody>
       </p:sp>
     </p:spTree>
     <p:extLst>
       <p:ext uri="{BB962C8B-B14F-4D97-AF65-F5344CB8AC3E}">
-        <p14:creationId xmlns:p14="http://schemas.microsoft.com/office/powerpoint/2010/main" val="2938844122"/>
+        <p14:creationId xmlns:p14="http://schemas.microsoft.com/office/powerpoint/2010/main" val="4156826285"/>
       </p:ext>
     </p:extLst>
   </p:cSld>
@@ -11547,84 +9830,6 @@
 </file>
 
 <file path=ppt/slides/slide13.xml><?xml version="1.0" encoding="utf-8"?>
-<p:sld xmlns:a="http://schemas.openxmlformats.org/drawingml/2006/main" xmlns:r="http://schemas.openxmlformats.org/officeDocument/2006/relationships" xmlns:p="http://schemas.openxmlformats.org/presentationml/2006/main">
-  <p:cSld>
-    <p:spTree>
-      <p:nvGrpSpPr>
-        <p:cNvPr id="1" name=""/>
-        <p:cNvGrpSpPr/>
-        <p:nvPr/>
-      </p:nvGrpSpPr>
-      <p:grpSpPr>
-        <a:xfrm>
-          <a:off x="0" y="0"/>
-          <a:ext cx="0" cy="0"/>
-          <a:chOff x="0" y="0"/>
-          <a:chExt cx="0" cy="0"/>
-        </a:xfrm>
-      </p:grpSpPr>
-      <p:sp>
-        <p:nvSpPr>
-          <p:cNvPr id="2" name="Title 1"/>
-          <p:cNvSpPr>
-            <a:spLocks noGrp="1"/>
-          </p:cNvSpPr>
-          <p:nvPr>
-            <p:ph type="title"/>
-          </p:nvPr>
-        </p:nvSpPr>
-        <p:spPr/>
-        <p:txBody>
-          <a:bodyPr/>
-          <a:lstStyle/>
-          <a:p>
-            <a:r>
-              <a:rPr lang="en-US" dirty="0"/>
-              <a:t>Spark on Azure</a:t>
-            </a:r>
-          </a:p>
-        </p:txBody>
-      </p:sp>
-      <p:sp>
-        <p:nvSpPr>
-          <p:cNvPr id="3" name="Text Placeholder 2"/>
-          <p:cNvSpPr>
-            <a:spLocks noGrp="1"/>
-          </p:cNvSpPr>
-          <p:nvPr>
-            <p:ph type="body" idx="1"/>
-          </p:nvPr>
-        </p:nvSpPr>
-        <p:spPr/>
-        <p:txBody>
-          <a:bodyPr/>
-          <a:lstStyle/>
-          <a:p>
-            <a:endParaRPr lang="en-US"/>
-          </a:p>
-        </p:txBody>
-      </p:sp>
-    </p:spTree>
-    <p:extLst>
-      <p:ext uri="{BB962C8B-B14F-4D97-AF65-F5344CB8AC3E}">
-        <p14:creationId xmlns:p14="http://schemas.microsoft.com/office/powerpoint/2010/main" val="4156826285"/>
-      </p:ext>
-    </p:extLst>
-  </p:cSld>
-  <p:clrMapOvr>
-    <a:masterClrMapping/>
-  </p:clrMapOvr>
-  <p:timing>
-    <p:tnLst>
-      <p:par>
-        <p:cTn xmlns:p14="http://schemas.microsoft.com/office/powerpoint/2010/main" id="1" dur="indefinite" restart="never" nodeType="tmRoot"/>
-      </p:par>
-    </p:tnLst>
-  </p:timing>
-</p:sld>
-</file>
-
-<file path=ppt/slides/slide14.xml><?xml version="1.0" encoding="utf-8"?>
 <p:sld xmlns:a="http://schemas.openxmlformats.org/drawingml/2006/main" xmlns:r="http://schemas.openxmlformats.org/officeDocument/2006/relationships" xmlns:p="http://schemas.openxmlformats.org/presentationml/2006/main">
   <p:cSld>
     <p:spTree>
@@ -11740,23 +9945,7 @@
                   <a:prstClr val="black"/>
                 </a:solidFill>
               </a:rPr>
-              <a:t>Azure compute resources with Spark installed and configured </a:t>
-            </a:r>
-            <a:r>
-              <a:rPr lang="en-US" sz="2400" dirty="0" smtClean="0">
-                <a:solidFill>
-                  <a:prstClr val="black"/>
-                </a:solidFill>
-              </a:rPr>
-              <a:t>for </a:t>
-            </a:r>
-            <a:r>
-              <a:rPr lang="en-US" sz="2400" dirty="0">
-                <a:solidFill>
-                  <a:prstClr val="black"/>
-                </a:solidFill>
-              </a:rPr>
-              <a:t>a Spark cluster in </a:t>
+              <a:t>Azure compute resources with Spark installed and configured for a Spark cluster in </a:t>
             </a:r>
             <a:r>
               <a:rPr lang="en-US" sz="2400" dirty="0" err="1">
@@ -11806,21 +9995,8 @@
                   <a:prstClr val="black"/>
                 </a:solidFill>
               </a:rPr>
-              <a:t>Data to be processed is stored in Azure Blob </a:t>
-            </a:r>
-            <a:r>
-              <a:rPr lang="en-US" sz="2400" dirty="0" smtClean="0">
-                <a:solidFill>
-                  <a:prstClr val="black"/>
-                </a:solidFill>
-              </a:rPr>
-              <a:t>storage</a:t>
-            </a:r>
-            <a:endParaRPr lang="en-US" sz="2400" dirty="0">
-              <a:solidFill>
-                <a:prstClr val="black"/>
-              </a:solidFill>
-            </a:endParaRPr>
+              <a:t>Data to be processed is stored in Azure Blob storage</a:t>
+            </a:r>
           </a:p>
         </p:txBody>
       </p:sp>
@@ -11834,17 +10010,10 @@
   <p:clrMapOvr>
     <a:masterClrMapping/>
   </p:clrMapOvr>
-  <p:timing>
-    <p:tnLst>
-      <p:par>
-        <p:cTn xmlns:p14="http://schemas.microsoft.com/office/powerpoint/2010/main" id="1" dur="indefinite" restart="never" nodeType="tmRoot"/>
-      </p:par>
-    </p:tnLst>
-  </p:timing>
 </p:sld>
 </file>
 
-<file path=ppt/slides/slide15.xml><?xml version="1.0" encoding="utf-8"?>
+<file path=ppt/slides/slide14.xml><?xml version="1.0" encoding="utf-8"?>
 <p:sld xmlns:a="http://schemas.openxmlformats.org/drawingml/2006/main" xmlns:r="http://schemas.openxmlformats.org/officeDocument/2006/relationships" xmlns:p="http://schemas.openxmlformats.org/presentationml/2006/main">
   <p:cSld>
     <p:spTree>
@@ -12190,11 +10359,7 @@
             </a:pPr>
             <a:r>
               <a:rPr lang="en-US" sz="2400" dirty="0"/>
-              <a:t>Azure Event Hub is an event processing service that provides a foundation for large-scale data intake in a broad variety of </a:t>
-            </a:r>
-            <a:r>
-              <a:rPr lang="en-US" sz="2400" dirty="0" smtClean="0"/>
-              <a:t>scenarios</a:t>
+              <a:t>Azure Event Hub is an event processing service that provides a foundation for large-scale data intake in a broad variety of scenarios</a:t>
             </a:r>
           </a:p>
           <a:p>
@@ -12209,12 +10374,8 @@
               <a:buChar char="§"/>
             </a:pPr>
             <a:r>
-              <a:rPr lang="en-US" sz="2400" dirty="0" smtClean="0"/>
-              <a:t>Spark </a:t>
-            </a:r>
-            <a:r>
               <a:rPr lang="en-US" sz="2400" dirty="0"/>
-              <a:t>users on Azure can integrate their solutions with Azure Event Hub along with other services such as Kafka to build streaming applications</a:t>
+              <a:t>Spark users on Azure can integrate their solutions with Azure Event Hub along with other services such as Kafka to build streaming applications</a:t>
             </a:r>
           </a:p>
         </p:txBody>
@@ -12229,17 +10390,10 @@
   <p:clrMapOvr>
     <a:masterClrMapping/>
   </p:clrMapOvr>
-  <p:timing>
-    <p:tnLst>
-      <p:par>
-        <p:cTn xmlns:p14="http://schemas.microsoft.com/office/powerpoint/2010/main" id="1" dur="indefinite" restart="never" nodeType="tmRoot"/>
-      </p:par>
-    </p:tnLst>
-  </p:timing>
 </p:sld>
 </file>
 
-<file path=ppt/slides/slide16.xml><?xml version="1.0" encoding="utf-8"?>
+<file path=ppt/slides/slide15.xml><?xml version="1.0" encoding="utf-8"?>
 <p:sld xmlns:a="http://schemas.openxmlformats.org/drawingml/2006/main" xmlns:r="http://schemas.openxmlformats.org/officeDocument/2006/relationships" xmlns:p="http://schemas.openxmlformats.org/presentationml/2006/main">
   <p:cSld>
     <p:spTree>
@@ -12600,85 +10754,10 @@
   <p:clrMapOvr>
     <a:masterClrMapping/>
   </p:clrMapOvr>
-  <p:timing>
-    <p:tnLst>
-      <p:par>
-        <p:cTn xmlns:p14="http://schemas.microsoft.com/office/powerpoint/2010/main" id="1" dur="indefinite" restart="never" nodeType="tmRoot"/>
-      </p:par>
-    </p:tnLst>
-  </p:timing>
 </p:sld>
 </file>
 
-<file path=ppt/slides/slide17.xml><?xml version="1.0" encoding="utf-8"?>
-<p:sld xmlns:a="http://schemas.openxmlformats.org/drawingml/2006/main" xmlns:r="http://schemas.openxmlformats.org/officeDocument/2006/relationships" xmlns:p="http://schemas.openxmlformats.org/presentationml/2006/main">
-  <p:cSld>
-    <p:spTree>
-      <p:nvGrpSpPr>
-        <p:cNvPr id="1" name=""/>
-        <p:cNvGrpSpPr/>
-        <p:nvPr/>
-      </p:nvGrpSpPr>
-      <p:grpSpPr>
-        <a:xfrm>
-          <a:off x="0" y="0"/>
-          <a:ext cx="0" cy="0"/>
-          <a:chOff x="0" y="0"/>
-          <a:chExt cx="0" cy="0"/>
-        </a:xfrm>
-      </p:grpSpPr>
-      <p:sp>
-        <p:nvSpPr>
-          <p:cNvPr id="2" name="Title 1"/>
-          <p:cNvSpPr>
-            <a:spLocks noGrp="1"/>
-          </p:cNvSpPr>
-          <p:nvPr>
-            <p:ph type="title"/>
-          </p:nvPr>
-        </p:nvSpPr>
-        <p:spPr/>
-        <p:txBody>
-          <a:bodyPr/>
-          <a:lstStyle/>
-          <a:p>
-            <a:endParaRPr lang="en-US"/>
-          </a:p>
-        </p:txBody>
-      </p:sp>
-      <p:sp>
-        <p:nvSpPr>
-          <p:cNvPr id="3" name="Content Placeholder 2"/>
-          <p:cNvSpPr>
-            <a:spLocks noGrp="1"/>
-          </p:cNvSpPr>
-          <p:nvPr>
-            <p:ph idx="1"/>
-          </p:nvPr>
-        </p:nvSpPr>
-        <p:spPr/>
-        <p:txBody>
-          <a:bodyPr/>
-          <a:lstStyle/>
-          <a:p>
-            <a:endParaRPr lang="en-US" dirty="0"/>
-          </a:p>
-        </p:txBody>
-      </p:sp>
-    </p:spTree>
-    <p:extLst>
-      <p:ext uri="{BB962C8B-B14F-4D97-AF65-F5344CB8AC3E}">
-        <p14:creationId xmlns:p14="http://schemas.microsoft.com/office/powerpoint/2010/main" val="453491445"/>
-      </p:ext>
-    </p:extLst>
-  </p:cSld>
-  <p:clrMapOvr>
-    <a:masterClrMapping/>
-  </p:clrMapOvr>
-</p:sld>
-</file>
-
-<file path=ppt/slides/slide18.xml><?xml version="1.0" encoding="utf-8"?>
+<file path=ppt/slides/slide16.xml><?xml version="1.0" encoding="utf-8"?>
 <p:sld xmlns:a="http://schemas.openxmlformats.org/drawingml/2006/main" xmlns:r="http://schemas.openxmlformats.org/officeDocument/2006/relationships" xmlns:p="http://schemas.openxmlformats.org/presentationml/2006/main">
   <p:cSld>
     <p:spTree>
@@ -13029,23 +11108,7 @@
             </a:pPr>
             <a:r>
               <a:rPr lang="en-US" sz="2400" dirty="0"/>
-              <a:t>Anaconda is a free package manager, environment manager, Python </a:t>
-            </a:r>
-            <a:r>
-              <a:rPr lang="en-US" sz="2400" dirty="0" smtClean="0"/>
-              <a:t>distribution, </a:t>
-            </a:r>
-            <a:r>
-              <a:rPr lang="en-US" sz="2400" dirty="0"/>
-              <a:t>and collection of over 720 </a:t>
-            </a:r>
-            <a:r>
-              <a:rPr lang="en-US" sz="2400" dirty="0" smtClean="0"/>
-              <a:t>open-source </a:t>
-            </a:r>
-            <a:r>
-              <a:rPr lang="en-US" sz="2400" dirty="0"/>
-              <a:t>packages</a:t>
+              <a:t>Anaconda is a free package manager, environment manager, Python distribution, and collection of over 720 open-source packages</a:t>
             </a:r>
           </a:p>
           <a:p>
@@ -13076,17 +11139,10 @@
   <p:clrMapOvr>
     <a:masterClrMapping/>
   </p:clrMapOvr>
-  <p:timing>
-    <p:tnLst>
-      <p:par>
-        <p:cTn xmlns:p14="http://schemas.microsoft.com/office/powerpoint/2010/main" id="1" dur="indefinite" restart="never" nodeType="tmRoot"/>
-      </p:par>
-    </p:tnLst>
-  </p:timing>
 </p:sld>
 </file>
 
-<file path=ppt/slides/slide19.xml><?xml version="1.0" encoding="utf-8"?>
+<file path=ppt/slides/slide17.xml><?xml version="1.0" encoding="utf-8"?>
 <p:sld xmlns:a="http://schemas.openxmlformats.org/drawingml/2006/main" xmlns:r="http://schemas.openxmlformats.org/officeDocument/2006/relationships" xmlns:p="http://schemas.openxmlformats.org/presentationml/2006/main">
   <p:cSld>
     <p:spTree>
@@ -13432,11 +11488,7 @@
             </a:pPr>
             <a:r>
               <a:rPr lang="en-US" sz="2400" dirty="0"/>
-              <a:t>Users can specify number of notes during cluster </a:t>
-            </a:r>
-            <a:r>
-              <a:rPr lang="en-US" sz="2400" dirty="0" smtClean="0"/>
-              <a:t>creation</a:t>
+              <a:t>Users can specify number of notes during cluster creation</a:t>
             </a:r>
           </a:p>
           <a:p>
@@ -13451,16 +11503,8 @@
               <a:buChar char="§"/>
             </a:pPr>
             <a:r>
-              <a:rPr lang="en-US" sz="2400" dirty="0" smtClean="0"/>
-              <a:t>Number </a:t>
-            </a:r>
-            <a:r>
               <a:rPr lang="en-US" sz="2400" dirty="0"/>
-              <a:t>of nodes in cluster can be increased or decreased after initial cluster creation to better fit current </a:t>
-            </a:r>
-            <a:r>
-              <a:rPr lang="en-US" sz="2400" dirty="0" smtClean="0"/>
-              <a:t>needs</a:t>
+              <a:t>Number of nodes in cluster can be increased or decreased after initial cluster creation to better fit current needs</a:t>
             </a:r>
           </a:p>
           <a:p>
@@ -13475,24 +11519,8 @@
               <a:buChar char="§"/>
             </a:pPr>
             <a:r>
-              <a:rPr lang="en-US" sz="2400" dirty="0" smtClean="0"/>
-              <a:t>Users </a:t>
-            </a:r>
-            <a:r>
               <a:rPr lang="en-US" sz="2400" dirty="0"/>
-              <a:t>can cache data either into memory or SSDs allowing them to tradeoff cost </a:t>
-            </a:r>
-            <a:r>
-              <a:rPr lang="en-US" sz="2400" dirty="0" smtClean="0"/>
-              <a:t>vs</a:t>
-            </a:r>
-            <a:r>
-              <a:rPr lang="en-US" sz="2400" dirty="0"/>
-              <a:t>. </a:t>
-            </a:r>
-            <a:r>
-              <a:rPr lang="en-US" sz="2400" dirty="0" smtClean="0"/>
-              <a:t>performance</a:t>
+              <a:t>Users can cache data either into memory or SSDs allowing them to tradeoff cost vs. performance</a:t>
             </a:r>
           </a:p>
           <a:p>
@@ -13507,12 +11535,8 @@
               <a:buChar char="§"/>
             </a:pPr>
             <a:r>
-              <a:rPr lang="en-US" sz="2400" dirty="0" smtClean="0"/>
-              <a:t>Clusters </a:t>
-            </a:r>
-            <a:r>
               <a:rPr lang="en-US" sz="2400" dirty="0"/>
-              <a:t>can be torn down without loss of data (since they are stored in Azure Blobs)</a:t>
+              <a:t>Clusters can be torn down without loss of data (since they are stored in Azure Blobs)</a:t>
             </a:r>
           </a:p>
         </p:txBody>
@@ -13527,17 +11551,10 @@
   <p:clrMapOvr>
     <a:masterClrMapping/>
   </p:clrMapOvr>
-  <p:timing>
-    <p:tnLst>
-      <p:par>
-        <p:cTn xmlns:p14="http://schemas.microsoft.com/office/powerpoint/2010/main" id="1" dur="indefinite" restart="never" nodeType="tmRoot"/>
-      </p:par>
-    </p:tnLst>
-  </p:timing>
 </p:sld>
 </file>
 
-<file path=ppt/slides/slide2.xml><?xml version="1.0" encoding="utf-8"?>
+<file path=ppt/slides/slide18.xml><?xml version="1.0" encoding="utf-8"?>
 <p:sld xmlns:a="http://schemas.openxmlformats.org/drawingml/2006/main" xmlns:r="http://schemas.openxmlformats.org/officeDocument/2006/relationships" xmlns:p="http://schemas.openxmlformats.org/presentationml/2006/main">
   <p:cSld>
     <p:spTree>
@@ -13556,101 +11573,6 @@
       </p:grpSpPr>
       <p:sp>
         <p:nvSpPr>
-          <p:cNvPr id="7" name="Title 6"/>
-          <p:cNvSpPr>
-            <a:spLocks noGrp="1"/>
-          </p:cNvSpPr>
-          <p:nvPr>
-            <p:ph type="title"/>
-          </p:nvPr>
-        </p:nvSpPr>
-        <p:spPr/>
-        <p:txBody>
-          <a:bodyPr/>
-          <a:lstStyle/>
-          <a:p>
-            <a:r>
-              <a:rPr lang="en-US" dirty="0" smtClean="0"/>
-              <a:t>Topics</a:t>
-            </a:r>
-            <a:endParaRPr lang="en-US" dirty="0"/>
-          </a:p>
-        </p:txBody>
-      </p:sp>
-      <p:sp>
-        <p:nvSpPr>
-          <p:cNvPr id="8" name="Content Placeholder 7"/>
-          <p:cNvSpPr>
-            <a:spLocks noGrp="1"/>
-          </p:cNvSpPr>
-          <p:nvPr>
-            <p:ph sz="half" idx="1"/>
-          </p:nvPr>
-        </p:nvSpPr>
-        <p:spPr/>
-        <p:txBody>
-          <a:bodyPr/>
-          <a:lstStyle/>
-          <a:p>
-            <a:pPr marL="460374" indent="-457200"/>
-            <a:r>
-              <a:rPr lang="en-US" dirty="0"/>
-              <a:t>Spark ML: Estimators, Transformers and Pipelines</a:t>
-            </a:r>
-          </a:p>
-          <a:p>
-            <a:pPr marL="460374" indent="-457200"/>
-            <a:r>
-              <a:rPr lang="en-US" dirty="0"/>
-              <a:t>Spark Cluster on Azure </a:t>
-            </a:r>
-            <a:r>
-              <a:rPr lang="en-US" dirty="0" err="1" smtClean="0"/>
-              <a:t>HDInsight</a:t>
-            </a:r>
-            <a:endParaRPr lang="en-US" dirty="0"/>
-          </a:p>
-        </p:txBody>
-      </p:sp>
-    </p:spTree>
-    <p:extLst>
-      <p:ext uri="{BB962C8B-B14F-4D97-AF65-F5344CB8AC3E}">
-        <p14:creationId xmlns:p14="http://schemas.microsoft.com/office/powerpoint/2010/main" val="1615837370"/>
-      </p:ext>
-    </p:extLst>
-  </p:cSld>
-  <p:clrMapOvr>
-    <a:masterClrMapping/>
-  </p:clrMapOvr>
-  <p:timing>
-    <p:tnLst>
-      <p:par>
-        <p:cTn xmlns:p14="http://schemas.microsoft.com/office/powerpoint/2010/main" id="1" dur="indefinite" restart="never" nodeType="tmRoot"/>
-      </p:par>
-    </p:tnLst>
-  </p:timing>
-</p:sld>
-</file>
-
-<file path=ppt/slides/slide20.xml><?xml version="1.0" encoding="utf-8"?>
-<p:sld xmlns:a="http://schemas.openxmlformats.org/drawingml/2006/main" xmlns:r="http://schemas.openxmlformats.org/officeDocument/2006/relationships" xmlns:p="http://schemas.openxmlformats.org/presentationml/2006/main">
-  <p:cSld>
-    <p:spTree>
-      <p:nvGrpSpPr>
-        <p:cNvPr id="1" name=""/>
-        <p:cNvGrpSpPr/>
-        <p:nvPr/>
-      </p:nvGrpSpPr>
-      <p:grpSpPr>
-        <a:xfrm>
-          <a:off x="0" y="0"/>
-          <a:ext cx="0" cy="0"/>
-          <a:chOff x="0" y="0"/>
-          <a:chExt cx="0" cy="0"/>
-        </a:xfrm>
-      </p:grpSpPr>
-      <p:sp>
-        <p:nvSpPr>
           <p:cNvPr id="5" name="Title 4"/>
           <p:cNvSpPr>
             <a:spLocks noGrp="1"/>
@@ -13677,13 +11599,8 @@
             </a:r>
             <a:r>
               <a:rPr lang="en-US" sz="4000" dirty="0"/>
-              <a:t> </a:t>
-            </a:r>
-            <a:r>
-              <a:rPr lang="en-US" sz="4000" dirty="0" smtClean="0"/>
-              <a:t>Notebook</a:t>
-            </a:r>
-            <a:endParaRPr lang="en-US" sz="4000" dirty="0"/>
+              <a:t> Notebook</a:t>
+            </a:r>
           </a:p>
         </p:txBody>
       </p:sp>
@@ -13991,11 +11908,7 @@
             </a:r>
             <a:r>
               <a:rPr lang="en-US" sz="2400" dirty="0"/>
-              <a:t> Notebook is a web application that allows users to create and share documents that contain live code, equations, visualizations and explanatory </a:t>
-            </a:r>
-            <a:r>
-              <a:rPr lang="en-US" sz="2400" dirty="0" smtClean="0"/>
-              <a:t>text</a:t>
+              <a:t> Notebook is a web application that allows users to create and share documents that contain live code, equations, visualizations and explanatory text</a:t>
             </a:r>
           </a:p>
           <a:p>
@@ -14010,32 +11923,20 @@
               <a:buChar char="§"/>
             </a:pPr>
             <a:r>
-              <a:rPr lang="en-US" sz="2400" dirty="0" err="1" smtClean="0"/>
+              <a:rPr lang="en-US" sz="2400" dirty="0" err="1"/>
               <a:t>Jupyter</a:t>
             </a:r>
             <a:r>
-              <a:rPr lang="en-US" sz="2400" dirty="0" smtClean="0"/>
-              <a:t> </a:t>
-            </a:r>
-            <a:r>
               <a:rPr lang="en-US" sz="2400" dirty="0"/>
-              <a:t>supports many programming languages including those popular in data science and machine learning such as Python, Scala</a:t>
+              <a:t> supports many programming languages including those popular in data science and machine learning such as Python, Scala</a:t>
             </a:r>
             <a:r>
               <a:rPr lang="en-US" sz="2400"/>
-              <a:t>, </a:t>
-            </a:r>
-            <a:r>
-              <a:rPr lang="en-US" sz="2400" smtClean="0"/>
-              <a:t>R, </a:t>
+              <a:t>, R, </a:t>
             </a:r>
             <a:r>
               <a:rPr lang="en-US" sz="2400" dirty="0"/>
-              <a:t>and </a:t>
-            </a:r>
-            <a:r>
-              <a:rPr lang="en-US" sz="2400" dirty="0" smtClean="0"/>
-              <a:t>Julia</a:t>
+              <a:t>and Julia</a:t>
             </a:r>
           </a:p>
         </p:txBody>
@@ -14050,85 +11951,10 @@
   <p:clrMapOvr>
     <a:masterClrMapping/>
   </p:clrMapOvr>
-  <p:timing>
-    <p:tnLst>
-      <p:par>
-        <p:cTn xmlns:p14="http://schemas.microsoft.com/office/powerpoint/2010/main" id="1" dur="indefinite" restart="never" nodeType="tmRoot"/>
-      </p:par>
-    </p:tnLst>
-  </p:timing>
 </p:sld>
 </file>
 
-<file path=ppt/slides/slide21.xml><?xml version="1.0" encoding="utf-8"?>
-<p:sld xmlns:a="http://schemas.openxmlformats.org/drawingml/2006/main" xmlns:r="http://schemas.openxmlformats.org/officeDocument/2006/relationships" xmlns:p="http://schemas.openxmlformats.org/presentationml/2006/main">
-  <p:cSld>
-    <p:spTree>
-      <p:nvGrpSpPr>
-        <p:cNvPr id="1" name=""/>
-        <p:cNvGrpSpPr/>
-        <p:nvPr/>
-      </p:nvGrpSpPr>
-      <p:grpSpPr>
-        <a:xfrm>
-          <a:off x="0" y="0"/>
-          <a:ext cx="0" cy="0"/>
-          <a:chOff x="0" y="0"/>
-          <a:chExt cx="0" cy="0"/>
-        </a:xfrm>
-      </p:grpSpPr>
-      <p:sp>
-        <p:nvSpPr>
-          <p:cNvPr id="2" name="Title 1"/>
-          <p:cNvSpPr>
-            <a:spLocks noGrp="1"/>
-          </p:cNvSpPr>
-          <p:nvPr>
-            <p:ph type="title"/>
-          </p:nvPr>
-        </p:nvSpPr>
-        <p:spPr/>
-        <p:txBody>
-          <a:bodyPr/>
-          <a:lstStyle/>
-          <a:p>
-            <a:endParaRPr lang="en-US"/>
-          </a:p>
-        </p:txBody>
-      </p:sp>
-      <p:sp>
-        <p:nvSpPr>
-          <p:cNvPr id="3" name="Content Placeholder 2"/>
-          <p:cNvSpPr>
-            <a:spLocks noGrp="1"/>
-          </p:cNvSpPr>
-          <p:nvPr>
-            <p:ph idx="1"/>
-          </p:nvPr>
-        </p:nvSpPr>
-        <p:spPr/>
-        <p:txBody>
-          <a:bodyPr/>
-          <a:lstStyle/>
-          <a:p>
-            <a:endParaRPr lang="en-US" dirty="0"/>
-          </a:p>
-        </p:txBody>
-      </p:sp>
-    </p:spTree>
-    <p:extLst>
-      <p:ext uri="{BB962C8B-B14F-4D97-AF65-F5344CB8AC3E}">
-        <p14:creationId xmlns:p14="http://schemas.microsoft.com/office/powerpoint/2010/main" val="785794403"/>
-      </p:ext>
-    </p:extLst>
-  </p:cSld>
-  <p:clrMapOvr>
-    <a:masterClrMapping/>
-  </p:clrMapOvr>
-</p:sld>
-</file>
-
-<file path=ppt/slides/slide22.xml><?xml version="1.0" encoding="utf-8"?>
+<file path=ppt/slides/slide19.xml><?xml version="1.0" encoding="utf-8"?>
 <p:sld xmlns:a="http://schemas.openxmlformats.org/drawingml/2006/main" xmlns:r="http://schemas.openxmlformats.org/officeDocument/2006/relationships" xmlns:p="http://schemas.openxmlformats.org/presentationml/2006/main">
   <p:cSld>
     <p:spTree>
@@ -14221,7 +12047,7 @@
               <a:buChar char="§"/>
             </a:pPr>
             <a:r>
-              <a:rPr lang="en-US" sz="2800" dirty="0" smtClean="0"/>
+              <a:rPr lang="en-US" sz="2800" dirty="0"/>
               <a:t>Recognize the Spark ML API</a:t>
             </a:r>
           </a:p>
@@ -14231,15 +12057,15 @@
               <a:buChar char="§"/>
             </a:pPr>
             <a:r>
-              <a:rPr lang="en-US" sz="2800" dirty="0" smtClean="0"/>
+              <a:rPr lang="en-US" sz="2800" dirty="0"/>
               <a:t>Demonstrate how a Spark Cluster is configured on top of </a:t>
             </a:r>
             <a:r>
-              <a:rPr lang="en-US" sz="2800" dirty="0" err="1" smtClean="0"/>
+              <a:rPr lang="en-US" sz="2800" dirty="0" err="1"/>
               <a:t>HDInsight</a:t>
             </a:r>
             <a:r>
-              <a:rPr lang="en-US" sz="2800" dirty="0" smtClean="0"/>
+              <a:rPr lang="en-US" sz="2800" dirty="0"/>
               <a:t> Cluster</a:t>
             </a:r>
           </a:p>
@@ -14249,18 +12075,17 @@
               <a:buChar char="§"/>
             </a:pPr>
             <a:r>
-              <a:rPr lang="en-US" sz="2800" dirty="0" smtClean="0"/>
+              <a:rPr lang="en-US" sz="2800" dirty="0"/>
               <a:t>Explain some features available in Azure </a:t>
             </a:r>
             <a:r>
-              <a:rPr lang="en-US" sz="2800" dirty="0" err="1" smtClean="0"/>
+              <a:rPr lang="en-US" sz="2800" dirty="0" err="1"/>
               <a:t>HDInsight</a:t>
             </a:r>
             <a:r>
-              <a:rPr lang="en-US" sz="2800" dirty="0" smtClean="0"/>
+              <a:rPr lang="en-US" sz="2800" dirty="0"/>
               <a:t> Spark Clusters</a:t>
             </a:r>
-            <a:endParaRPr lang="en-US" sz="2800" dirty="0"/>
           </a:p>
         </p:txBody>
       </p:sp>
@@ -14524,13 +12349,8 @@
               <a:pPr algn="l"/>
               <a:r>
                 <a:rPr lang="en-US" altLang="es-MX" i="0" dirty="0"/>
-                <a:t>In this lesson, you have </a:t>
+                <a:t>In this lesson, you have learned how to:</a:t>
               </a:r>
-              <a:r>
-                <a:rPr lang="en-US" altLang="es-MX" i="0" dirty="0" smtClean="0"/>
-                <a:t>learned how to:</a:t>
-              </a:r>
-              <a:endParaRPr lang="en-US" altLang="es-MX" i="0" dirty="0"/>
             </a:p>
           </p:txBody>
         </p:sp>
@@ -14545,17 +12365,10 @@
   <p:clrMapOvr>
     <a:masterClrMapping/>
   </p:clrMapOvr>
-  <p:timing>
-    <p:tnLst>
-      <p:par>
-        <p:cTn xmlns:p14="http://schemas.microsoft.com/office/powerpoint/2010/main" id="1" dur="indefinite" restart="never" nodeType="tmRoot"/>
-      </p:par>
-    </p:tnLst>
-  </p:timing>
 </p:sld>
 </file>
 
-<file path=ppt/slides/slide23.xml><?xml version="1.0" encoding="utf-8"?>
+<file path=ppt/slides/slide2.xml><?xml version="1.0" encoding="utf-8"?>
 <p:sld xmlns:a="http://schemas.openxmlformats.org/drawingml/2006/main" xmlns:r="http://schemas.openxmlformats.org/officeDocument/2006/relationships" xmlns:p="http://schemas.openxmlformats.org/presentationml/2006/main">
   <p:cSld>
     <p:spTree>
@@ -14574,12 +12387,12 @@
       </p:grpSpPr>
       <p:sp>
         <p:nvSpPr>
-          <p:cNvPr id="2" name="Title 1"/>
+          <p:cNvPr id="7" name="Title 6"/>
           <p:cNvSpPr>
             <a:spLocks noGrp="1"/>
           </p:cNvSpPr>
           <p:nvPr>
-            <p:ph type="ctrTitle"/>
+            <p:ph type="title"/>
           </p:nvPr>
         </p:nvSpPr>
         <p:spPr/>
@@ -14589,58 +12402,56 @@
           <a:p>
             <a:r>
               <a:rPr lang="en-US" dirty="0"/>
-              <a:t>Hands-On Lab!</a:t>
-            </a:r>
-          </a:p>
-        </p:txBody>
-      </p:sp>
-      <p:sp>
-        <p:nvSpPr>
-          <p:cNvPr id="4" name="Text Placeholder 3"/>
+              <a:t>Topics</a:t>
+            </a:r>
+          </a:p>
+        </p:txBody>
+      </p:sp>
+      <p:sp>
+        <p:nvSpPr>
+          <p:cNvPr id="8" name="Content Placeholder 7"/>
           <p:cNvSpPr>
             <a:spLocks noGrp="1"/>
           </p:cNvSpPr>
           <p:nvPr>
-            <p:ph type="body" sz="quarter" idx="10"/>
-          </p:nvPr>
-        </p:nvSpPr>
-        <p:spPr>
-          <a:xfrm>
-            <a:off x="1889617" y="4793566"/>
-            <a:ext cx="8874849" cy="1274538"/>
-          </a:xfrm>
-        </p:spPr>
+            <p:ph sz="half" idx="1"/>
+          </p:nvPr>
+        </p:nvSpPr>
+        <p:spPr/>
         <p:txBody>
           <a:bodyPr/>
           <a:lstStyle/>
           <a:p>
+            <a:pPr marL="460374" indent="-457200"/>
             <a:r>
               <a:rPr lang="en-US" dirty="0"/>
-              <a:t>Creating Your Spark Cluster</a:t>
-            </a:r>
+              <a:t>Spark ML: Estimators, Transformers and Pipelines</a:t>
+            </a:r>
+          </a:p>
+          <a:p>
+            <a:pPr marL="460374" indent="-457200"/>
+            <a:r>
+              <a:rPr lang="en-US" dirty="0"/>
+              <a:t>Spark Cluster on Azure </a:t>
+            </a:r>
+            <a:r>
+              <a:rPr lang="en-US" dirty="0" err="1"/>
+              <a:t>HDInsight</a:t>
+            </a:r>
+            <a:endParaRPr lang="en-US" dirty="0"/>
           </a:p>
         </p:txBody>
       </p:sp>
     </p:spTree>
     <p:extLst>
       <p:ext uri="{BB962C8B-B14F-4D97-AF65-F5344CB8AC3E}">
-        <p14:creationId xmlns:p14="http://schemas.microsoft.com/office/powerpoint/2010/main" val="1958687342"/>
+        <p14:creationId xmlns:p14="http://schemas.microsoft.com/office/powerpoint/2010/main" val="1615837370"/>
       </p:ext>
     </p:extLst>
   </p:cSld>
   <p:clrMapOvr>
     <a:masterClrMapping/>
   </p:clrMapOvr>
-  <p:transition xmlns:p14="http://schemas.microsoft.com/office/powerpoint/2010/main">
-    <p:fade/>
-  </p:transition>
-  <p:timing>
-    <p:tnLst>
-      <p:par>
-        <p:cTn xmlns:p14="http://schemas.microsoft.com/office/powerpoint/2010/main" id="1" dur="indefinite" restart="never" nodeType="tmRoot"/>
-      </p:par>
-    </p:tnLst>
-  </p:timing>
 </p:sld>
 </file>
 
@@ -14964,13 +12775,8 @@
                 <a:pPr algn="l"/>
                 <a:r>
                   <a:rPr lang="en-US" i="0" dirty="0"/>
-                  <a:t>By the end of this lesson you should </a:t>
+                  <a:t>By the end of this lesson you should be able to:</a:t>
                 </a:r>
-                <a:r>
-                  <a:rPr lang="en-US" i="0" dirty="0" smtClean="0"/>
-                  <a:t>be able to:</a:t>
-                </a:r>
-                <a:endParaRPr lang="en-US" i="0" dirty="0"/>
               </a:p>
             </p:txBody>
           </p:sp>
@@ -15021,12 +12827,8 @@
                 <a:buChar char="§"/>
               </a:pPr>
               <a:r>
-                <a:rPr lang="en-US" sz="2800" dirty="0" smtClean="0"/>
-                <a:t>Recognize the </a:t>
-              </a:r>
-              <a:r>
                 <a:rPr lang="en-US" sz="2800" dirty="0"/>
-                <a:t>Spark ML API</a:t>
+                <a:t>Recognize the Spark ML API</a:t>
               </a:r>
             </a:p>
             <a:p>
@@ -15035,12 +12837,8 @@
                 <a:buChar char="§"/>
               </a:pPr>
               <a:r>
-                <a:rPr lang="en-US" sz="2800" dirty="0" smtClean="0"/>
-                <a:t>Demonstrate how </a:t>
-              </a:r>
-              <a:r>
                 <a:rPr lang="en-US" sz="2800" dirty="0"/>
-                <a:t>a Spark Cluster is configured on top of HDInsight Cluster</a:t>
+                <a:t>Demonstrate how a Spark Cluster is configured on top of HDInsight Cluster</a:t>
               </a:r>
             </a:p>
             <a:p>
@@ -15049,12 +12847,8 @@
                 <a:buChar char="§"/>
               </a:pPr>
               <a:r>
-                <a:rPr lang="en-US" sz="2800" dirty="0" smtClean="0"/>
-                <a:t>Explain some features </a:t>
-              </a:r>
-              <a:r>
                 <a:rPr lang="en-US" sz="2800" dirty="0"/>
-                <a:t>available in Azure HDInsight Spark Clusters</a:t>
+                <a:t>Explain some features available in Azure HDInsight Spark Clusters</a:t>
               </a:r>
             </a:p>
           </p:txBody>
@@ -15070,13 +12864,6 @@
   <p:clrMapOvr>
     <a:masterClrMapping/>
   </p:clrMapOvr>
-  <p:timing>
-    <p:tnLst>
-      <p:par>
-        <p:cTn xmlns:p14="http://schemas.microsoft.com/office/powerpoint/2010/main" id="1" dur="indefinite" restart="never" nodeType="tmRoot"/>
-      </p:par>
-    </p:tnLst>
-  </p:timing>
 </p:sld>
 </file>
 
@@ -15148,13 +12935,6 @@
   <p:clrMapOvr>
     <a:masterClrMapping/>
   </p:clrMapOvr>
-  <p:timing>
-    <p:tnLst>
-      <p:par>
-        <p:cTn xmlns:p14="http://schemas.microsoft.com/office/powerpoint/2010/main" id="1" dur="indefinite" restart="never" nodeType="tmRoot"/>
-      </p:par>
-    </p:tnLst>
-  </p:timing>
 </p:sld>
 </file>
 
@@ -15290,13 +13070,8 @@
             </a:r>
             <a:r>
               <a:rPr lang="en-US" dirty="0"/>
-              <a:t>-learn </a:t>
-            </a:r>
-            <a:r>
-              <a:rPr lang="en-US" dirty="0" smtClean="0"/>
-              <a:t>project</a:t>
-            </a:r>
-            <a:endParaRPr lang="en-US" dirty="0"/>
+              <a:t>-learn project</a:t>
+            </a:r>
           </a:p>
         </p:txBody>
       </p:sp>
@@ -15560,23 +13335,7 @@
               <a:pPr algn="l"/>
               <a:r>
                 <a:rPr lang="en-US" altLang="ko-KR" i="0" dirty="0"/>
-                <a:t>Spark’s </a:t>
-              </a:r>
-              <a:r>
-                <a:rPr lang="en-US" altLang="ko-KR" i="0" dirty="0" smtClean="0"/>
-                <a:t>second </a:t>
-              </a:r>
-              <a:r>
-                <a:rPr lang="en-US" altLang="ko-KR" i="0" dirty="0"/>
-                <a:t>g</a:t>
-              </a:r>
-              <a:r>
-                <a:rPr lang="en-US" altLang="ko-KR" i="0" dirty="0" smtClean="0"/>
-                <a:t>eneration </a:t>
-              </a:r>
-              <a:r>
-                <a:rPr lang="en-US" altLang="ko-KR" i="0" dirty="0"/>
-                <a:t>machine learning library platform</a:t>
+                <a:t>Spark’s second generation machine learning library platform</a:t>
               </a:r>
             </a:p>
           </p:txBody>
@@ -15592,13 +13351,6 @@
   <p:clrMapOvr>
     <a:masterClrMapping/>
   </p:clrMapOvr>
-  <p:timing>
-    <p:tnLst>
-      <p:par>
-        <p:cTn xmlns:p14="http://schemas.microsoft.com/office/powerpoint/2010/main" id="1" dur="indefinite" restart="never" nodeType="tmRoot"/>
-      </p:par>
-    </p:tnLst>
-  </p:timing>
 </p:sld>
 </file>
 
@@ -15671,14 +13423,14 @@
                 <a:gridCol w="3833588">
                   <a:extLst>
                     <a:ext uri="{9D8B030D-6E8A-4147-A177-3AD203B41FA5}">
-                      <a16:colId xmlns:a16="http://schemas.microsoft.com/office/drawing/2014/main" xmlns="" val="48614039"/>
+                      <a16:colId xmlns="" xmlns:a16="http://schemas.microsoft.com/office/drawing/2014/main" val="48614039"/>
                     </a:ext>
                   </a:extLst>
                 </a:gridCol>
                 <a:gridCol w="7373697">
                   <a:extLst>
                     <a:ext uri="{9D8B030D-6E8A-4147-A177-3AD203B41FA5}">
-                      <a16:colId xmlns:a16="http://schemas.microsoft.com/office/drawing/2014/main" xmlns="" val="1124546490"/>
+                      <a16:colId xmlns="" xmlns:a16="http://schemas.microsoft.com/office/drawing/2014/main" val="1124546490"/>
                     </a:ext>
                   </a:extLst>
                 </a:gridCol>
@@ -15691,18 +13443,13 @@
                     <a:p>
                       <a:pPr algn="ctr"/>
                       <a:r>
-                        <a:rPr lang="en-US" b="0" dirty="0" smtClean="0">
+                        <a:rPr lang="en-US" b="0" dirty="0">
                           <a:solidFill>
                             <a:schemeClr val="bg1"/>
                           </a:solidFill>
                         </a:rPr>
                         <a:t>Concept</a:t>
                       </a:r>
-                      <a:endParaRPr lang="en-US" b="0" dirty="0">
-                        <a:solidFill>
-                          <a:schemeClr val="bg1"/>
-                        </a:solidFill>
-                      </a:endParaRPr>
                     </a:p>
                   </a:txBody>
                   <a:tcPr>
@@ -15718,18 +13465,13 @@
                     <a:p>
                       <a:pPr algn="ctr"/>
                       <a:r>
-                        <a:rPr lang="en-US" b="0" dirty="0" smtClean="0">
+                        <a:rPr lang="en-US" b="0" dirty="0">
                           <a:solidFill>
                             <a:schemeClr val="bg1"/>
                           </a:solidFill>
                         </a:rPr>
                         <a:t>Description</a:t>
                       </a:r>
-                      <a:endParaRPr lang="en-US" b="0" dirty="0">
-                        <a:solidFill>
-                          <a:schemeClr val="bg1"/>
-                        </a:solidFill>
-                      </a:endParaRPr>
                     </a:p>
                   </a:txBody>
                   <a:tcPr>
@@ -15740,7 +13482,7 @@
                 </a:tc>
                 <a:extLst>
                   <a:ext uri="{0D108BD9-81ED-4DB2-BD59-A6C34878D82A}">
-                    <a16:rowId xmlns:a16="http://schemas.microsoft.com/office/drawing/2014/main" xmlns="" val="679667022"/>
+                    <a16:rowId xmlns="" xmlns:a16="http://schemas.microsoft.com/office/drawing/2014/main" val="679667022"/>
                   </a:ext>
                 </a:extLst>
               </a:tr>
@@ -15752,7 +13494,7 @@
                     <a:p>
                       <a:pPr algn="l"/>
                       <a:r>
-                        <a:rPr lang="en-US" dirty="0" err="1" smtClean="0"/>
+                        <a:rPr lang="en-US" dirty="0" err="1"/>
                         <a:t>DataFrames</a:t>
                       </a:r>
                       <a:endParaRPr lang="en-US" dirty="0"/>
@@ -15783,30 +13525,30 @@
                         </a:spcAft>
                       </a:pPr>
                       <a:r>
-                        <a:rPr lang="en-US" altLang="ko-KR" sz="1800" i="0" dirty="0" smtClean="0"/>
+                        <a:rPr lang="en-US" altLang="ko-KR" sz="1800" i="0" dirty="0"/>
                         <a:t>From Spark SQL as an ML dataset, </a:t>
                       </a:r>
                       <a:r>
-                        <a:rPr lang="en-US" altLang="ko-KR" sz="1800" i="0" dirty="0" err="1" smtClean="0"/>
+                        <a:rPr lang="en-US" altLang="ko-KR" sz="1800" i="0" dirty="0" err="1"/>
                         <a:t>DataFrames</a:t>
                       </a:r>
                       <a:r>
-                        <a:rPr lang="en-US" altLang="ko-KR" sz="1800" i="0" dirty="0" smtClean="0"/>
+                        <a:rPr lang="en-US" altLang="ko-KR" sz="1800" i="0" dirty="0"/>
                         <a:t> can hold a variety of data types.  </a:t>
                       </a:r>
                       <a:r>
-                        <a:rPr lang="en-US" altLang="ko-KR" sz="1800" i="0" dirty="0" err="1" smtClean="0"/>
+                        <a:rPr lang="en-US" altLang="ko-KR" sz="1800" i="0" dirty="0" err="1"/>
                         <a:t>DataFrame</a:t>
                       </a:r>
                       <a:r>
-                        <a:rPr lang="en-US" altLang="ko-KR" sz="1800" i="0" dirty="0" smtClean="0"/>
+                        <a:rPr lang="en-US" altLang="ko-KR" sz="1800" i="0" dirty="0"/>
                         <a:t> columns can store text, feature vectors, true labels, predictions, </a:t>
                       </a:r>
                       <a:r>
-                        <a:rPr lang="en-US" altLang="ko-KR" sz="1800" i="0" dirty="0" err="1" smtClean="0"/>
+                        <a:rPr lang="en-US" altLang="ko-KR" sz="1800" i="0" dirty="0" err="1"/>
                         <a:t>etc</a:t>
                       </a:r>
-                      <a:endParaRPr lang="en-US" altLang="ko-KR" sz="1800" i="0" dirty="0" smtClean="0"/>
+                      <a:endParaRPr lang="en-US" altLang="ko-KR" sz="1800" i="0" dirty="0"/>
                     </a:p>
                   </a:txBody>
                   <a:tcPr>
@@ -15819,7 +13561,7 @@
                 </a:tc>
                 <a:extLst>
                   <a:ext uri="{0D108BD9-81ED-4DB2-BD59-A6C34878D82A}">
-                    <a16:rowId xmlns:a16="http://schemas.microsoft.com/office/drawing/2014/main" xmlns="" val="2034482246"/>
+                    <a16:rowId xmlns="" xmlns:a16="http://schemas.microsoft.com/office/drawing/2014/main" val="2034482246"/>
                   </a:ext>
                 </a:extLst>
               </a:tr>
@@ -15831,10 +13573,9 @@
                     <a:p>
                       <a:pPr algn="l"/>
                       <a:r>
-                        <a:rPr lang="en-US" dirty="0" smtClean="0"/>
+                        <a:rPr lang="en-US" dirty="0"/>
                         <a:t>Transformer</a:t>
                       </a:r>
-                      <a:endParaRPr lang="en-US" dirty="0"/>
                     </a:p>
                   </a:txBody>
                   <a:tcPr>
@@ -15862,27 +13603,27 @@
                         </a:spcAft>
                       </a:pPr>
                       <a:r>
-                        <a:rPr lang="en-US" altLang="ko-KR" sz="1800" i="0" dirty="0" smtClean="0"/>
+                        <a:rPr lang="en-US" altLang="ko-KR" sz="1800" i="0" dirty="0"/>
                         <a:t>An algorithm that can transform one </a:t>
                       </a:r>
                       <a:r>
-                        <a:rPr lang="en-US" altLang="ko-KR" sz="1800" i="0" dirty="0" err="1" smtClean="0"/>
+                        <a:rPr lang="en-US" altLang="ko-KR" sz="1800" i="0" dirty="0" err="1"/>
                         <a:t>DataFrame</a:t>
                       </a:r>
                       <a:r>
-                        <a:rPr lang="en-US" altLang="ko-KR" sz="1800" i="0" dirty="0" smtClean="0"/>
+                        <a:rPr lang="en-US" altLang="ko-KR" sz="1800" i="0" dirty="0"/>
                         <a:t> into another.  A ML model is a transformer which  transforms feature </a:t>
                       </a:r>
                       <a:r>
-                        <a:rPr lang="en-US" altLang="ko-KR" sz="1800" i="0" dirty="0" err="1" smtClean="0"/>
+                        <a:rPr lang="en-US" altLang="ko-KR" sz="1800" i="0" dirty="0" err="1"/>
                         <a:t>DataFrames</a:t>
                       </a:r>
                       <a:r>
-                        <a:rPr lang="en-US" altLang="ko-KR" sz="1800" i="0" dirty="0" smtClean="0"/>
+                        <a:rPr lang="en-US" altLang="ko-KR" sz="1800" i="0" dirty="0"/>
                         <a:t> into a predictions </a:t>
                       </a:r>
                       <a:r>
-                        <a:rPr lang="en-US" altLang="ko-KR" sz="1800" i="0" dirty="0" err="1" smtClean="0"/>
+                        <a:rPr lang="en-US" altLang="ko-KR" sz="1800" i="0" dirty="0" err="1"/>
                         <a:t>DataFrame</a:t>
                       </a:r>
                       <a:endParaRPr lang="en-US" altLang="ko-KR" sz="1800" i="0" dirty="0"/>
@@ -15898,7 +13639,7 @@
                 </a:tc>
                 <a:extLst>
                   <a:ext uri="{0D108BD9-81ED-4DB2-BD59-A6C34878D82A}">
-                    <a16:rowId xmlns:a16="http://schemas.microsoft.com/office/drawing/2014/main" xmlns="" val="682465758"/>
+                    <a16:rowId xmlns="" xmlns:a16="http://schemas.microsoft.com/office/drawing/2014/main" val="682465758"/>
                   </a:ext>
                 </a:extLst>
               </a:tr>
@@ -15910,10 +13651,9 @@
                     <a:p>
                       <a:pPr algn="l"/>
                       <a:r>
-                        <a:rPr lang="en-US" dirty="0" smtClean="0"/>
+                        <a:rPr lang="en-US" dirty="0"/>
                         <a:t>Estimator</a:t>
                       </a:r>
-                      <a:endParaRPr lang="en-US" dirty="0"/>
                     </a:p>
                   </a:txBody>
                   <a:tcPr>
@@ -15931,23 +13671,23 @@
                     <a:p>
                       <a:pPr algn="l"/>
                       <a:r>
-                        <a:rPr lang="en-US" altLang="ko-KR" sz="1800" i="0" dirty="0" smtClean="0"/>
+                        <a:rPr lang="en-US" altLang="ko-KR" sz="1800" i="0" dirty="0"/>
                         <a:t>An algorithm which can fit on a </a:t>
                       </a:r>
                       <a:r>
-                        <a:rPr lang="en-US" altLang="ko-KR" sz="1800" i="0" dirty="0" err="1" smtClean="0"/>
+                        <a:rPr lang="en-US" altLang="ko-KR" sz="1800" i="0" dirty="0" err="1"/>
                         <a:t>DataFrame</a:t>
                       </a:r>
                       <a:r>
-                        <a:rPr lang="en-US" altLang="ko-KR" sz="1800" i="0" dirty="0" smtClean="0"/>
+                        <a:rPr lang="en-US" altLang="ko-KR" sz="1800" i="0" dirty="0"/>
                         <a:t> to produce a Transformer.  A learning algorithm, for example, is an Estimator which trains on a </a:t>
                       </a:r>
                       <a:r>
-                        <a:rPr lang="en-US" altLang="ko-KR" sz="1800" i="0" dirty="0" err="1" smtClean="0"/>
+                        <a:rPr lang="en-US" altLang="ko-KR" sz="1800" i="0" dirty="0" err="1"/>
                         <a:t>DataFrame</a:t>
                       </a:r>
                       <a:r>
-                        <a:rPr lang="en-US" altLang="ko-KR" sz="1800" i="0" dirty="0" smtClean="0"/>
+                        <a:rPr lang="en-US" altLang="ko-KR" sz="1800" i="0" dirty="0"/>
                         <a:t> to produce a model</a:t>
                       </a:r>
                       <a:endParaRPr lang="en-US" dirty="0"/>
@@ -15963,7 +13703,7 @@
                 </a:tc>
                 <a:extLst>
                   <a:ext uri="{0D108BD9-81ED-4DB2-BD59-A6C34878D82A}">
-                    <a16:rowId xmlns:a16="http://schemas.microsoft.com/office/drawing/2014/main" xmlns="" val="4230228483"/>
+                    <a16:rowId xmlns="" xmlns:a16="http://schemas.microsoft.com/office/drawing/2014/main" val="4230228483"/>
                   </a:ext>
                 </a:extLst>
               </a:tr>
@@ -15975,10 +13715,9 @@
                     <a:p>
                       <a:pPr algn="l"/>
                       <a:r>
-                        <a:rPr lang="en-US" dirty="0" smtClean="0"/>
+                        <a:rPr lang="en-US" dirty="0"/>
                         <a:t>Pipeline</a:t>
                       </a:r>
-                      <a:endParaRPr lang="en-US" dirty="0"/>
                     </a:p>
                   </a:txBody>
                   <a:tcPr>
@@ -16006,10 +13745,9 @@
                         </a:spcAft>
                       </a:pPr>
                       <a:r>
-                        <a:rPr lang="en-US" altLang="ko-KR" sz="1800" i="0" dirty="0" smtClean="0"/>
+                        <a:rPr lang="en-US" altLang="ko-KR" sz="1800" i="0" dirty="0"/>
                         <a:t>Chains multiple Transformers and Estimators together to create ML workflow</a:t>
                       </a:r>
-                      <a:endParaRPr lang="en-US" altLang="ko-KR" sz="1800" i="0" dirty="0"/>
                     </a:p>
                   </a:txBody>
                   <a:tcPr>
@@ -16022,7 +13760,7 @@
                 </a:tc>
                 <a:extLst>
                   <a:ext uri="{0D108BD9-81ED-4DB2-BD59-A6C34878D82A}">
-                    <a16:rowId xmlns:a16="http://schemas.microsoft.com/office/drawing/2014/main" xmlns="" val="3329658239"/>
+                    <a16:rowId xmlns="" xmlns:a16="http://schemas.microsoft.com/office/drawing/2014/main" val="3329658239"/>
                   </a:ext>
                 </a:extLst>
               </a:tr>
@@ -16034,10 +13772,9 @@
                     <a:p>
                       <a:pPr algn="l"/>
                       <a:r>
-                        <a:rPr lang="en-US" dirty="0" smtClean="0"/>
+                        <a:rPr lang="en-US" dirty="0"/>
                         <a:t>Parameter</a:t>
                       </a:r>
-                      <a:endParaRPr lang="en-US" dirty="0"/>
                     </a:p>
                   </a:txBody>
                   <a:tcPr>
@@ -16071,7 +13808,7 @@
                         <a:defRPr/>
                       </a:pPr>
                       <a:r>
-                        <a:rPr lang="en-US" altLang="ko-KR" sz="1800" i="0" dirty="0" smtClean="0"/>
+                        <a:rPr lang="en-US" altLang="ko-KR" sz="1800" i="0" dirty="0"/>
                         <a:t>All Transformers and Estimators share a common API for specifying parameters</a:t>
                       </a:r>
                     </a:p>
@@ -16084,6 +13821,11 @@
                     </a:solidFill>
                   </a:tcPr>
                 </a:tc>
+                <a:extLst>
+                  <a:ext uri="{0D108BD9-81ED-4DB2-BD59-A6C34878D82A}">
+                    <a16:rowId xmlns="" xmlns:a16="http://schemas.microsoft.com/office/drawing/2014/main" val="10005"/>
+                  </a:ext>
+                </a:extLst>
               </a:tr>
             </a:tbl>
           </a:graphicData>
@@ -16099,13 +13841,6 @@
   <p:clrMapOvr>
     <a:masterClrMapping/>
   </p:clrMapOvr>
-  <p:timing>
-    <p:tnLst>
-      <p:par>
-        <p:cTn xmlns:p14="http://schemas.microsoft.com/office/powerpoint/2010/main" id="1" dur="indefinite" restart="never" nodeType="tmRoot"/>
-      </p:par>
-    </p:tnLst>
-  </p:timing>
 </p:sld>
 </file>
 
@@ -16456,27 +14191,7 @@
             </a:pPr>
             <a:r>
               <a:rPr lang="en-US" sz="2400" dirty="0"/>
-              <a:t>Machine learning </a:t>
-            </a:r>
-            <a:r>
-              <a:rPr lang="en-US" sz="2400" dirty="0" smtClean="0"/>
-              <a:t>is applied </a:t>
-            </a:r>
-            <a:r>
-              <a:rPr lang="en-US" sz="2400" dirty="0"/>
-              <a:t>to </a:t>
-            </a:r>
-            <a:r>
-              <a:rPr lang="en-US" sz="2400" dirty="0" smtClean="0"/>
-              <a:t>data </a:t>
-            </a:r>
-            <a:r>
-              <a:rPr lang="en-US" sz="2400" dirty="0"/>
-              <a:t>types, such as vectors, matrices, text, images, and structured </a:t>
-            </a:r>
-            <a:r>
-              <a:rPr lang="en-US" sz="2400" dirty="0" smtClean="0"/>
-              <a:t>data</a:t>
+              <a:t>Machine learning is applied to data types, such as vectors, matrices, text, images, and structured data</a:t>
             </a:r>
           </a:p>
           <a:p>
@@ -16491,20 +14206,12 @@
               <a:buChar char="§"/>
             </a:pPr>
             <a:r>
-              <a:rPr lang="en-US" sz="2400" dirty="0" err="1" smtClean="0"/>
+              <a:rPr lang="en-US" sz="2400" dirty="0" err="1"/>
               <a:t>DataFrame</a:t>
             </a:r>
             <a:r>
-              <a:rPr lang="en-US" sz="2400" dirty="0" smtClean="0"/>
-              <a:t> </a:t>
-            </a:r>
-            <a:r>
               <a:rPr lang="en-US" sz="2400" dirty="0"/>
-              <a:t>supports many basic structured data types as well as ML </a:t>
-            </a:r>
-            <a:r>
-              <a:rPr lang="en-US" sz="2400" dirty="0" smtClean="0"/>
-              <a:t>vectors</a:t>
+              <a:t> supports many basic structured data types as well as ML vectors</a:t>
             </a:r>
           </a:p>
           <a:p>
@@ -16519,7 +14226,7 @@
               <a:buChar char="§"/>
             </a:pPr>
             <a:r>
-              <a:rPr lang="en-US" sz="2400" dirty="0" smtClean="0"/>
+              <a:rPr lang="en-US" sz="2400" dirty="0"/>
               <a:t>A </a:t>
             </a:r>
             <a:r>
@@ -16528,11 +14235,7 @@
             </a:r>
             <a:r>
               <a:rPr lang="en-US" sz="2400" dirty="0"/>
-              <a:t> can be created implicitly or explicitly from a regular </a:t>
-            </a:r>
-            <a:r>
-              <a:rPr lang="en-US" sz="2400" dirty="0" smtClean="0"/>
-              <a:t>RDD</a:t>
+              <a:t> can be created implicitly or explicitly from a regular RDD</a:t>
             </a:r>
           </a:p>
         </p:txBody>
@@ -16547,13 +14250,6 @@
   <p:clrMapOvr>
     <a:masterClrMapping/>
   </p:clrMapOvr>
-  <p:timing>
-    <p:tnLst>
-      <p:par>
-        <p:cTn xmlns:p14="http://schemas.microsoft.com/office/powerpoint/2010/main" id="1" dur="indefinite" restart="never" nodeType="tmRoot"/>
-      </p:par>
-    </p:tnLst>
-  </p:timing>
 </p:sld>
 </file>
 
@@ -16862,18 +14558,17 @@
             <a:p>
               <a:pPr algn="l"/>
               <a:r>
-                <a:rPr lang="en-US" altLang="ko-KR" i="0" dirty="0" smtClean="0"/>
+                <a:rPr lang="en-US" altLang="ko-KR" i="0" dirty="0"/>
                 <a:t>Algorithm that can transfer one </a:t>
               </a:r>
               <a:r>
-                <a:rPr lang="en-US" altLang="ko-KR" i="0" dirty="0" err="1" smtClean="0"/>
+                <a:rPr lang="en-US" altLang="ko-KR" i="0" dirty="0" err="1"/>
                 <a:t>DataFrame</a:t>
               </a:r>
               <a:r>
-                <a:rPr lang="en-US" altLang="ko-KR" i="0" dirty="0" smtClean="0"/>
+                <a:rPr lang="en-US" altLang="ko-KR" i="0" dirty="0"/>
                 <a:t> into another</a:t>
               </a:r>
-              <a:endParaRPr lang="en-US" altLang="ko-KR" i="0" dirty="0"/>
             </a:p>
           </p:txBody>
         </p:sp>
@@ -16912,11 +14607,7 @@
             </a:pPr>
             <a:r>
               <a:rPr lang="en-US" sz="2400" dirty="0"/>
-              <a:t>Transformers implement </a:t>
-            </a:r>
-            <a:r>
-              <a:rPr lang="en-US" sz="2400" dirty="0" smtClean="0"/>
-              <a:t> transform() method</a:t>
+              <a:t>Transformers implement  transform() method</a:t>
             </a:r>
           </a:p>
           <a:p>
@@ -16931,7 +14622,7 @@
               <a:buChar char="§"/>
             </a:pPr>
             <a:r>
-              <a:rPr lang="en-US" sz="2400" dirty="0" smtClean="0"/>
+              <a:rPr lang="en-US" sz="2400" dirty="0"/>
               <a:t>Feature transformer</a:t>
             </a:r>
           </a:p>
@@ -16947,10 +14638,9 @@
               <a:buChar char="§"/>
             </a:pPr>
             <a:r>
-              <a:rPr lang="en-US" sz="2400" dirty="0" smtClean="0"/>
+              <a:rPr lang="en-US" sz="2400" dirty="0"/>
               <a:t>Learning model</a:t>
             </a:r>
-            <a:endParaRPr lang="en-US" sz="2400" dirty="0"/>
           </a:p>
         </p:txBody>
       </p:sp>
@@ -16964,13 +14654,6 @@
   <p:clrMapOvr>
     <a:masterClrMapping/>
   </p:clrMapOvr>
-  <p:timing>
-    <p:tnLst>
-      <p:par>
-        <p:cTn xmlns:p14="http://schemas.microsoft.com/office/powerpoint/2010/main" id="1" dur="indefinite" restart="never" nodeType="tmRoot"/>
-      </p:par>
-    </p:tnLst>
-  </p:timing>
 </p:sld>
 </file>
 
@@ -17320,11 +15003,7 @@
             </a:pPr>
             <a:r>
               <a:rPr lang="en-US" sz="2400" dirty="0"/>
-              <a:t>Estimators implement </a:t>
-            </a:r>
-            <a:r>
-              <a:rPr lang="en-US" sz="2400" dirty="0" smtClean="0"/>
-              <a:t>the fit() method</a:t>
+              <a:t>Estimators implement the fit() method</a:t>
             </a:r>
           </a:p>
           <a:p>
@@ -17339,12 +15018,8 @@
               <a:buChar char="§"/>
             </a:pPr>
             <a:r>
-              <a:rPr lang="en-US" sz="2400" dirty="0" smtClean="0"/>
-              <a:t>Example</a:t>
-            </a:r>
-            <a:r>
               <a:rPr lang="en-US" sz="2400" dirty="0"/>
-              <a:t>:  A learning algorithm such as Logistic Regression is an Estimator, which calls fit() to train a Logistic Regression Model</a:t>
+              <a:t>Example:  A learning algorithm such as Logistic Regression is an Estimator, which calls fit() to train a Logistic Regression Model</a:t>
             </a:r>
           </a:p>
         </p:txBody>
@@ -17359,13 +15034,6 @@
   <p:clrMapOvr>
     <a:masterClrMapping/>
   </p:clrMapOvr>
-  <p:timing>
-    <p:tnLst>
-      <p:par>
-        <p:cTn xmlns:p14="http://schemas.microsoft.com/office/powerpoint/2010/main" id="1" dur="indefinite" restart="never" nodeType="tmRoot"/>
-      </p:par>
-    </p:tnLst>
-  </p:timing>
 </p:sld>
 </file>
 
@@ -17632,7 +15300,7 @@
   <a:extraClrSchemeLst/>
   <a:extLst>
     <a:ext uri="{05A4C25C-085E-4340-85A3-A5531E510DB2}">
-      <thm15:themeFamily xmlns:thm15="http://schemas.microsoft.com/office/thememl/2012/main" xmlns="" name="Office Theme" id="{62F939B6-93AF-4DB8-9C6B-D6C7DFDC589F}" vid="{4A3C46E8-61CC-4603-A589-7422A47A8E4A}"/>
+      <thm15:themeFamily xmlns="" xmlns:thm15="http://schemas.microsoft.com/office/thememl/2012/main" name="Office Theme" id="{62F939B6-93AF-4DB8-9C6B-D6C7DFDC589F}" vid="{4A3C46E8-61CC-4603-A589-7422A47A8E4A}"/>
     </a:ext>
   </a:extLst>
 </a:theme>
@@ -17927,7 +15595,7 @@
   <a:extraClrSchemeLst/>
   <a:extLst>
     <a:ext uri="{05A4C25C-085E-4340-85A3-A5531E510DB2}">
-      <thm15:themeFamily xmlns:thm15="http://schemas.microsoft.com/office/thememl/2012/main" xmlns="" name="Office Theme" id="{62F939B6-93AF-4DB8-9C6B-D6C7DFDC589F}" vid="{4A3C46E8-61CC-4603-A589-7422A47A8E4A}"/>
+      <thm15:themeFamily xmlns="" xmlns:thm15="http://schemas.microsoft.com/office/thememl/2012/main" name="Office Theme" id="{62F939B6-93AF-4DB8-9C6B-D6C7DFDC589F}" vid="{4A3C46E8-61CC-4603-A589-7422A47A8E4A}"/>
     </a:ext>
   </a:extLst>
 </a:theme>

</xml_diff>